<commit_message>
B_eaten plot updates, ln_M1_dev indexing
</commit_message>
<xml_diff>
--- a/vignettes/Rceattle overview 4_17_2025.pptx
+++ b/vignettes/Rceattle overview 4_17_2025.pptx
@@ -19,6 +19,33 @@
     <p:sldId id="267" r:id="rId13"/>
     <p:sldId id="268" r:id="rId14"/>
     <p:sldId id="269" r:id="rId15"/>
+    <p:sldId id="270" r:id="rId16"/>
+    <p:sldId id="271" r:id="rId17"/>
+    <p:sldId id="272" r:id="rId18"/>
+    <p:sldId id="273" r:id="rId19"/>
+    <p:sldId id="274" r:id="rId20"/>
+    <p:sldId id="275" r:id="rId21"/>
+    <p:sldId id="276" r:id="rId22"/>
+    <p:sldId id="277" r:id="rId23"/>
+    <p:sldId id="278" r:id="rId24"/>
+    <p:sldId id="279" r:id="rId25"/>
+    <p:sldId id="280" r:id="rId26"/>
+    <p:sldId id="281" r:id="rId27"/>
+    <p:sldId id="282" r:id="rId28"/>
+    <p:sldId id="283" r:id="rId29"/>
+    <p:sldId id="284" r:id="rId30"/>
+    <p:sldId id="285" r:id="rId31"/>
+    <p:sldId id="286" r:id="rId32"/>
+    <p:sldId id="287" r:id="rId33"/>
+    <p:sldId id="288" r:id="rId34"/>
+    <p:sldId id="289" r:id="rId35"/>
+    <p:sldId id="290" r:id="rId36"/>
+    <p:sldId id="291" r:id="rId37"/>
+    <p:sldId id="292" r:id="rId38"/>
+    <p:sldId id="293" r:id="rId39"/>
+    <p:sldId id="294" r:id="rId40"/>
+    <p:sldId id="295" r:id="rId41"/>
+    <p:sldId id="296" r:id="rId42"/>
   </p:sldIdLst>
   <p:sldSz cx="9144000" cy="5143500" type="screen16x9"/>
   <p:notesSz cx="6858000" cy="9144000"/>
@@ -5357,6 +5384,574 @@
 </p:sld>
 </file>
 
+<file path=ppt/slides/slide15.xml><?xml version="1.0" encoding="utf-8"?>
+<p:sld xmlns:a="http://schemas.openxmlformats.org/drawingml/2006/main" xmlns:r="http://schemas.openxmlformats.org/officeDocument/2006/relationships" xmlns:p="http://schemas.openxmlformats.org/presentationml/2006/main">
+  <p:cSld>
+    <p:spTree>
+      <p:nvGrpSpPr>
+        <p:cNvPr id="1" name=""/>
+        <p:cNvGrpSpPr/>
+        <p:nvPr/>
+      </p:nvGrpSpPr>
+      <p:grpSpPr>
+        <a:xfrm>
+          <a:off x="0" y="0"/>
+          <a:ext cx="0" cy="0"/>
+          <a:chOff x="0" y="0"/>
+          <a:chExt cx="0" cy="0"/>
+        </a:xfrm>
+      </p:grpSpPr>
+      <p:sp>
+        <p:nvSpPr>
+          <p:cNvPr id="2" name="Title 1"/>
+          <p:cNvSpPr>
+            <a:spLocks noGrp="1"/>
+          </p:cNvSpPr>
+          <p:nvPr>
+            <p:ph type="title"/>
+          </p:nvPr>
+        </p:nvSpPr>
+        <p:spPr/>
+        <p:txBody>
+          <a:bodyPr/>
+          <a:lstStyle/>
+          <a:p>
+            <a:pPr lvl="0" indent="0" marL="0">
+              <a:buNone/>
+            </a:pPr>
+            <a:r>
+              <a:rPr/>
+              <a:t>Time-series plotting</a:t>
+            </a:r>
+          </a:p>
+        </p:txBody>
+      </p:sp>
+      <p:sp>
+        <p:nvSpPr>
+          <p:cNvPr id="3" name="Content Placeholder 2"/>
+          <p:cNvSpPr>
+            <a:spLocks noGrp="1"/>
+          </p:cNvSpPr>
+          <p:nvPr>
+            <p:ph idx="1" sz="half"/>
+          </p:nvPr>
+        </p:nvSpPr>
+        <p:spPr/>
+        <p:txBody>
+          <a:bodyPr/>
+          <a:lstStyle/>
+          <a:p>
+            <a:pPr lvl="0" indent="0">
+              <a:buNone/>
+            </a:pPr>
+            <a:r>
+              <a:rPr>
+                <a:solidFill>
+                  <a:srgbClr val="4758AB"/>
+                </a:solidFill>
+                <a:latin typeface="Courier"/>
+              </a:rPr>
+              <a:t>plot_biomass</a:t>
+            </a:r>
+            <a:r>
+              <a:rPr>
+                <a:solidFill>
+                  <a:srgbClr val="003B4F"/>
+                </a:solidFill>
+                <a:latin typeface="Courier"/>
+              </a:rPr>
+              <a:t>(mymodel)</a:t>
+            </a:r>
+            <a:br/>
+            <a:r>
+              <a:rPr>
+                <a:solidFill>
+                  <a:srgbClr val="4758AB"/>
+                </a:solidFill>
+                <a:latin typeface="Courier"/>
+              </a:rPr>
+              <a:t>plot_recruitment</a:t>
+            </a:r>
+            <a:r>
+              <a:rPr>
+                <a:solidFill>
+                  <a:srgbClr val="003B4F"/>
+                </a:solidFill>
+                <a:latin typeface="Courier"/>
+              </a:rPr>
+              <a:t>(</a:t>
+            </a:r>
+            <a:r>
+              <a:rPr>
+                <a:solidFill>
+                  <a:srgbClr val="4758AB"/>
+                </a:solidFill>
+                <a:latin typeface="Courier"/>
+              </a:rPr>
+              <a:t>list</a:t>
+            </a:r>
+            <a:r>
+              <a:rPr>
+                <a:solidFill>
+                  <a:srgbClr val="003B4F"/>
+                </a:solidFill>
+                <a:latin typeface="Courier"/>
+              </a:rPr>
+              <a:t>(mymodel1, mymodel2))</a:t>
+            </a:r>
+            <a:br/>
+            <a:r>
+              <a:rPr>
+                <a:solidFill>
+                  <a:srgbClr val="4758AB"/>
+                </a:solidFill>
+                <a:latin typeface="Courier"/>
+              </a:rPr>
+              <a:t>plot_depletion</a:t>
+            </a:r>
+            <a:r>
+              <a:rPr>
+                <a:solidFill>
+                  <a:srgbClr val="003B4F"/>
+                </a:solidFill>
+                <a:latin typeface="Courier"/>
+              </a:rPr>
+              <a:t>()</a:t>
+            </a:r>
+            <a:br/>
+            <a:r>
+              <a:rPr>
+                <a:solidFill>
+                  <a:srgbClr val="4758AB"/>
+                </a:solidFill>
+                <a:latin typeface="Courier"/>
+              </a:rPr>
+              <a:t>plot_depletionSSB</a:t>
+            </a:r>
+            <a:r>
+              <a:rPr>
+                <a:solidFill>
+                  <a:srgbClr val="003B4F"/>
+                </a:solidFill>
+                <a:latin typeface="Courier"/>
+              </a:rPr>
+              <a:t>()</a:t>
+            </a:r>
+            <a:br/>
+            <a:r>
+              <a:rPr>
+                <a:solidFill>
+                  <a:srgbClr val="4758AB"/>
+                </a:solidFill>
+                <a:latin typeface="Courier"/>
+              </a:rPr>
+              <a:t>plot_mortality</a:t>
+            </a:r>
+            <a:r>
+              <a:rPr>
+                <a:solidFill>
+                  <a:srgbClr val="003B4F"/>
+                </a:solidFill>
+                <a:latin typeface="Courier"/>
+              </a:rPr>
+              <a:t>()</a:t>
+            </a:r>
+          </a:p>
+        </p:txBody>
+      </p:sp>
+      <p:pic>
+        <p:nvPicPr>
+          <p:cNvPr descr="Rceattle-overview-4_17_2025_files/figure-pptx/unnamed-chunk-7-1.png" id="0" name="Picture 1"/>
+          <p:cNvPicPr>
+            <a:picLocks noGrp="1" noChangeAspect="1"/>
+          </p:cNvPicPr>
+          <p:nvPr/>
+        </p:nvPicPr>
+        <p:blipFill>
+          <a:blip r:embed="rId2"/>
+          <a:stretch>
+            <a:fillRect/>
+          </a:stretch>
+        </p:blipFill>
+        <p:spPr bwMode="auto">
+          <a:xfrm>
+            <a:off x="4648200" y="1879600"/>
+            <a:ext cx="4038600" cy="2019300"/>
+          </a:xfrm>
+          <a:prstGeom prst="rect">
+            <a:avLst/>
+          </a:prstGeom>
+          <a:noFill/>
+          <a:ln w="9525">
+            <a:noFill/>
+            <a:headEnd/>
+            <a:tailEnd/>
+          </a:ln>
+        </p:spPr>
+      </p:pic>
+    </p:spTree>
+  </p:cSld>
+</p:sld>
+</file>
+
+<file path=ppt/slides/slide16.xml><?xml version="1.0" encoding="utf-8"?>
+<p:sld xmlns:a="http://schemas.openxmlformats.org/drawingml/2006/main" xmlns:r="http://schemas.openxmlformats.org/officeDocument/2006/relationships" xmlns:p="http://schemas.openxmlformats.org/presentationml/2006/main">
+  <p:cSld>
+    <p:spTree>
+      <p:nvGrpSpPr>
+        <p:cNvPr id="1" name=""/>
+        <p:cNvGrpSpPr/>
+        <p:nvPr/>
+      </p:nvGrpSpPr>
+      <p:grpSpPr>
+        <a:xfrm>
+          <a:off x="0" y="0"/>
+          <a:ext cx="0" cy="0"/>
+          <a:chOff x="0" y="0"/>
+          <a:chExt cx="0" cy="0"/>
+        </a:xfrm>
+      </p:grpSpPr>
+      <p:sp>
+        <p:nvSpPr>
+          <p:cNvPr id="2" name="Title 1"/>
+          <p:cNvSpPr>
+            <a:spLocks noGrp="1"/>
+          </p:cNvSpPr>
+          <p:nvPr>
+            <p:ph type="title"/>
+          </p:nvPr>
+        </p:nvSpPr>
+        <p:spPr>
+          <a:xfrm>
+            <a:off x="457201" y="204787"/>
+            <a:ext cx="3008313" cy="871538"/>
+          </a:xfrm>
+        </p:spPr>
+        <p:txBody>
+          <a:bodyPr/>
+          <a:lstStyle/>
+          <a:p>
+            <a:pPr lvl="0" indent="0" marL="0">
+              <a:buNone/>
+            </a:pPr>
+            <a:r>
+              <a:rPr/>
+              <a:t>Diagnostics: </a:t>
+            </a:r>
+            <a:r>
+              <a:rPr>
+                <a:latin typeface="Courier"/>
+              </a:rPr>
+              <a:t>??Rceattle</a:t>
+            </a:r>
+          </a:p>
+        </p:txBody>
+      </p:sp>
+      <p:sp>
+        <p:nvSpPr>
+          <p:cNvPr id="4" name="Text Placeholder 3"/>
+          <p:cNvSpPr>
+            <a:spLocks noGrp="1"/>
+          </p:cNvSpPr>
+          <p:nvPr>
+            <p:ph idx="2" sz="half" type="body"/>
+          </p:nvPr>
+        </p:nvSpPr>
+        <p:spPr/>
+        <p:txBody>
+          <a:bodyPr/>
+          <a:lstStyle/>
+          <a:p>
+            <a:pPr lvl="0" indent="0">
+              <a:buNone/>
+            </a:pPr>
+            <a:r>
+              <a:rPr>
+                <a:solidFill>
+                  <a:srgbClr val="4758AB"/>
+                </a:solidFill>
+                <a:latin typeface="Courier"/>
+              </a:rPr>
+              <a:t>plot_index</a:t>
+            </a:r>
+            <a:r>
+              <a:rPr>
+                <a:solidFill>
+                  <a:srgbClr val="003B4F"/>
+                </a:solidFill>
+                <a:latin typeface="Courier"/>
+              </a:rPr>
+              <a:t>(mymodel, </a:t>
+            </a:r>
+            <a:r>
+              <a:rPr>
+                <a:solidFill>
+                  <a:srgbClr val="657422"/>
+                </a:solidFill>
+                <a:latin typeface="Courier"/>
+              </a:rPr>
+              <a:t>species =</a:t>
+            </a:r>
+            <a:r>
+              <a:rPr>
+                <a:solidFill>
+                  <a:srgbClr val="003B4F"/>
+                </a:solidFill>
+                <a:latin typeface="Courier"/>
+              </a:rPr>
+              <a:t> </a:t>
+            </a:r>
+            <a:r>
+              <a:rPr>
+                <a:solidFill>
+                  <a:srgbClr val="AD0000"/>
+                </a:solidFill>
+                <a:latin typeface="Courier"/>
+              </a:rPr>
+              <a:t>1</a:t>
+            </a:r>
+            <a:r>
+              <a:rPr>
+                <a:solidFill>
+                  <a:srgbClr val="003B4F"/>
+                </a:solidFill>
+                <a:latin typeface="Courier"/>
+              </a:rPr>
+              <a:t>)</a:t>
+            </a:r>
+          </a:p>
+        </p:txBody>
+      </p:sp>
+      <p:pic>
+        <p:nvPicPr>
+          <p:cNvPr descr="Rceattle-overview-4_17_2025_files/figure-pptx/unnamed-chunk-8-1.png" id="0" name="Picture 1"/>
+          <p:cNvPicPr>
+            <a:picLocks noGrp="1" noChangeAspect="1"/>
+          </p:cNvPicPr>
+          <p:nvPr/>
+        </p:nvPicPr>
+        <p:blipFill>
+          <a:blip r:embed="rId2"/>
+          <a:stretch>
+            <a:fillRect/>
+          </a:stretch>
+        </p:blipFill>
+        <p:spPr bwMode="auto">
+          <a:xfrm>
+            <a:off x="3568700" y="1117600"/>
+            <a:ext cx="5105400" cy="2552700"/>
+          </a:xfrm>
+          <a:prstGeom prst="rect">
+            <a:avLst/>
+          </a:prstGeom>
+          <a:noFill/>
+          <a:ln w="9525">
+            <a:noFill/>
+            <a:headEnd/>
+            <a:tailEnd/>
+          </a:ln>
+        </p:spPr>
+      </p:pic>
+    </p:spTree>
+  </p:cSld>
+</p:sld>
+</file>
+
+<file path=ppt/slides/slide17.xml><?xml version="1.0" encoding="utf-8"?>
+<p:sld xmlns:a="http://schemas.openxmlformats.org/drawingml/2006/main" xmlns:r="http://schemas.openxmlformats.org/officeDocument/2006/relationships" xmlns:p="http://schemas.openxmlformats.org/presentationml/2006/main">
+  <p:cSld>
+    <p:spTree>
+      <p:nvGrpSpPr>
+        <p:cNvPr id="1" name=""/>
+        <p:cNvGrpSpPr/>
+        <p:nvPr/>
+      </p:nvGrpSpPr>
+      <p:grpSpPr>
+        <a:xfrm>
+          <a:off x="0" y="0"/>
+          <a:ext cx="0" cy="0"/>
+          <a:chOff x="0" y="0"/>
+          <a:chExt cx="0" cy="0"/>
+        </a:xfrm>
+      </p:grpSpPr>
+      <p:sp>
+        <p:nvSpPr>
+          <p:cNvPr id="4" name="Text Placeholder 3"/>
+          <p:cNvSpPr>
+            <a:spLocks noGrp="1"/>
+          </p:cNvSpPr>
+          <p:nvPr>
+            <p:ph idx="2" sz="half" type="body"/>
+          </p:nvPr>
+        </p:nvSpPr>
+        <p:spPr/>
+        <p:txBody>
+          <a:bodyPr/>
+          <a:lstStyle/>
+          <a:p>
+            <a:pPr lvl="0" indent="0">
+              <a:buNone/>
+            </a:pPr>
+            <a:r>
+              <a:rPr>
+                <a:solidFill>
+                  <a:srgbClr val="4758AB"/>
+                </a:solidFill>
+                <a:latin typeface="Courier"/>
+              </a:rPr>
+              <a:t>plot_comp</a:t>
+            </a:r>
+            <a:r>
+              <a:rPr>
+                <a:solidFill>
+                  <a:srgbClr val="003B4F"/>
+                </a:solidFill>
+                <a:latin typeface="Courier"/>
+              </a:rPr>
+              <a:t>(mymodel)</a:t>
+            </a:r>
+          </a:p>
+        </p:txBody>
+      </p:sp>
+      <p:pic>
+        <p:nvPicPr>
+          <p:cNvPr descr="Rceattle-overview-4_17_2025_files/figure-pptx/unnamed-chunk-9-1.png" id="0" name="Picture 1"/>
+          <p:cNvPicPr>
+            <a:picLocks noGrp="1" noChangeAspect="1"/>
+          </p:cNvPicPr>
+          <p:nvPr/>
+        </p:nvPicPr>
+        <p:blipFill>
+          <a:blip r:embed="rId2"/>
+          <a:stretch>
+            <a:fillRect/>
+          </a:stretch>
+        </p:blipFill>
+        <p:spPr bwMode="auto">
+          <a:xfrm>
+            <a:off x="3568700" y="1117600"/>
+            <a:ext cx="5105400" cy="2552700"/>
+          </a:xfrm>
+          <a:prstGeom prst="rect">
+            <a:avLst/>
+          </a:prstGeom>
+          <a:noFill/>
+          <a:ln w="9525">
+            <a:noFill/>
+            <a:headEnd/>
+            <a:tailEnd/>
+          </a:ln>
+        </p:spPr>
+      </p:pic>
+    </p:spTree>
+  </p:cSld>
+</p:sld>
+</file>
+
+<file path=ppt/slides/slide18.xml><?xml version="1.0" encoding="utf-8"?>
+<p:sld xmlns:a="http://schemas.openxmlformats.org/drawingml/2006/main" xmlns:r="http://schemas.openxmlformats.org/officeDocument/2006/relationships" xmlns:p="http://schemas.openxmlformats.org/presentationml/2006/main">
+  <p:cSld>
+    <p:spTree>
+      <p:nvGrpSpPr>
+        <p:cNvPr id="1" name=""/>
+        <p:cNvGrpSpPr/>
+        <p:nvPr/>
+      </p:nvGrpSpPr>
+      <p:grpSpPr>
+        <a:xfrm>
+          <a:off x="0" y="0"/>
+          <a:ext cx="0" cy="0"/>
+          <a:chOff x="0" y="0"/>
+          <a:chExt cx="0" cy="0"/>
+        </a:xfrm>
+      </p:grpSpPr>
+      <p:pic>
+        <p:nvPicPr>
+          <p:cNvPr descr="Rceattle-overview-4_17_2025_files/figure-pptx/unnamed-chunk-9-2.png" id="0" name="Picture 1"/>
+          <p:cNvPicPr>
+            <a:picLocks noGrp="1" noChangeAspect="1"/>
+          </p:cNvPicPr>
+          <p:nvPr/>
+        </p:nvPicPr>
+        <p:blipFill>
+          <a:blip r:embed="rId2"/>
+          <a:stretch>
+            <a:fillRect/>
+          </a:stretch>
+        </p:blipFill>
+        <p:spPr bwMode="auto">
+          <a:xfrm>
+            <a:off x="1181100" y="1193800"/>
+            <a:ext cx="6781800" cy="3390900"/>
+          </a:xfrm>
+          <a:prstGeom prst="rect">
+            <a:avLst/>
+          </a:prstGeom>
+          <a:noFill/>
+          <a:ln w="9525">
+            <a:noFill/>
+            <a:headEnd/>
+            <a:tailEnd/>
+          </a:ln>
+        </p:spPr>
+      </p:pic>
+    </p:spTree>
+  </p:cSld>
+</p:sld>
+</file>
+
+<file path=ppt/slides/slide19.xml><?xml version="1.0" encoding="utf-8"?>
+<p:sld xmlns:a="http://schemas.openxmlformats.org/drawingml/2006/main" xmlns:r="http://schemas.openxmlformats.org/officeDocument/2006/relationships" xmlns:p="http://schemas.openxmlformats.org/presentationml/2006/main">
+  <p:cSld>
+    <p:spTree>
+      <p:nvGrpSpPr>
+        <p:cNvPr id="1" name=""/>
+        <p:cNvGrpSpPr/>
+        <p:nvPr/>
+      </p:nvGrpSpPr>
+      <p:grpSpPr>
+        <a:xfrm>
+          <a:off x="0" y="0"/>
+          <a:ext cx="0" cy="0"/>
+          <a:chOff x="0" y="0"/>
+          <a:chExt cx="0" cy="0"/>
+        </a:xfrm>
+      </p:grpSpPr>
+      <p:pic>
+        <p:nvPicPr>
+          <p:cNvPr descr="Rceattle-overview-4_17_2025_files/figure-pptx/unnamed-chunk-9-3.png" id="0" name="Picture 1"/>
+          <p:cNvPicPr>
+            <a:picLocks noGrp="1" noChangeAspect="1"/>
+          </p:cNvPicPr>
+          <p:nvPr/>
+        </p:nvPicPr>
+        <p:blipFill>
+          <a:blip r:embed="rId2"/>
+          <a:stretch>
+            <a:fillRect/>
+          </a:stretch>
+        </p:blipFill>
+        <p:spPr bwMode="auto">
+          <a:xfrm>
+            <a:off x="1181100" y="1193800"/>
+            <a:ext cx="6781800" cy="3390900"/>
+          </a:xfrm>
+          <a:prstGeom prst="rect">
+            <a:avLst/>
+          </a:prstGeom>
+          <a:noFill/>
+          <a:ln w="9525">
+            <a:noFill/>
+            <a:headEnd/>
+            <a:tailEnd/>
+          </a:ln>
+        </p:spPr>
+      </p:pic>
+    </p:spTree>
+  </p:cSld>
+</p:sld>
+</file>
+
 <file path=ppt/slides/slide2.xml><?xml version="1.0" encoding="utf-8"?>
 <p:sld xmlns:a="http://schemas.openxmlformats.org/drawingml/2006/main" xmlns:r="http://schemas.openxmlformats.org/officeDocument/2006/relationships" xmlns:p="http://schemas.openxmlformats.org/presentationml/2006/main">
   <p:cSld>
@@ -5466,6 +6061,526 @@
           </a:p>
         </p:txBody>
       </p:sp>
+    </p:spTree>
+  </p:cSld>
+</p:sld>
+</file>
+
+<file path=ppt/slides/slide20.xml><?xml version="1.0" encoding="utf-8"?>
+<p:sld xmlns:a="http://schemas.openxmlformats.org/drawingml/2006/main" xmlns:r="http://schemas.openxmlformats.org/officeDocument/2006/relationships" xmlns:p="http://schemas.openxmlformats.org/presentationml/2006/main">
+  <p:cSld>
+    <p:spTree>
+      <p:nvGrpSpPr>
+        <p:cNvPr id="1" name=""/>
+        <p:cNvGrpSpPr/>
+        <p:nvPr/>
+      </p:nvGrpSpPr>
+      <p:grpSpPr>
+        <a:xfrm>
+          <a:off x="0" y="0"/>
+          <a:ext cx="0" cy="0"/>
+          <a:chOff x="0" y="0"/>
+          <a:chExt cx="0" cy="0"/>
+        </a:xfrm>
+      </p:grpSpPr>
+      <p:pic>
+        <p:nvPicPr>
+          <p:cNvPr descr="Rceattle-overview-4_17_2025_files/figure-pptx/unnamed-chunk-9-4.png" id="0" name="Picture 1"/>
+          <p:cNvPicPr>
+            <a:picLocks noGrp="1" noChangeAspect="1"/>
+          </p:cNvPicPr>
+          <p:nvPr/>
+        </p:nvPicPr>
+        <p:blipFill>
+          <a:blip r:embed="rId2"/>
+          <a:stretch>
+            <a:fillRect/>
+          </a:stretch>
+        </p:blipFill>
+        <p:spPr bwMode="auto">
+          <a:xfrm>
+            <a:off x="1181100" y="1193800"/>
+            <a:ext cx="6781800" cy="3390900"/>
+          </a:xfrm>
+          <a:prstGeom prst="rect">
+            <a:avLst/>
+          </a:prstGeom>
+          <a:noFill/>
+          <a:ln w="9525">
+            <a:noFill/>
+            <a:headEnd/>
+            <a:tailEnd/>
+          </a:ln>
+        </p:spPr>
+      </p:pic>
+    </p:spTree>
+  </p:cSld>
+</p:sld>
+</file>
+
+<file path=ppt/slides/slide21.xml><?xml version="1.0" encoding="utf-8"?>
+<p:sld xmlns:a="http://schemas.openxmlformats.org/drawingml/2006/main" xmlns:r="http://schemas.openxmlformats.org/officeDocument/2006/relationships" xmlns:p="http://schemas.openxmlformats.org/presentationml/2006/main">
+  <p:cSld>
+    <p:spTree>
+      <p:nvGrpSpPr>
+        <p:cNvPr id="1" name=""/>
+        <p:cNvGrpSpPr/>
+        <p:nvPr/>
+      </p:nvGrpSpPr>
+      <p:grpSpPr>
+        <a:xfrm>
+          <a:off x="0" y="0"/>
+          <a:ext cx="0" cy="0"/>
+          <a:chOff x="0" y="0"/>
+          <a:chExt cx="0" cy="0"/>
+        </a:xfrm>
+      </p:grpSpPr>
+      <p:pic>
+        <p:nvPicPr>
+          <p:cNvPr descr="Rceattle-overview-4_17_2025_files/figure-pptx/unnamed-chunk-9-5.png" id="0" name="Picture 1"/>
+          <p:cNvPicPr>
+            <a:picLocks noGrp="1" noChangeAspect="1"/>
+          </p:cNvPicPr>
+          <p:nvPr/>
+        </p:nvPicPr>
+        <p:blipFill>
+          <a:blip r:embed="rId2"/>
+          <a:stretch>
+            <a:fillRect/>
+          </a:stretch>
+        </p:blipFill>
+        <p:spPr bwMode="auto">
+          <a:xfrm>
+            <a:off x="1181100" y="1193800"/>
+            <a:ext cx="6781800" cy="3390900"/>
+          </a:xfrm>
+          <a:prstGeom prst="rect">
+            <a:avLst/>
+          </a:prstGeom>
+          <a:noFill/>
+          <a:ln w="9525">
+            <a:noFill/>
+            <a:headEnd/>
+            <a:tailEnd/>
+          </a:ln>
+        </p:spPr>
+      </p:pic>
+    </p:spTree>
+  </p:cSld>
+</p:sld>
+</file>
+
+<file path=ppt/slides/slide22.xml><?xml version="1.0" encoding="utf-8"?>
+<p:sld xmlns:a="http://schemas.openxmlformats.org/drawingml/2006/main" xmlns:r="http://schemas.openxmlformats.org/officeDocument/2006/relationships" xmlns:p="http://schemas.openxmlformats.org/presentationml/2006/main">
+  <p:cSld>
+    <p:spTree>
+      <p:nvGrpSpPr>
+        <p:cNvPr id="1" name=""/>
+        <p:cNvGrpSpPr/>
+        <p:nvPr/>
+      </p:nvGrpSpPr>
+      <p:grpSpPr>
+        <a:xfrm>
+          <a:off x="0" y="0"/>
+          <a:ext cx="0" cy="0"/>
+          <a:chOff x="0" y="0"/>
+          <a:chExt cx="0" cy="0"/>
+        </a:xfrm>
+      </p:grpSpPr>
+      <p:pic>
+        <p:nvPicPr>
+          <p:cNvPr descr="Rceattle-overview-4_17_2025_files/figure-pptx/unnamed-chunk-9-6.png" id="0" name="Picture 1"/>
+          <p:cNvPicPr>
+            <a:picLocks noGrp="1" noChangeAspect="1"/>
+          </p:cNvPicPr>
+          <p:nvPr/>
+        </p:nvPicPr>
+        <p:blipFill>
+          <a:blip r:embed="rId2"/>
+          <a:stretch>
+            <a:fillRect/>
+          </a:stretch>
+        </p:blipFill>
+        <p:spPr bwMode="auto">
+          <a:xfrm>
+            <a:off x="1181100" y="1193800"/>
+            <a:ext cx="6781800" cy="3390900"/>
+          </a:xfrm>
+          <a:prstGeom prst="rect">
+            <a:avLst/>
+          </a:prstGeom>
+          <a:noFill/>
+          <a:ln w="9525">
+            <a:noFill/>
+            <a:headEnd/>
+            <a:tailEnd/>
+          </a:ln>
+        </p:spPr>
+      </p:pic>
+    </p:spTree>
+  </p:cSld>
+</p:sld>
+</file>
+
+<file path=ppt/slides/slide23.xml><?xml version="1.0" encoding="utf-8"?>
+<p:sld xmlns:a="http://schemas.openxmlformats.org/drawingml/2006/main" xmlns:r="http://schemas.openxmlformats.org/officeDocument/2006/relationships" xmlns:p="http://schemas.openxmlformats.org/presentationml/2006/main">
+  <p:cSld>
+    <p:spTree>
+      <p:nvGrpSpPr>
+        <p:cNvPr id="1" name=""/>
+        <p:cNvGrpSpPr/>
+        <p:nvPr/>
+      </p:nvGrpSpPr>
+      <p:grpSpPr>
+        <a:xfrm>
+          <a:off x="0" y="0"/>
+          <a:ext cx="0" cy="0"/>
+          <a:chOff x="0" y="0"/>
+          <a:chExt cx="0" cy="0"/>
+        </a:xfrm>
+      </p:grpSpPr>
+      <p:pic>
+        <p:nvPicPr>
+          <p:cNvPr descr="Rceattle-overview-4_17_2025_files/figure-pptx/unnamed-chunk-9-7.png" id="0" name="Picture 1"/>
+          <p:cNvPicPr>
+            <a:picLocks noGrp="1" noChangeAspect="1"/>
+          </p:cNvPicPr>
+          <p:nvPr/>
+        </p:nvPicPr>
+        <p:blipFill>
+          <a:blip r:embed="rId2"/>
+          <a:stretch>
+            <a:fillRect/>
+          </a:stretch>
+        </p:blipFill>
+        <p:spPr bwMode="auto">
+          <a:xfrm>
+            <a:off x="1181100" y="1193800"/>
+            <a:ext cx="6781800" cy="3390900"/>
+          </a:xfrm>
+          <a:prstGeom prst="rect">
+            <a:avLst/>
+          </a:prstGeom>
+          <a:noFill/>
+          <a:ln w="9525">
+            <a:noFill/>
+            <a:headEnd/>
+            <a:tailEnd/>
+          </a:ln>
+        </p:spPr>
+      </p:pic>
+    </p:spTree>
+  </p:cSld>
+</p:sld>
+</file>
+
+<file path=ppt/slides/slide24.xml><?xml version="1.0" encoding="utf-8"?>
+<p:sld xmlns:a="http://schemas.openxmlformats.org/drawingml/2006/main" xmlns:r="http://schemas.openxmlformats.org/officeDocument/2006/relationships" xmlns:p="http://schemas.openxmlformats.org/presentationml/2006/main">
+  <p:cSld>
+    <p:spTree>
+      <p:nvGrpSpPr>
+        <p:cNvPr id="1" name=""/>
+        <p:cNvGrpSpPr/>
+        <p:nvPr/>
+      </p:nvGrpSpPr>
+      <p:grpSpPr>
+        <a:xfrm>
+          <a:off x="0" y="0"/>
+          <a:ext cx="0" cy="0"/>
+          <a:chOff x="0" y="0"/>
+          <a:chExt cx="0" cy="0"/>
+        </a:xfrm>
+      </p:grpSpPr>
+      <p:pic>
+        <p:nvPicPr>
+          <p:cNvPr descr="Rceattle-overview-4_17_2025_files/figure-pptx/unnamed-chunk-9-8.png" id="0" name="Picture 1"/>
+          <p:cNvPicPr>
+            <a:picLocks noGrp="1" noChangeAspect="1"/>
+          </p:cNvPicPr>
+          <p:nvPr/>
+        </p:nvPicPr>
+        <p:blipFill>
+          <a:blip r:embed="rId2"/>
+          <a:stretch>
+            <a:fillRect/>
+          </a:stretch>
+        </p:blipFill>
+        <p:spPr bwMode="auto">
+          <a:xfrm>
+            <a:off x="1181100" y="1193800"/>
+            <a:ext cx="6781800" cy="3390900"/>
+          </a:xfrm>
+          <a:prstGeom prst="rect">
+            <a:avLst/>
+          </a:prstGeom>
+          <a:noFill/>
+          <a:ln w="9525">
+            <a:noFill/>
+            <a:headEnd/>
+            <a:tailEnd/>
+          </a:ln>
+        </p:spPr>
+      </p:pic>
+    </p:spTree>
+  </p:cSld>
+</p:sld>
+</file>
+
+<file path=ppt/slides/slide25.xml><?xml version="1.0" encoding="utf-8"?>
+<p:sld xmlns:a="http://schemas.openxmlformats.org/drawingml/2006/main" xmlns:r="http://schemas.openxmlformats.org/officeDocument/2006/relationships" xmlns:p="http://schemas.openxmlformats.org/presentationml/2006/main">
+  <p:cSld>
+    <p:spTree>
+      <p:nvGrpSpPr>
+        <p:cNvPr id="1" name=""/>
+        <p:cNvGrpSpPr/>
+        <p:nvPr/>
+      </p:nvGrpSpPr>
+      <p:grpSpPr>
+        <a:xfrm>
+          <a:off x="0" y="0"/>
+          <a:ext cx="0" cy="0"/>
+          <a:chOff x="0" y="0"/>
+          <a:chExt cx="0" cy="0"/>
+        </a:xfrm>
+      </p:grpSpPr>
+      <p:pic>
+        <p:nvPicPr>
+          <p:cNvPr descr="Rceattle-overview-4_17_2025_files/figure-pptx/unnamed-chunk-9-9.png" id="0" name="Picture 1"/>
+          <p:cNvPicPr>
+            <a:picLocks noGrp="1" noChangeAspect="1"/>
+          </p:cNvPicPr>
+          <p:nvPr/>
+        </p:nvPicPr>
+        <p:blipFill>
+          <a:blip r:embed="rId2"/>
+          <a:stretch>
+            <a:fillRect/>
+          </a:stretch>
+        </p:blipFill>
+        <p:spPr bwMode="auto">
+          <a:xfrm>
+            <a:off x="1181100" y="1193800"/>
+            <a:ext cx="6781800" cy="3390900"/>
+          </a:xfrm>
+          <a:prstGeom prst="rect">
+            <a:avLst/>
+          </a:prstGeom>
+          <a:noFill/>
+          <a:ln w="9525">
+            <a:noFill/>
+            <a:headEnd/>
+            <a:tailEnd/>
+          </a:ln>
+        </p:spPr>
+      </p:pic>
+    </p:spTree>
+  </p:cSld>
+</p:sld>
+</file>
+
+<file path=ppt/slides/slide26.xml><?xml version="1.0" encoding="utf-8"?>
+<p:sld xmlns:a="http://schemas.openxmlformats.org/drawingml/2006/main" xmlns:r="http://schemas.openxmlformats.org/officeDocument/2006/relationships" xmlns:p="http://schemas.openxmlformats.org/presentationml/2006/main">
+  <p:cSld>
+    <p:spTree>
+      <p:nvGrpSpPr>
+        <p:cNvPr id="1" name=""/>
+        <p:cNvGrpSpPr/>
+        <p:nvPr/>
+      </p:nvGrpSpPr>
+      <p:grpSpPr>
+        <a:xfrm>
+          <a:off x="0" y="0"/>
+          <a:ext cx="0" cy="0"/>
+          <a:chOff x="0" y="0"/>
+          <a:chExt cx="0" cy="0"/>
+        </a:xfrm>
+      </p:grpSpPr>
+      <p:pic>
+        <p:nvPicPr>
+          <p:cNvPr descr="Rceattle-overview-4_17_2025_files/figure-pptx/unnamed-chunk-9-10.png" id="0" name="Picture 1"/>
+          <p:cNvPicPr>
+            <a:picLocks noGrp="1" noChangeAspect="1"/>
+          </p:cNvPicPr>
+          <p:nvPr/>
+        </p:nvPicPr>
+        <p:blipFill>
+          <a:blip r:embed="rId2"/>
+          <a:stretch>
+            <a:fillRect/>
+          </a:stretch>
+        </p:blipFill>
+        <p:spPr bwMode="auto">
+          <a:xfrm>
+            <a:off x="1181100" y="1193800"/>
+            <a:ext cx="6781800" cy="3390900"/>
+          </a:xfrm>
+          <a:prstGeom prst="rect">
+            <a:avLst/>
+          </a:prstGeom>
+          <a:noFill/>
+          <a:ln w="9525">
+            <a:noFill/>
+            <a:headEnd/>
+            <a:tailEnd/>
+          </a:ln>
+        </p:spPr>
+      </p:pic>
+    </p:spTree>
+  </p:cSld>
+</p:sld>
+</file>
+
+<file path=ppt/slides/slide27.xml><?xml version="1.0" encoding="utf-8"?>
+<p:sld xmlns:a="http://schemas.openxmlformats.org/drawingml/2006/main" xmlns:r="http://schemas.openxmlformats.org/officeDocument/2006/relationships" xmlns:p="http://schemas.openxmlformats.org/presentationml/2006/main">
+  <p:cSld>
+    <p:spTree>
+      <p:nvGrpSpPr>
+        <p:cNvPr id="1" name=""/>
+        <p:cNvGrpSpPr/>
+        <p:nvPr/>
+      </p:nvGrpSpPr>
+      <p:grpSpPr>
+        <a:xfrm>
+          <a:off x="0" y="0"/>
+          <a:ext cx="0" cy="0"/>
+          <a:chOff x="0" y="0"/>
+          <a:chExt cx="0" cy="0"/>
+        </a:xfrm>
+      </p:grpSpPr>
+      <p:pic>
+        <p:nvPicPr>
+          <p:cNvPr descr="Rceattle-overview-4_17_2025_files/figure-pptx/unnamed-chunk-9-11.png" id="0" name="Picture 1"/>
+          <p:cNvPicPr>
+            <a:picLocks noGrp="1" noChangeAspect="1"/>
+          </p:cNvPicPr>
+          <p:nvPr/>
+        </p:nvPicPr>
+        <p:blipFill>
+          <a:blip r:embed="rId2"/>
+          <a:stretch>
+            <a:fillRect/>
+          </a:stretch>
+        </p:blipFill>
+        <p:spPr bwMode="auto">
+          <a:xfrm>
+            <a:off x="1181100" y="1193800"/>
+            <a:ext cx="6781800" cy="3390900"/>
+          </a:xfrm>
+          <a:prstGeom prst="rect">
+            <a:avLst/>
+          </a:prstGeom>
+          <a:noFill/>
+          <a:ln w="9525">
+            <a:noFill/>
+            <a:headEnd/>
+            <a:tailEnd/>
+          </a:ln>
+        </p:spPr>
+      </p:pic>
+    </p:spTree>
+  </p:cSld>
+</p:sld>
+</file>
+
+<file path=ppt/slides/slide28.xml><?xml version="1.0" encoding="utf-8"?>
+<p:sld xmlns:a="http://schemas.openxmlformats.org/drawingml/2006/main" xmlns:r="http://schemas.openxmlformats.org/officeDocument/2006/relationships" xmlns:p="http://schemas.openxmlformats.org/presentationml/2006/main">
+  <p:cSld>
+    <p:spTree>
+      <p:nvGrpSpPr>
+        <p:cNvPr id="1" name=""/>
+        <p:cNvGrpSpPr/>
+        <p:nvPr/>
+      </p:nvGrpSpPr>
+      <p:grpSpPr>
+        <a:xfrm>
+          <a:off x="0" y="0"/>
+          <a:ext cx="0" cy="0"/>
+          <a:chOff x="0" y="0"/>
+          <a:chExt cx="0" cy="0"/>
+        </a:xfrm>
+      </p:grpSpPr>
+      <p:pic>
+        <p:nvPicPr>
+          <p:cNvPr descr="Rceattle-overview-4_17_2025_files/figure-pptx/unnamed-chunk-9-12.png" id="0" name="Picture 1"/>
+          <p:cNvPicPr>
+            <a:picLocks noGrp="1" noChangeAspect="1"/>
+          </p:cNvPicPr>
+          <p:nvPr/>
+        </p:nvPicPr>
+        <p:blipFill>
+          <a:blip r:embed="rId2"/>
+          <a:stretch>
+            <a:fillRect/>
+          </a:stretch>
+        </p:blipFill>
+        <p:spPr bwMode="auto">
+          <a:xfrm>
+            <a:off x="1181100" y="1193800"/>
+            <a:ext cx="6781800" cy="3390900"/>
+          </a:xfrm>
+          <a:prstGeom prst="rect">
+            <a:avLst/>
+          </a:prstGeom>
+          <a:noFill/>
+          <a:ln w="9525">
+            <a:noFill/>
+            <a:headEnd/>
+            <a:tailEnd/>
+          </a:ln>
+        </p:spPr>
+      </p:pic>
+    </p:spTree>
+  </p:cSld>
+</p:sld>
+</file>
+
+<file path=ppt/slides/slide29.xml><?xml version="1.0" encoding="utf-8"?>
+<p:sld xmlns:a="http://schemas.openxmlformats.org/drawingml/2006/main" xmlns:r="http://schemas.openxmlformats.org/officeDocument/2006/relationships" xmlns:p="http://schemas.openxmlformats.org/presentationml/2006/main">
+  <p:cSld>
+    <p:spTree>
+      <p:nvGrpSpPr>
+        <p:cNvPr id="1" name=""/>
+        <p:cNvGrpSpPr/>
+        <p:nvPr/>
+      </p:nvGrpSpPr>
+      <p:grpSpPr>
+        <a:xfrm>
+          <a:off x="0" y="0"/>
+          <a:ext cx="0" cy="0"/>
+          <a:chOff x="0" y="0"/>
+          <a:chExt cx="0" cy="0"/>
+        </a:xfrm>
+      </p:grpSpPr>
+      <p:pic>
+        <p:nvPicPr>
+          <p:cNvPr descr="Rceattle-overview-4_17_2025_files/figure-pptx/unnamed-chunk-9-13.png" id="0" name="Picture 1"/>
+          <p:cNvPicPr>
+            <a:picLocks noGrp="1" noChangeAspect="1"/>
+          </p:cNvPicPr>
+          <p:nvPr/>
+        </p:nvPicPr>
+        <p:blipFill>
+          <a:blip r:embed="rId2"/>
+          <a:stretch>
+            <a:fillRect/>
+          </a:stretch>
+        </p:blipFill>
+        <p:spPr bwMode="auto">
+          <a:xfrm>
+            <a:off x="1181100" y="1193800"/>
+            <a:ext cx="6781800" cy="3390900"/>
+          </a:xfrm>
+          <a:prstGeom prst="rect">
+            <a:avLst/>
+          </a:prstGeom>
+          <a:noFill/>
+          <a:ln w="9525">
+            <a:noFill/>
+            <a:headEnd/>
+            <a:tailEnd/>
+          </a:ln>
+        </p:spPr>
+      </p:pic>
     </p:spTree>
   </p:cSld>
 </p:sld>
@@ -5570,6 +6685,683 @@
 </p:sld>
 </file>
 
+<file path=ppt/slides/slide30.xml><?xml version="1.0" encoding="utf-8"?>
+<p:sld xmlns:a="http://schemas.openxmlformats.org/drawingml/2006/main" xmlns:r="http://schemas.openxmlformats.org/officeDocument/2006/relationships" xmlns:p="http://schemas.openxmlformats.org/presentationml/2006/main">
+  <p:cSld>
+    <p:spTree>
+      <p:nvGrpSpPr>
+        <p:cNvPr id="1" name=""/>
+        <p:cNvGrpSpPr/>
+        <p:nvPr/>
+      </p:nvGrpSpPr>
+      <p:grpSpPr>
+        <a:xfrm>
+          <a:off x="0" y="0"/>
+          <a:ext cx="0" cy="0"/>
+          <a:chOff x="0" y="0"/>
+          <a:chExt cx="0" cy="0"/>
+        </a:xfrm>
+      </p:grpSpPr>
+      <p:pic>
+        <p:nvPicPr>
+          <p:cNvPr descr="Rceattle-overview-4_17_2025_files/figure-pptx/unnamed-chunk-9-14.png" id="0" name="Picture 1"/>
+          <p:cNvPicPr>
+            <a:picLocks noGrp="1" noChangeAspect="1"/>
+          </p:cNvPicPr>
+          <p:nvPr/>
+        </p:nvPicPr>
+        <p:blipFill>
+          <a:blip r:embed="rId2"/>
+          <a:stretch>
+            <a:fillRect/>
+          </a:stretch>
+        </p:blipFill>
+        <p:spPr bwMode="auto">
+          <a:xfrm>
+            <a:off x="1181100" y="1193800"/>
+            <a:ext cx="6781800" cy="3390900"/>
+          </a:xfrm>
+          <a:prstGeom prst="rect">
+            <a:avLst/>
+          </a:prstGeom>
+          <a:noFill/>
+          <a:ln w="9525">
+            <a:noFill/>
+            <a:headEnd/>
+            <a:tailEnd/>
+          </a:ln>
+        </p:spPr>
+      </p:pic>
+    </p:spTree>
+  </p:cSld>
+</p:sld>
+</file>
+
+<file path=ppt/slides/slide31.xml><?xml version="1.0" encoding="utf-8"?>
+<p:sld xmlns:a="http://schemas.openxmlformats.org/drawingml/2006/main" xmlns:r="http://schemas.openxmlformats.org/officeDocument/2006/relationships" xmlns:p="http://schemas.openxmlformats.org/presentationml/2006/main">
+  <p:cSld>
+    <p:spTree>
+      <p:nvGrpSpPr>
+        <p:cNvPr id="1" name=""/>
+        <p:cNvGrpSpPr/>
+        <p:nvPr/>
+      </p:nvGrpSpPr>
+      <p:grpSpPr>
+        <a:xfrm>
+          <a:off x="0" y="0"/>
+          <a:ext cx="0" cy="0"/>
+          <a:chOff x="0" y="0"/>
+          <a:chExt cx="0" cy="0"/>
+        </a:xfrm>
+      </p:grpSpPr>
+      <p:pic>
+        <p:nvPicPr>
+          <p:cNvPr descr="Rceattle-overview-4_17_2025_files/figure-pptx/unnamed-chunk-9-15.png" id="0" name="Picture 1"/>
+          <p:cNvPicPr>
+            <a:picLocks noGrp="1" noChangeAspect="1"/>
+          </p:cNvPicPr>
+          <p:nvPr/>
+        </p:nvPicPr>
+        <p:blipFill>
+          <a:blip r:embed="rId2"/>
+          <a:stretch>
+            <a:fillRect/>
+          </a:stretch>
+        </p:blipFill>
+        <p:spPr bwMode="auto">
+          <a:xfrm>
+            <a:off x="1181100" y="1193800"/>
+            <a:ext cx="6781800" cy="3390900"/>
+          </a:xfrm>
+          <a:prstGeom prst="rect">
+            <a:avLst/>
+          </a:prstGeom>
+          <a:noFill/>
+          <a:ln w="9525">
+            <a:noFill/>
+            <a:headEnd/>
+            <a:tailEnd/>
+          </a:ln>
+        </p:spPr>
+      </p:pic>
+    </p:spTree>
+  </p:cSld>
+</p:sld>
+</file>
+
+<file path=ppt/slides/slide32.xml><?xml version="1.0" encoding="utf-8"?>
+<p:sld xmlns:a="http://schemas.openxmlformats.org/drawingml/2006/main" xmlns:r="http://schemas.openxmlformats.org/officeDocument/2006/relationships" xmlns:p="http://schemas.openxmlformats.org/presentationml/2006/main">
+  <p:cSld>
+    <p:spTree>
+      <p:nvGrpSpPr>
+        <p:cNvPr id="1" name=""/>
+        <p:cNvGrpSpPr/>
+        <p:nvPr/>
+      </p:nvGrpSpPr>
+      <p:grpSpPr>
+        <a:xfrm>
+          <a:off x="0" y="0"/>
+          <a:ext cx="0" cy="0"/>
+          <a:chOff x="0" y="0"/>
+          <a:chExt cx="0" cy="0"/>
+        </a:xfrm>
+      </p:grpSpPr>
+      <p:pic>
+        <p:nvPicPr>
+          <p:cNvPr descr="Rceattle-overview-4_17_2025_files/figure-pptx/unnamed-chunk-9-16.png" id="0" name="Picture 1"/>
+          <p:cNvPicPr>
+            <a:picLocks noGrp="1" noChangeAspect="1"/>
+          </p:cNvPicPr>
+          <p:nvPr/>
+        </p:nvPicPr>
+        <p:blipFill>
+          <a:blip r:embed="rId2"/>
+          <a:stretch>
+            <a:fillRect/>
+          </a:stretch>
+        </p:blipFill>
+        <p:spPr bwMode="auto">
+          <a:xfrm>
+            <a:off x="1181100" y="1193800"/>
+            <a:ext cx="6781800" cy="3390900"/>
+          </a:xfrm>
+          <a:prstGeom prst="rect">
+            <a:avLst/>
+          </a:prstGeom>
+          <a:noFill/>
+          <a:ln w="9525">
+            <a:noFill/>
+            <a:headEnd/>
+            <a:tailEnd/>
+          </a:ln>
+        </p:spPr>
+      </p:pic>
+    </p:spTree>
+  </p:cSld>
+</p:sld>
+</file>
+
+<file path=ppt/slides/slide33.xml><?xml version="1.0" encoding="utf-8"?>
+<p:sld xmlns:a="http://schemas.openxmlformats.org/drawingml/2006/main" xmlns:r="http://schemas.openxmlformats.org/officeDocument/2006/relationships" xmlns:p="http://schemas.openxmlformats.org/presentationml/2006/main">
+  <p:cSld>
+    <p:spTree>
+      <p:nvGrpSpPr>
+        <p:cNvPr id="1" name=""/>
+        <p:cNvGrpSpPr/>
+        <p:nvPr/>
+      </p:nvGrpSpPr>
+      <p:grpSpPr>
+        <a:xfrm>
+          <a:off x="0" y="0"/>
+          <a:ext cx="0" cy="0"/>
+          <a:chOff x="0" y="0"/>
+          <a:chExt cx="0" cy="0"/>
+        </a:xfrm>
+      </p:grpSpPr>
+      <p:pic>
+        <p:nvPicPr>
+          <p:cNvPr descr="Rceattle-overview-4_17_2025_files/figure-pptx/unnamed-chunk-9-17.png" id="0" name="Picture 1"/>
+          <p:cNvPicPr>
+            <a:picLocks noGrp="1" noChangeAspect="1"/>
+          </p:cNvPicPr>
+          <p:nvPr/>
+        </p:nvPicPr>
+        <p:blipFill>
+          <a:blip r:embed="rId2"/>
+          <a:stretch>
+            <a:fillRect/>
+          </a:stretch>
+        </p:blipFill>
+        <p:spPr bwMode="auto">
+          <a:xfrm>
+            <a:off x="1181100" y="1193800"/>
+            <a:ext cx="6781800" cy="3390900"/>
+          </a:xfrm>
+          <a:prstGeom prst="rect">
+            <a:avLst/>
+          </a:prstGeom>
+          <a:noFill/>
+          <a:ln w="9525">
+            <a:noFill/>
+            <a:headEnd/>
+            <a:tailEnd/>
+          </a:ln>
+        </p:spPr>
+      </p:pic>
+    </p:spTree>
+  </p:cSld>
+</p:sld>
+</file>
+
+<file path=ppt/slides/slide34.xml><?xml version="1.0" encoding="utf-8"?>
+<p:sld xmlns:a="http://schemas.openxmlformats.org/drawingml/2006/main" xmlns:r="http://schemas.openxmlformats.org/officeDocument/2006/relationships" xmlns:p="http://schemas.openxmlformats.org/presentationml/2006/main">
+  <p:cSld>
+    <p:spTree>
+      <p:nvGrpSpPr>
+        <p:cNvPr id="1" name=""/>
+        <p:cNvGrpSpPr/>
+        <p:nvPr/>
+      </p:nvGrpSpPr>
+      <p:grpSpPr>
+        <a:xfrm>
+          <a:off x="0" y="0"/>
+          <a:ext cx="0" cy="0"/>
+          <a:chOff x="0" y="0"/>
+          <a:chExt cx="0" cy="0"/>
+        </a:xfrm>
+      </p:grpSpPr>
+      <p:pic>
+        <p:nvPicPr>
+          <p:cNvPr descr="Rceattle-overview-4_17_2025_files/figure-pptx/unnamed-chunk-9-18.png" id="0" name="Picture 1"/>
+          <p:cNvPicPr>
+            <a:picLocks noGrp="1" noChangeAspect="1"/>
+          </p:cNvPicPr>
+          <p:nvPr/>
+        </p:nvPicPr>
+        <p:blipFill>
+          <a:blip r:embed="rId2"/>
+          <a:stretch>
+            <a:fillRect/>
+          </a:stretch>
+        </p:blipFill>
+        <p:spPr bwMode="auto">
+          <a:xfrm>
+            <a:off x="1181100" y="1193800"/>
+            <a:ext cx="6781800" cy="3390900"/>
+          </a:xfrm>
+          <a:prstGeom prst="rect">
+            <a:avLst/>
+          </a:prstGeom>
+          <a:noFill/>
+          <a:ln w="9525">
+            <a:noFill/>
+            <a:headEnd/>
+            <a:tailEnd/>
+          </a:ln>
+        </p:spPr>
+      </p:pic>
+    </p:spTree>
+  </p:cSld>
+</p:sld>
+</file>
+
+<file path=ppt/slides/slide35.xml><?xml version="1.0" encoding="utf-8"?>
+<p:sld xmlns:a="http://schemas.openxmlformats.org/drawingml/2006/main" xmlns:r="http://schemas.openxmlformats.org/officeDocument/2006/relationships" xmlns:p="http://schemas.openxmlformats.org/presentationml/2006/main">
+  <p:cSld>
+    <p:spTree>
+      <p:nvGrpSpPr>
+        <p:cNvPr id="1" name=""/>
+        <p:cNvGrpSpPr/>
+        <p:nvPr/>
+      </p:nvGrpSpPr>
+      <p:grpSpPr>
+        <a:xfrm>
+          <a:off x="0" y="0"/>
+          <a:ext cx="0" cy="0"/>
+          <a:chOff x="0" y="0"/>
+          <a:chExt cx="0" cy="0"/>
+        </a:xfrm>
+      </p:grpSpPr>
+      <p:pic>
+        <p:nvPicPr>
+          <p:cNvPr descr="Rceattle-overview-4_17_2025_files/figure-pptx/unnamed-chunk-9-19.png" id="0" name="Picture 1"/>
+          <p:cNvPicPr>
+            <a:picLocks noGrp="1" noChangeAspect="1"/>
+          </p:cNvPicPr>
+          <p:nvPr/>
+        </p:nvPicPr>
+        <p:blipFill>
+          <a:blip r:embed="rId2"/>
+          <a:stretch>
+            <a:fillRect/>
+          </a:stretch>
+        </p:blipFill>
+        <p:spPr bwMode="auto">
+          <a:xfrm>
+            <a:off x="1181100" y="1193800"/>
+            <a:ext cx="6781800" cy="3390900"/>
+          </a:xfrm>
+          <a:prstGeom prst="rect">
+            <a:avLst/>
+          </a:prstGeom>
+          <a:noFill/>
+          <a:ln w="9525">
+            <a:noFill/>
+            <a:headEnd/>
+            <a:tailEnd/>
+          </a:ln>
+        </p:spPr>
+      </p:pic>
+    </p:spTree>
+  </p:cSld>
+</p:sld>
+</file>
+
+<file path=ppt/slides/slide36.xml><?xml version="1.0" encoding="utf-8"?>
+<p:sld xmlns:a="http://schemas.openxmlformats.org/drawingml/2006/main" xmlns:r="http://schemas.openxmlformats.org/officeDocument/2006/relationships" xmlns:p="http://schemas.openxmlformats.org/presentationml/2006/main">
+  <p:cSld>
+    <p:spTree>
+      <p:nvGrpSpPr>
+        <p:cNvPr id="1" name=""/>
+        <p:cNvGrpSpPr/>
+        <p:nvPr/>
+      </p:nvGrpSpPr>
+      <p:grpSpPr>
+        <a:xfrm>
+          <a:off x="0" y="0"/>
+          <a:ext cx="0" cy="0"/>
+          <a:chOff x="0" y="0"/>
+          <a:chExt cx="0" cy="0"/>
+        </a:xfrm>
+      </p:grpSpPr>
+      <p:pic>
+        <p:nvPicPr>
+          <p:cNvPr descr="Rceattle-overview-4_17_2025_files/figure-pptx/unnamed-chunk-9-20.png" id="0" name="Picture 1"/>
+          <p:cNvPicPr>
+            <a:picLocks noGrp="1" noChangeAspect="1"/>
+          </p:cNvPicPr>
+          <p:nvPr/>
+        </p:nvPicPr>
+        <p:blipFill>
+          <a:blip r:embed="rId2"/>
+          <a:stretch>
+            <a:fillRect/>
+          </a:stretch>
+        </p:blipFill>
+        <p:spPr bwMode="auto">
+          <a:xfrm>
+            <a:off x="1181100" y="1193800"/>
+            <a:ext cx="6781800" cy="3390900"/>
+          </a:xfrm>
+          <a:prstGeom prst="rect">
+            <a:avLst/>
+          </a:prstGeom>
+          <a:noFill/>
+          <a:ln w="9525">
+            <a:noFill/>
+            <a:headEnd/>
+            <a:tailEnd/>
+          </a:ln>
+        </p:spPr>
+      </p:pic>
+    </p:spTree>
+  </p:cSld>
+</p:sld>
+</file>
+
+<file path=ppt/slides/slide37.xml><?xml version="1.0" encoding="utf-8"?>
+<p:sld xmlns:a="http://schemas.openxmlformats.org/drawingml/2006/main" xmlns:r="http://schemas.openxmlformats.org/officeDocument/2006/relationships" xmlns:p="http://schemas.openxmlformats.org/presentationml/2006/main">
+  <p:cSld>
+    <p:spTree>
+      <p:nvGrpSpPr>
+        <p:cNvPr id="1" name=""/>
+        <p:cNvGrpSpPr/>
+        <p:nvPr/>
+      </p:nvGrpSpPr>
+      <p:grpSpPr>
+        <a:xfrm>
+          <a:off x="0" y="0"/>
+          <a:ext cx="0" cy="0"/>
+          <a:chOff x="0" y="0"/>
+          <a:chExt cx="0" cy="0"/>
+        </a:xfrm>
+      </p:grpSpPr>
+      <p:pic>
+        <p:nvPicPr>
+          <p:cNvPr descr="Rceattle-overview-4_17_2025_files/figure-pptx/unnamed-chunk-9-21.png" id="0" name="Picture 1"/>
+          <p:cNvPicPr>
+            <a:picLocks noGrp="1" noChangeAspect="1"/>
+          </p:cNvPicPr>
+          <p:nvPr/>
+        </p:nvPicPr>
+        <p:blipFill>
+          <a:blip r:embed="rId2"/>
+          <a:stretch>
+            <a:fillRect/>
+          </a:stretch>
+        </p:blipFill>
+        <p:spPr bwMode="auto">
+          <a:xfrm>
+            <a:off x="1181100" y="1193800"/>
+            <a:ext cx="6781800" cy="3390900"/>
+          </a:xfrm>
+          <a:prstGeom prst="rect">
+            <a:avLst/>
+          </a:prstGeom>
+          <a:noFill/>
+          <a:ln w="9525">
+            <a:noFill/>
+            <a:headEnd/>
+            <a:tailEnd/>
+          </a:ln>
+        </p:spPr>
+      </p:pic>
+    </p:spTree>
+  </p:cSld>
+</p:sld>
+</file>
+
+<file path=ppt/slides/slide38.xml><?xml version="1.0" encoding="utf-8"?>
+<p:sld xmlns:a="http://schemas.openxmlformats.org/drawingml/2006/main" xmlns:r="http://schemas.openxmlformats.org/officeDocument/2006/relationships" xmlns:p="http://schemas.openxmlformats.org/presentationml/2006/main">
+  <p:cSld>
+    <p:spTree>
+      <p:nvGrpSpPr>
+        <p:cNvPr id="1" name=""/>
+        <p:cNvGrpSpPr/>
+        <p:nvPr/>
+      </p:nvGrpSpPr>
+      <p:grpSpPr>
+        <a:xfrm>
+          <a:off x="0" y="0"/>
+          <a:ext cx="0" cy="0"/>
+          <a:chOff x="0" y="0"/>
+          <a:chExt cx="0" cy="0"/>
+        </a:xfrm>
+      </p:grpSpPr>
+      <p:sp>
+        <p:nvSpPr>
+          <p:cNvPr id="2" name="Title 1"/>
+          <p:cNvSpPr>
+            <a:spLocks noGrp="1"/>
+          </p:cNvSpPr>
+          <p:nvPr>
+            <p:ph type="title"/>
+          </p:nvPr>
+        </p:nvSpPr>
+        <p:spPr>
+          <a:xfrm>
+            <a:off x="457201" y="204787"/>
+            <a:ext cx="3008313" cy="871538"/>
+          </a:xfrm>
+        </p:spPr>
+        <p:txBody>
+          <a:bodyPr/>
+          <a:lstStyle/>
+          <a:p>
+            <a:pPr lvl="0" indent="0" marL="0">
+              <a:buNone/>
+            </a:pPr>
+            <a:r>
+              <a:rPr/>
+              <a:t>Retrospectives</a:t>
+            </a:r>
+          </a:p>
+        </p:txBody>
+      </p:sp>
+      <p:sp>
+        <p:nvSpPr>
+          <p:cNvPr id="4" name="Text Placeholder 3"/>
+          <p:cNvSpPr>
+            <a:spLocks noGrp="1"/>
+          </p:cNvSpPr>
+          <p:nvPr>
+            <p:ph idx="2" sz="half" type="body"/>
+          </p:nvPr>
+        </p:nvSpPr>
+        <p:spPr/>
+        <p:txBody>
+          <a:bodyPr/>
+          <a:lstStyle/>
+          <a:p>
+            <a:pPr lvl="0" indent="0">
+              <a:buNone/>
+            </a:pPr>
+            <a:r>
+              <a:rPr>
+                <a:solidFill>
+                  <a:srgbClr val="003B4F"/>
+                </a:solidFill>
+                <a:latin typeface="Courier"/>
+              </a:rPr>
+              <a:t>retro &lt;- </a:t>
+            </a:r>
+            <a:r>
+              <a:rPr>
+                <a:solidFill>
+                  <a:srgbClr val="4758AB"/>
+                </a:solidFill>
+                <a:latin typeface="Courier"/>
+              </a:rPr>
+              <a:t>retrospective</a:t>
+            </a:r>
+            <a:r>
+              <a:rPr>
+                <a:solidFill>
+                  <a:srgbClr val="003B4F"/>
+                </a:solidFill>
+                <a:latin typeface="Courier"/>
+              </a:rPr>
+              <a:t>(mymodel, </a:t>
+            </a:r>
+            <a:r>
+              <a:rPr>
+                <a:solidFill>
+                  <a:srgbClr val="657422"/>
+                </a:solidFill>
+                <a:latin typeface="Courier"/>
+              </a:rPr>
+              <a:t>peels =</a:t>
+            </a:r>
+            <a:r>
+              <a:rPr>
+                <a:solidFill>
+                  <a:srgbClr val="003B4F"/>
+                </a:solidFill>
+                <a:latin typeface="Courier"/>
+              </a:rPr>
+              <a:t> </a:t>
+            </a:r>
+            <a:r>
+              <a:rPr>
+                <a:solidFill>
+                  <a:srgbClr val="AD0000"/>
+                </a:solidFill>
+                <a:latin typeface="Courier"/>
+              </a:rPr>
+              <a:t>6</a:t>
+            </a:r>
+            <a:r>
+              <a:rPr>
+                <a:solidFill>
+                  <a:srgbClr val="003B4F"/>
+                </a:solidFill>
+                <a:latin typeface="Courier"/>
+              </a:rPr>
+              <a:t>)</a:t>
+            </a:r>
+            <a:br/>
+            <a:r>
+              <a:rPr>
+                <a:solidFill>
+                  <a:srgbClr val="4758AB"/>
+                </a:solidFill>
+                <a:latin typeface="Courier"/>
+              </a:rPr>
+              <a:t>plot_biomass</a:t>
+            </a:r>
+            <a:r>
+              <a:rPr>
+                <a:solidFill>
+                  <a:srgbClr val="003B4F"/>
+                </a:solidFill>
+                <a:latin typeface="Courier"/>
+              </a:rPr>
+              <a:t>(retro</a:t>
+            </a:r>
+            <a:r>
+              <a:rPr>
+                <a:solidFill>
+                  <a:srgbClr val="5E5E5E"/>
+                </a:solidFill>
+                <a:latin typeface="Courier"/>
+              </a:rPr>
+              <a:t>$</a:t>
+            </a:r>
+            <a:r>
+              <a:rPr>
+                <a:solidFill>
+                  <a:srgbClr val="003B4F"/>
+                </a:solidFill>
+                <a:latin typeface="Courier"/>
+              </a:rPr>
+              <a:t>Rceattle_list, </a:t>
+            </a:r>
+            <a:r>
+              <a:rPr>
+                <a:solidFill>
+                  <a:srgbClr val="657422"/>
+                </a:solidFill>
+                <a:latin typeface="Courier"/>
+              </a:rPr>
+              <a:t>species =</a:t>
+            </a:r>
+            <a:r>
+              <a:rPr>
+                <a:solidFill>
+                  <a:srgbClr val="003B4F"/>
+                </a:solidFill>
+                <a:latin typeface="Courier"/>
+              </a:rPr>
+              <a:t> </a:t>
+            </a:r>
+            <a:r>
+              <a:rPr>
+                <a:solidFill>
+                  <a:srgbClr val="AD0000"/>
+                </a:solidFill>
+                <a:latin typeface="Courier"/>
+              </a:rPr>
+              <a:t>1</a:t>
+            </a:r>
+            <a:r>
+              <a:rPr>
+                <a:solidFill>
+                  <a:srgbClr val="003B4F"/>
+                </a:solidFill>
+                <a:latin typeface="Courier"/>
+              </a:rPr>
+              <a:t>)</a:t>
+            </a:r>
+          </a:p>
+        </p:txBody>
+      </p:sp>
+      <p:pic>
+        <p:nvPicPr>
+          <p:cNvPr descr="Rceattle-overview-4_17_2025_files/figure-pptx/unnamed-chunk-10-1.png" id="0" name="Picture 1"/>
+          <p:cNvPicPr>
+            <a:picLocks noGrp="1" noChangeAspect="1"/>
+          </p:cNvPicPr>
+          <p:nvPr/>
+        </p:nvPicPr>
+        <p:blipFill>
+          <a:blip r:embed="rId2"/>
+          <a:stretch>
+            <a:fillRect/>
+          </a:stretch>
+        </p:blipFill>
+        <p:spPr bwMode="auto">
+          <a:xfrm>
+            <a:off x="3568700" y="1117600"/>
+            <a:ext cx="5105400" cy="2552700"/>
+          </a:xfrm>
+          <a:prstGeom prst="rect">
+            <a:avLst/>
+          </a:prstGeom>
+          <a:noFill/>
+          <a:ln w="9525">
+            <a:noFill/>
+            <a:headEnd/>
+            <a:tailEnd/>
+          </a:ln>
+        </p:spPr>
+      </p:pic>
+    </p:spTree>
+  </p:cSld>
+</p:sld>
+</file>
+
+<file path=ppt/slides/slide39.xml><?xml version="1.0" encoding="utf-8"?>
+<p:sld xmlns:a="http://schemas.openxmlformats.org/drawingml/2006/main" xmlns:r="http://schemas.openxmlformats.org/officeDocument/2006/relationships" xmlns:p="http://schemas.openxmlformats.org/presentationml/2006/main">
+  <p:cSld>
+    <p:spTree>
+      <p:nvGrpSpPr>
+        <p:cNvPr id="1" name=""/>
+        <p:cNvGrpSpPr/>
+        <p:nvPr/>
+      </p:nvGrpSpPr>
+      <p:grpSpPr>
+        <a:xfrm>
+          <a:off x="0" y="0"/>
+          <a:ext cx="0" cy="0"/>
+          <a:chOff x="0" y="0"/>
+          <a:chExt cx="0" cy="0"/>
+        </a:xfrm>
+      </p:grpSpPr>
+    </p:spTree>
+  </p:cSld>
+</p:sld>
+</file>
+
 <file path=ppt/slides/slide4.xml><?xml version="1.0" encoding="utf-8"?>
 <p:sld xmlns:a="http://schemas.openxmlformats.org/drawingml/2006/main" xmlns:r="http://schemas.openxmlformats.org/officeDocument/2006/relationships" xmlns:p="http://schemas.openxmlformats.org/presentationml/2006/main">
   <p:cSld>
@@ -5673,6 +7465,682 @@
           </a:p>
         </p:txBody>
       </p:sp>
+    </p:spTree>
+  </p:cSld>
+</p:sld>
+</file>
+
+<file path=ppt/slides/slide40.xml><?xml version="1.0" encoding="utf-8"?>
+<p:sld xmlns:a="http://schemas.openxmlformats.org/drawingml/2006/main" xmlns:r="http://schemas.openxmlformats.org/officeDocument/2006/relationships" xmlns:p="http://schemas.openxmlformats.org/presentationml/2006/main">
+  <p:cSld>
+    <p:spTree>
+      <p:nvGrpSpPr>
+        <p:cNvPr id="1" name=""/>
+        <p:cNvGrpSpPr/>
+        <p:nvPr/>
+      </p:nvGrpSpPr>
+      <p:grpSpPr>
+        <a:xfrm>
+          <a:off x="0" y="0"/>
+          <a:ext cx="0" cy="0"/>
+          <a:chOff x="0" y="0"/>
+          <a:chExt cx="0" cy="0"/>
+        </a:xfrm>
+      </p:grpSpPr>
+      <p:sp>
+        <p:nvSpPr>
+          <p:cNvPr id="2" name="Title 1"/>
+          <p:cNvSpPr>
+            <a:spLocks noGrp="1"/>
+          </p:cNvSpPr>
+          <p:nvPr>
+            <p:ph type="title"/>
+          </p:nvPr>
+        </p:nvSpPr>
+        <p:spPr/>
+        <p:txBody>
+          <a:bodyPr/>
+          <a:lstStyle/>
+          <a:p>
+            <a:pPr lvl="0" indent="0" marL="0">
+              <a:buNone/>
+            </a:pPr>
+            <a:r>
+              <a:rPr/>
+              <a:t>MSE</a:t>
+            </a:r>
+          </a:p>
+        </p:txBody>
+      </p:sp>
+      <p:sp>
+        <p:nvSpPr>
+          <p:cNvPr id="3" name="Content Placeholder 2"/>
+          <p:cNvSpPr>
+            <a:spLocks noGrp="1"/>
+          </p:cNvSpPr>
+          <p:nvPr>
+            <p:ph idx="1"/>
+          </p:nvPr>
+        </p:nvSpPr>
+        <p:spPr/>
+        <p:txBody>
+          <a:bodyPr/>
+          <a:lstStyle/>
+          <a:p>
+            <a:pPr lvl="0" indent="0">
+              <a:buNone/>
+            </a:pPr>
+            <a:r>
+              <a:rPr>
+                <a:solidFill>
+                  <a:srgbClr val="5E5E5E"/>
+                </a:solidFill>
+                <a:latin typeface="Courier"/>
+              </a:rPr>
+              <a:t># ?run_mse for more options</a:t>
+            </a:r>
+            <a:br/>
+            <a:br/>
+            <a:r>
+              <a:rPr>
+                <a:solidFill>
+                  <a:srgbClr val="003B4F"/>
+                </a:solidFill>
+                <a:latin typeface="Courier"/>
+              </a:rPr>
+              <a:t>mse &lt;- </a:t>
+            </a:r>
+            <a:r>
+              <a:rPr>
+                <a:solidFill>
+                  <a:srgbClr val="4758AB"/>
+                </a:solidFill>
+                <a:latin typeface="Courier"/>
+              </a:rPr>
+              <a:t>run_mse</a:t>
+            </a:r>
+            <a:r>
+              <a:rPr>
+                <a:solidFill>
+                  <a:srgbClr val="003B4F"/>
+                </a:solidFill>
+                <a:latin typeface="Courier"/>
+              </a:rPr>
+              <a:t>(</a:t>
+            </a:r>
+            <a:br/>
+            <a:r>
+              <a:rPr>
+                <a:solidFill>
+                  <a:srgbClr val="003B4F"/>
+                </a:solidFill>
+                <a:latin typeface="Courier"/>
+              </a:rPr>
+              <a:t>  </a:t>
+            </a:r>
+            <a:r>
+              <a:rPr>
+                <a:solidFill>
+                  <a:srgbClr val="657422"/>
+                </a:solidFill>
+                <a:latin typeface="Courier"/>
+              </a:rPr>
+              <a:t>om =</a:t>
+            </a:r>
+            <a:r>
+              <a:rPr>
+                <a:solidFill>
+                  <a:srgbClr val="003B4F"/>
+                </a:solidFill>
+                <a:latin typeface="Courier"/>
+              </a:rPr>
+              <a:t> mymodel, </a:t>
+            </a:r>
+            <a:br/>
+            <a:r>
+              <a:rPr>
+                <a:solidFill>
+                  <a:srgbClr val="003B4F"/>
+                </a:solidFill>
+                <a:latin typeface="Courier"/>
+              </a:rPr>
+              <a:t>  </a:t>
+            </a:r>
+            <a:r>
+              <a:rPr>
+                <a:solidFill>
+                  <a:srgbClr val="657422"/>
+                </a:solidFill>
+                <a:latin typeface="Courier"/>
+              </a:rPr>
+              <a:t>em =</a:t>
+            </a:r>
+            <a:r>
+              <a:rPr>
+                <a:solidFill>
+                  <a:srgbClr val="003B4F"/>
+                </a:solidFill>
+                <a:latin typeface="Courier"/>
+              </a:rPr>
+              <a:t> mymodel_tier3, </a:t>
+            </a:r>
+            <a:br/>
+            <a:r>
+              <a:rPr>
+                <a:solidFill>
+                  <a:srgbClr val="003B4F"/>
+                </a:solidFill>
+                <a:latin typeface="Courier"/>
+              </a:rPr>
+              <a:t>  </a:t>
+            </a:r>
+            <a:r>
+              <a:rPr>
+                <a:solidFill>
+                  <a:srgbClr val="657422"/>
+                </a:solidFill>
+                <a:latin typeface="Courier"/>
+              </a:rPr>
+              <a:t>nsim =</a:t>
+            </a:r>
+            <a:r>
+              <a:rPr>
+                <a:solidFill>
+                  <a:srgbClr val="003B4F"/>
+                </a:solidFill>
+                <a:latin typeface="Courier"/>
+              </a:rPr>
+              <a:t> </a:t>
+            </a:r>
+            <a:r>
+              <a:rPr>
+                <a:solidFill>
+                  <a:srgbClr val="AD0000"/>
+                </a:solidFill>
+                <a:latin typeface="Courier"/>
+              </a:rPr>
+              <a:t>1</a:t>
+            </a:r>
+            <a:r>
+              <a:rPr>
+                <a:solidFill>
+                  <a:srgbClr val="003B4F"/>
+                </a:solidFill>
+                <a:latin typeface="Courier"/>
+              </a:rPr>
+              <a:t>, </a:t>
+            </a:r>
+            <a:br/>
+            <a:r>
+              <a:rPr>
+                <a:solidFill>
+                  <a:srgbClr val="003B4F"/>
+                </a:solidFill>
+                <a:latin typeface="Courier"/>
+              </a:rPr>
+              <a:t>  </a:t>
+            </a:r>
+            <a:r>
+              <a:rPr>
+                <a:solidFill>
+                  <a:srgbClr val="657422"/>
+                </a:solidFill>
+                <a:latin typeface="Courier"/>
+              </a:rPr>
+              <a:t>simulate_data =</a:t>
+            </a:r>
+            <a:r>
+              <a:rPr>
+                <a:solidFill>
+                  <a:srgbClr val="003B4F"/>
+                </a:solidFill>
+                <a:latin typeface="Courier"/>
+              </a:rPr>
+              <a:t> </a:t>
+            </a:r>
+            <a:r>
+              <a:rPr>
+                <a:solidFill>
+                  <a:srgbClr val="8F5902"/>
+                </a:solidFill>
+                <a:latin typeface="Courier"/>
+              </a:rPr>
+              <a:t>TRUE</a:t>
+            </a:r>
+            <a:r>
+              <a:rPr>
+                <a:solidFill>
+                  <a:srgbClr val="003B4F"/>
+                </a:solidFill>
+                <a:latin typeface="Courier"/>
+              </a:rPr>
+              <a:t>, </a:t>
+            </a:r>
+            <a:br/>
+            <a:r>
+              <a:rPr>
+                <a:solidFill>
+                  <a:srgbClr val="003B4F"/>
+                </a:solidFill>
+                <a:latin typeface="Courier"/>
+              </a:rPr>
+              <a:t>  </a:t>
+            </a:r>
+            <a:r>
+              <a:rPr>
+                <a:solidFill>
+                  <a:srgbClr val="657422"/>
+                </a:solidFill>
+                <a:latin typeface="Courier"/>
+              </a:rPr>
+              <a:t>sample_rec =</a:t>
+            </a:r>
+            <a:r>
+              <a:rPr>
+                <a:solidFill>
+                  <a:srgbClr val="003B4F"/>
+                </a:solidFill>
+                <a:latin typeface="Courier"/>
+              </a:rPr>
+              <a:t> </a:t>
+            </a:r>
+            <a:r>
+              <a:rPr>
+                <a:solidFill>
+                  <a:srgbClr val="8F5902"/>
+                </a:solidFill>
+                <a:latin typeface="Courier"/>
+              </a:rPr>
+              <a:t>FALSE</a:t>
+            </a:r>
+            <a:r>
+              <a:rPr>
+                <a:solidFill>
+                  <a:srgbClr val="003B4F"/>
+                </a:solidFill>
+                <a:latin typeface="Courier"/>
+              </a:rPr>
+              <a:t>)</a:t>
+            </a:r>
+          </a:p>
+        </p:txBody>
+      </p:sp>
+    </p:spTree>
+  </p:cSld>
+</p:sld>
+</file>
+
+<file path=ppt/slides/slide41.xml><?xml version="1.0" encoding="utf-8"?>
+<p:sld xmlns:a="http://schemas.openxmlformats.org/drawingml/2006/main" xmlns:r="http://schemas.openxmlformats.org/officeDocument/2006/relationships" xmlns:p="http://schemas.openxmlformats.org/presentationml/2006/main">
+  <p:cSld>
+    <p:spTree>
+      <p:nvGrpSpPr>
+        <p:cNvPr id="1" name=""/>
+        <p:cNvGrpSpPr/>
+        <p:nvPr/>
+      </p:nvGrpSpPr>
+      <p:grpSpPr>
+        <a:xfrm>
+          <a:off x="0" y="0"/>
+          <a:ext cx="0" cy="0"/>
+          <a:chOff x="0" y="0"/>
+          <a:chExt cx="0" cy="0"/>
+        </a:xfrm>
+      </p:grpSpPr>
+      <p:sp>
+        <p:nvSpPr>
+          <p:cNvPr id="3" name="Text Placeholder 2"/>
+          <p:cNvSpPr>
+            <a:spLocks noGrp="1"/>
+          </p:cNvSpPr>
+          <p:nvPr>
+            <p:ph idx="1" type="body"/>
+          </p:nvPr>
+        </p:nvSpPr>
+        <p:spPr/>
+        <p:txBody>
+          <a:bodyPr/>
+          <a:lstStyle/>
+          <a:p>
+            <a:pPr lvl="0" indent="0">
+              <a:buNone/>
+            </a:pPr>
+            <a:r>
+              <a:rPr>
+                <a:solidFill>
+                  <a:srgbClr val="4758AB"/>
+                </a:solidFill>
+                <a:latin typeface="Courier"/>
+              </a:rPr>
+              <a:t>plot_depletionSSB</a:t>
+            </a:r>
+            <a:r>
+              <a:rPr>
+                <a:solidFill>
+                  <a:srgbClr val="003B4F"/>
+                </a:solidFill>
+                <a:latin typeface="Courier"/>
+              </a:rPr>
+              <a:t>(mse</a:t>
+            </a:r>
+            <a:r>
+              <a:rPr>
+                <a:solidFill>
+                  <a:srgbClr val="5E5E5E"/>
+                </a:solidFill>
+                <a:latin typeface="Courier"/>
+              </a:rPr>
+              <a:t>$</a:t>
+            </a:r>
+            <a:r>
+              <a:rPr>
+                <a:solidFill>
+                  <a:srgbClr val="003B4F"/>
+                </a:solidFill>
+                <a:latin typeface="Courier"/>
+              </a:rPr>
+              <a:t>Sim_1</a:t>
+            </a:r>
+            <a:r>
+              <a:rPr>
+                <a:solidFill>
+                  <a:srgbClr val="5E5E5E"/>
+                </a:solidFill>
+                <a:latin typeface="Courier"/>
+              </a:rPr>
+              <a:t>$</a:t>
+            </a:r>
+            <a:r>
+              <a:rPr>
+                <a:solidFill>
+                  <a:srgbClr val="003B4F"/>
+                </a:solidFill>
+                <a:latin typeface="Courier"/>
+              </a:rPr>
+              <a:t>OM, </a:t>
+            </a:r>
+            <a:r>
+              <a:rPr>
+                <a:solidFill>
+                  <a:srgbClr val="657422"/>
+                </a:solidFill>
+                <a:latin typeface="Courier"/>
+              </a:rPr>
+              <a:t>species =</a:t>
+            </a:r>
+            <a:r>
+              <a:rPr>
+                <a:solidFill>
+                  <a:srgbClr val="003B4F"/>
+                </a:solidFill>
+                <a:latin typeface="Courier"/>
+              </a:rPr>
+              <a:t> </a:t>
+            </a:r>
+            <a:r>
+              <a:rPr>
+                <a:solidFill>
+                  <a:srgbClr val="AD0000"/>
+                </a:solidFill>
+                <a:latin typeface="Courier"/>
+              </a:rPr>
+              <a:t>1</a:t>
+            </a:r>
+            <a:r>
+              <a:rPr>
+                <a:solidFill>
+                  <a:srgbClr val="003B4F"/>
+                </a:solidFill>
+                <a:latin typeface="Courier"/>
+              </a:rPr>
+              <a:t>, </a:t>
+            </a:r>
+            <a:r>
+              <a:rPr>
+                <a:solidFill>
+                  <a:srgbClr val="657422"/>
+                </a:solidFill>
+                <a:latin typeface="Courier"/>
+              </a:rPr>
+              <a:t>model_names =</a:t>
+            </a:r>
+            <a:r>
+              <a:rPr>
+                <a:solidFill>
+                  <a:srgbClr val="003B4F"/>
+                </a:solidFill>
+                <a:latin typeface="Courier"/>
+              </a:rPr>
+              <a:t> </a:t>
+            </a:r>
+            <a:r>
+              <a:rPr>
+                <a:solidFill>
+                  <a:srgbClr val="20794D"/>
+                </a:solidFill>
+                <a:latin typeface="Courier"/>
+              </a:rPr>
+              <a:t>"OM"</a:t>
+            </a:r>
+            <a:r>
+              <a:rPr>
+                <a:solidFill>
+                  <a:srgbClr val="003B4F"/>
+                </a:solidFill>
+                <a:latin typeface="Courier"/>
+              </a:rPr>
+              <a:t>)</a:t>
+            </a:r>
+          </a:p>
+        </p:txBody>
+      </p:sp>
+      <p:pic>
+        <p:nvPicPr>
+          <p:cNvPr descr="Rceattle-overview-4_17_2025_files/figure-pptx/unnamed-chunk-12-1.png" id="0" name="Picture 1"/>
+          <p:cNvPicPr>
+            <a:picLocks noGrp="1" noChangeAspect="1"/>
+          </p:cNvPicPr>
+          <p:nvPr/>
+        </p:nvPicPr>
+        <p:blipFill>
+          <a:blip r:embed="rId2"/>
+          <a:stretch>
+            <a:fillRect/>
+          </a:stretch>
+        </p:blipFill>
+        <p:spPr bwMode="auto">
+          <a:xfrm>
+            <a:off x="457200" y="2095500"/>
+            <a:ext cx="4038600" cy="2019300"/>
+          </a:xfrm>
+          <a:prstGeom prst="rect">
+            <a:avLst/>
+          </a:prstGeom>
+          <a:noFill/>
+          <a:ln w="9525">
+            <a:noFill/>
+            <a:headEnd/>
+            <a:tailEnd/>
+          </a:ln>
+        </p:spPr>
+      </p:pic>
+      <p:sp>
+        <p:nvSpPr>
+          <p:cNvPr id="5" name="Text Placeholder 4"/>
+          <p:cNvSpPr>
+            <a:spLocks noGrp="1"/>
+          </p:cNvSpPr>
+          <p:nvPr>
+            <p:ph idx="3" sz="quarter" type="body"/>
+          </p:nvPr>
+        </p:nvSpPr>
+        <p:spPr/>
+        <p:txBody>
+          <a:bodyPr/>
+          <a:lstStyle/>
+          <a:p>
+            <a:pPr lvl="0" indent="0">
+              <a:buNone/>
+            </a:pPr>
+            <a:r>
+              <a:rPr>
+                <a:solidFill>
+                  <a:srgbClr val="4758AB"/>
+                </a:solidFill>
+                <a:latin typeface="Courier"/>
+              </a:rPr>
+              <a:t>plot_depletionSSB</a:t>
+            </a:r>
+            <a:r>
+              <a:rPr>
+                <a:solidFill>
+                  <a:srgbClr val="003B4F"/>
+                </a:solidFill>
+                <a:latin typeface="Courier"/>
+              </a:rPr>
+              <a:t>(mse</a:t>
+            </a:r>
+            <a:r>
+              <a:rPr>
+                <a:solidFill>
+                  <a:srgbClr val="5E5E5E"/>
+                </a:solidFill>
+                <a:latin typeface="Courier"/>
+              </a:rPr>
+              <a:t>$</a:t>
+            </a:r>
+            <a:r>
+              <a:rPr>
+                <a:solidFill>
+                  <a:srgbClr val="003B4F"/>
+                </a:solidFill>
+                <a:latin typeface="Courier"/>
+              </a:rPr>
+              <a:t>Sim_1</a:t>
+            </a:r>
+            <a:r>
+              <a:rPr>
+                <a:solidFill>
+                  <a:srgbClr val="5E5E5E"/>
+                </a:solidFill>
+                <a:latin typeface="Courier"/>
+              </a:rPr>
+              <a:t>$</a:t>
+            </a:r>
+            <a:r>
+              <a:rPr>
+                <a:solidFill>
+                  <a:srgbClr val="003B4F"/>
+                </a:solidFill>
+                <a:latin typeface="Courier"/>
+              </a:rPr>
+              <a:t>EM, </a:t>
+            </a:r>
+            <a:r>
+              <a:rPr>
+                <a:solidFill>
+                  <a:srgbClr val="657422"/>
+                </a:solidFill>
+                <a:latin typeface="Courier"/>
+              </a:rPr>
+              <a:t>species =</a:t>
+            </a:r>
+            <a:r>
+              <a:rPr>
+                <a:solidFill>
+                  <a:srgbClr val="003B4F"/>
+                </a:solidFill>
+                <a:latin typeface="Courier"/>
+              </a:rPr>
+              <a:t> </a:t>
+            </a:r>
+            <a:r>
+              <a:rPr>
+                <a:solidFill>
+                  <a:srgbClr val="AD0000"/>
+                </a:solidFill>
+                <a:latin typeface="Courier"/>
+              </a:rPr>
+              <a:t>1</a:t>
+            </a:r>
+            <a:r>
+              <a:rPr>
+                <a:solidFill>
+                  <a:srgbClr val="003B4F"/>
+                </a:solidFill>
+                <a:latin typeface="Courier"/>
+              </a:rPr>
+              <a:t>, </a:t>
+            </a:r>
+            <a:r>
+              <a:rPr>
+                <a:solidFill>
+                  <a:srgbClr val="657422"/>
+                </a:solidFill>
+                <a:latin typeface="Courier"/>
+              </a:rPr>
+              <a:t>model_names =</a:t>
+            </a:r>
+            <a:r>
+              <a:rPr>
+                <a:solidFill>
+                  <a:srgbClr val="003B4F"/>
+                </a:solidFill>
+                <a:latin typeface="Courier"/>
+              </a:rPr>
+              <a:t> </a:t>
+            </a:r>
+            <a:r>
+              <a:rPr>
+                <a:solidFill>
+                  <a:srgbClr val="20794D"/>
+                </a:solidFill>
+                <a:latin typeface="Courier"/>
+              </a:rPr>
+              <a:t>"EMs"</a:t>
+            </a:r>
+            <a:r>
+              <a:rPr>
+                <a:solidFill>
+                  <a:srgbClr val="003B4F"/>
+                </a:solidFill>
+                <a:latin typeface="Courier"/>
+              </a:rPr>
+              <a:t>)</a:t>
+            </a:r>
+          </a:p>
+        </p:txBody>
+      </p:sp>
+      <p:pic>
+        <p:nvPicPr>
+          <p:cNvPr descr="Rceattle-overview-4_17_2025_files/figure-pptx/unnamed-chunk-13-1.png" id="0" name="Picture 1"/>
+          <p:cNvPicPr>
+            <a:picLocks noGrp="1" noChangeAspect="1"/>
+          </p:cNvPicPr>
+          <p:nvPr/>
+        </p:nvPicPr>
+        <p:blipFill>
+          <a:blip r:embed="rId3"/>
+          <a:stretch>
+            <a:fillRect/>
+          </a:stretch>
+        </p:blipFill>
+        <p:spPr bwMode="auto">
+          <a:xfrm>
+            <a:off x="4635500" y="2095500"/>
+            <a:ext cx="4038600" cy="2019300"/>
+          </a:xfrm>
+          <a:prstGeom prst="rect">
+            <a:avLst/>
+          </a:prstGeom>
+          <a:noFill/>
+          <a:ln w="9525">
+            <a:noFill/>
+            <a:headEnd/>
+            <a:tailEnd/>
+          </a:ln>
+        </p:spPr>
+      </p:pic>
     </p:spTree>
   </p:cSld>
 </p:sld>

</xml_diff>

<commit_message>
plotting function clean up for array sizing
</commit_message>
<xml_diff>
--- a/vignettes/Rceattle overview 4_17_2025.pptx
+++ b/vignettes/Rceattle overview 4_17_2025.pptx
@@ -46,6 +46,8 @@
     <p:sldId id="294" r:id="rId40"/>
     <p:sldId id="295" r:id="rId41"/>
     <p:sldId id="296" r:id="rId42"/>
+    <p:sldId id="297" r:id="rId43"/>
+    <p:sldId id="298" r:id="rId44"/>
   </p:sldIdLst>
   <p:sldSz cx="9144000" cy="5143500" type="screen16x9"/>
   <p:notesSz cx="6858000" cy="9144000"/>
@@ -3216,6 +3218,31 @@
       </p:grpSpPr>
       <p:sp>
         <p:nvSpPr>
+          <p:cNvPr id="2" name="Title 1"/>
+          <p:cNvSpPr>
+            <a:spLocks noGrp="1"/>
+          </p:cNvSpPr>
+          <p:nvPr>
+            <p:ph type="title"/>
+          </p:nvPr>
+        </p:nvSpPr>
+        <p:spPr/>
+        <p:txBody>
+          <a:bodyPr/>
+          <a:lstStyle/>
+          <a:p>
+            <a:pPr lvl="0" indent="0" marL="0">
+              <a:buNone/>
+            </a:pPr>
+            <a:r>
+              <a:rPr/>
+              <a:t>Basic excel data</a:t>
+            </a:r>
+          </a:p>
+        </p:txBody>
+      </p:sp>
+      <p:sp>
+        <p:nvSpPr>
           <p:cNvPr id="3" name="Content Placeholder 2"/>
           <p:cNvSpPr>
             <a:spLocks noGrp="1"/>
@@ -3229,12 +3256,66 @@
           <a:bodyPr/>
           <a:lstStyle/>
           <a:p>
-            <a:pPr lvl="0" indent="0" marL="0">
-              <a:buNone/>
-            </a:pPr>
+            <a:pPr lvl="0"/>
             <a:r>
               <a:rPr/>
-              <a:t>:::</a:t>
+              <a:t>meta_data: overview and description</a:t>
+            </a:r>
+          </a:p>
+          <a:p>
+            <a:pPr lvl="0"/>
+            <a:r>
+              <a:rPr/>
+              <a:t>control: species, year, age, length</a:t>
+            </a:r>
+          </a:p>
+          <a:p>
+            <a:pPr lvl="0"/>
+            <a:r>
+              <a:rPr/>
+              <a:t>fleet_control: observation model specification</a:t>
+            </a:r>
+          </a:p>
+          <a:p>
+            <a:pPr lvl="0"/>
+            <a:r>
+              <a:rPr/>
+              <a:t>index_data: survey or fishery indices (biomass/numbers)</a:t>
+            </a:r>
+          </a:p>
+          <a:p>
+            <a:pPr lvl="0"/>
+            <a:r>
+              <a:rPr/>
+              <a:t>catch_data: fishery catches</a:t>
+            </a:r>
+          </a:p>
+          <a:p>
+            <a:pPr lvl="0"/>
+            <a:r>
+              <a:rPr/>
+              <a:t>comp_data: age/length comp</a:t>
+            </a:r>
+          </a:p>
+          <a:p>
+            <a:pPr lvl="0"/>
+            <a:r>
+              <a:rPr/>
+              <a:t>weight: empirical weight-at-age (time-varying, fleet specific)</a:t>
+            </a:r>
+          </a:p>
+          <a:p>
+            <a:pPr lvl="0"/>
+            <a:r>
+              <a:rPr/>
+              <a:t>maturity: maturity-at-age (time-invariant)</a:t>
+            </a:r>
+          </a:p>
+          <a:p>
+            <a:pPr lvl="0"/>
+            <a:r>
+              <a:rPr/>
+              <a:t>sex_ratio: sex-ratio-at-age (time-invariant)</a:t>
             </a:r>
           </a:p>
         </p:txBody>
@@ -3245,6 +3326,241 @@
 </file>
 
 <file path=ppt/slides/slide11.xml><?xml version="1.0" encoding="utf-8"?>
+<p:sld xmlns:a="http://schemas.openxmlformats.org/drawingml/2006/main" xmlns:r="http://schemas.openxmlformats.org/officeDocument/2006/relationships" xmlns:p="http://schemas.openxmlformats.org/presentationml/2006/main">
+  <p:cSld>
+    <p:spTree>
+      <p:nvGrpSpPr>
+        <p:cNvPr id="1" name=""/>
+        <p:cNvGrpSpPr/>
+        <p:nvPr/>
+      </p:nvGrpSpPr>
+      <p:grpSpPr>
+        <a:xfrm>
+          <a:off x="0" y="0"/>
+          <a:ext cx="0" cy="0"/>
+          <a:chOff x="0" y="0"/>
+          <a:chExt cx="0" cy="0"/>
+        </a:xfrm>
+      </p:grpSpPr>
+      <p:sp>
+        <p:nvSpPr>
+          <p:cNvPr id="2" name="Title 1"/>
+          <p:cNvSpPr>
+            <a:spLocks noGrp="1"/>
+          </p:cNvSpPr>
+          <p:nvPr>
+            <p:ph type="title"/>
+          </p:nvPr>
+        </p:nvSpPr>
+        <p:spPr/>
+        <p:txBody>
+          <a:bodyPr/>
+          <a:lstStyle/>
+          <a:p>
+            <a:pPr lvl="0" indent="0" marL="0">
+              <a:buNone/>
+            </a:pPr>
+            <a:r>
+              <a:rPr/>
+              <a:t>Selectivity specifications (</a:t>
+            </a:r>
+            <a:r>
+              <a:rPr>
+                <a:latin typeface="Courier"/>
+              </a:rPr>
+              <a:t>fleet_control</a:t>
+            </a:r>
+            <a:r>
+              <a:rPr/>
+              <a:t>)</a:t>
+            </a:r>
+          </a:p>
+        </p:txBody>
+      </p:sp>
+      <p:sp>
+        <p:nvSpPr>
+          <p:cNvPr id="3" name="Content Placeholder 2"/>
+          <p:cNvSpPr>
+            <a:spLocks noGrp="1"/>
+          </p:cNvSpPr>
+          <p:nvPr>
+            <p:ph idx="1" sz="half"/>
+          </p:nvPr>
+        </p:nvSpPr>
+        <p:spPr/>
+        <p:txBody>
+          <a:bodyPr/>
+          <a:lstStyle/>
+          <a:p>
+            <a:pPr lvl="0" indent="0" marL="0">
+              <a:buNone/>
+            </a:pPr>
+            <a:r>
+              <a:rPr>
+                <a:latin typeface="Courier"/>
+              </a:rPr>
+              <a:t>selectivity</a:t>
+            </a:r>
+          </a:p>
+          <a:p>
+            <a:pPr lvl="0"/>
+            <a:r>
+              <a:rPr/>
+              <a:t>0: empirical selectivity</a:t>
+            </a:r>
+          </a:p>
+          <a:p>
+            <a:pPr lvl="0"/>
+            <a:r>
+              <a:rPr/>
+              <a:t>1: logistic selectivity</a:t>
+            </a:r>
+          </a:p>
+          <a:p>
+            <a:pPr lvl="0"/>
+            <a:r>
+              <a:rPr/>
+              <a:t>2: non-parametric selecitivty (Ianelli)</a:t>
+            </a:r>
+          </a:p>
+          <a:p>
+            <a:pPr lvl="0"/>
+            <a:r>
+              <a:rPr/>
+              <a:t>3: double logistic</a:t>
+            </a:r>
+          </a:p>
+          <a:p>
+            <a:pPr lvl="0"/>
+            <a:r>
+              <a:rPr/>
+              <a:t>4: descending logistic</a:t>
+            </a:r>
+          </a:p>
+          <a:p>
+            <a:pPr lvl="0"/>
+            <a:r>
+              <a:rPr/>
+              <a:t>5: non-parametric selectivity (Taylor/Hake)</a:t>
+            </a:r>
+          </a:p>
+        </p:txBody>
+      </p:sp>
+      <p:sp>
+        <p:nvSpPr>
+          <p:cNvPr id="4" name="Content Placeholder 3"/>
+          <p:cNvSpPr>
+            <a:spLocks noGrp="1"/>
+          </p:cNvSpPr>
+          <p:nvPr>
+            <p:ph idx="2" sz="half"/>
+          </p:nvPr>
+        </p:nvSpPr>
+        <p:spPr/>
+        <p:txBody>
+          <a:bodyPr/>
+          <a:lstStyle/>
+          <a:p>
+            <a:pPr lvl="0" indent="0" marL="0">
+              <a:buNone/>
+            </a:pPr>
+            <a:r>
+              <a:rPr>
+                <a:latin typeface="Courier"/>
+              </a:rPr>
+              <a:t>Time_varying_sel</a:t>
+            </a:r>
+          </a:p>
+          <a:p>
+            <a:pPr lvl="0"/>
+            <a:r>
+              <a:rPr/>
+              <a:t>0: no</a:t>
+            </a:r>
+          </a:p>
+          <a:p>
+            <a:pPr lvl="0"/>
+            <a:r>
+              <a:rPr/>
+              <a:t>1: random deviates</a:t>
+            </a:r>
+          </a:p>
+          <a:p>
+            <a:pPr lvl="0"/>
+            <a:r>
+              <a:rPr/>
+              <a:t>3: time blocks</a:t>
+            </a:r>
+          </a:p>
+          <a:p>
+            <a:pPr lvl="0"/>
+            <a:r>
+              <a:rPr/>
+              <a:t>4: random walk</a:t>
+            </a:r>
+          </a:p>
+          <a:p>
+            <a:pPr lvl="0"/>
+            <a:r>
+              <a:rPr/>
+              <a:t>5: random walk on ascending portion of double logistic only.</a:t>
+            </a:r>
+          </a:p>
+        </p:txBody>
+      </p:sp>
+    </p:spTree>
+  </p:cSld>
+</p:sld>
+</file>
+
+<file path=ppt/slides/slide12.xml><?xml version="1.0" encoding="utf-8"?>
+<p:sld xmlns:a="http://schemas.openxmlformats.org/drawingml/2006/main" xmlns:r="http://schemas.openxmlformats.org/officeDocument/2006/relationships" xmlns:p="http://schemas.openxmlformats.org/presentationml/2006/main">
+  <p:cSld>
+    <p:spTree>
+      <p:nvGrpSpPr>
+        <p:cNvPr id="1" name=""/>
+        <p:cNvGrpSpPr/>
+        <p:nvPr/>
+      </p:nvGrpSpPr>
+      <p:grpSpPr>
+        <a:xfrm>
+          <a:off x="0" y="0"/>
+          <a:ext cx="0" cy="0"/>
+          <a:chOff x="0" y="0"/>
+          <a:chExt cx="0" cy="0"/>
+        </a:xfrm>
+      </p:grpSpPr>
+      <p:sp>
+        <p:nvSpPr>
+          <p:cNvPr id="3" name="Content Placeholder 2"/>
+          <p:cNvSpPr>
+            <a:spLocks noGrp="1"/>
+          </p:cNvSpPr>
+          <p:nvPr>
+            <p:ph idx="1"/>
+          </p:nvPr>
+        </p:nvSpPr>
+        <p:spPr/>
+        <p:txBody>
+          <a:bodyPr/>
+          <a:lstStyle/>
+          <a:p>
+            <a:pPr lvl="0" indent="0" marL="0">
+              <a:buNone/>
+            </a:pPr>
+            <a:r>
+              <a:rPr/>
+              <a:t>:::</a:t>
+            </a:r>
+          </a:p>
+        </p:txBody>
+      </p:sp>
+    </p:spTree>
+  </p:cSld>
+</p:sld>
+</file>
+
+<file path=ppt/slides/slide13.xml><?xml version="1.0" encoding="utf-8"?>
 <p:sld xmlns:a="http://schemas.openxmlformats.org/drawingml/2006/main" xmlns:r="http://schemas.openxmlformats.org/officeDocument/2006/relationships" xmlns:p="http://schemas.openxmlformats.org/presentationml/2006/main">
   <p:cSld>
     <p:spTree>
@@ -3459,7 +3775,7 @@
 </p:sld>
 </file>
 
-<file path=ppt/slides/slide12.xml><?xml version="1.0" encoding="utf-8"?>
+<file path=ppt/slides/slide14.xml><?xml version="1.0" encoding="utf-8"?>
 <p:sld xmlns:a="http://schemas.openxmlformats.org/drawingml/2006/main" xmlns:r="http://schemas.openxmlformats.org/officeDocument/2006/relationships" xmlns:p="http://schemas.openxmlformats.org/presentationml/2006/main">
   <p:cSld>
     <p:spTree>
@@ -4058,7 +4374,7 @@
 </p:sld>
 </file>
 
-<file path=ppt/slides/slide13.xml><?xml version="1.0" encoding="utf-8"?>
+<file path=ppt/slides/slide15.xml><?xml version="1.0" encoding="utf-8"?>
 <p:sld xmlns:a="http://schemas.openxmlformats.org/drawingml/2006/main" xmlns:r="http://schemas.openxmlformats.org/officeDocument/2006/relationships" xmlns:p="http://schemas.openxmlformats.org/presentationml/2006/main">
   <p:cSld>
     <p:spTree>
@@ -4622,7 +4938,7 @@
 </p:sld>
 </file>
 
-<file path=ppt/slides/slide14.xml><?xml version="1.0" encoding="utf-8"?>
+<file path=ppt/slides/slide16.xml><?xml version="1.0" encoding="utf-8"?>
 <p:sld xmlns:a="http://schemas.openxmlformats.org/drawingml/2006/main" xmlns:r="http://schemas.openxmlformats.org/officeDocument/2006/relationships" xmlns:p="http://schemas.openxmlformats.org/presentationml/2006/main">
   <p:cSld>
     <p:spTree>
@@ -5345,216 +5661,6 @@
                 <a:latin typeface="Courier"/>
               </a:rPr>
               <a:t>)</a:t>
-            </a:r>
-          </a:p>
-        </p:txBody>
-      </p:sp>
-      <p:pic>
-        <p:nvPicPr>
-          <p:cNvPr descr="Rceattle-overview-4_17_2025_files/figure-pptx/unnamed-chunk-5-1.png" id="0" name="Picture 1"/>
-          <p:cNvPicPr>
-            <a:picLocks noGrp="1" noChangeAspect="1"/>
-          </p:cNvPicPr>
-          <p:nvPr/>
-        </p:nvPicPr>
-        <p:blipFill>
-          <a:blip r:embed="rId2"/>
-          <a:stretch>
-            <a:fillRect/>
-          </a:stretch>
-        </p:blipFill>
-        <p:spPr bwMode="auto">
-          <a:xfrm>
-            <a:off x="4648200" y="1879600"/>
-            <a:ext cx="4038600" cy="2019300"/>
-          </a:xfrm>
-          <a:prstGeom prst="rect">
-            <a:avLst/>
-          </a:prstGeom>
-          <a:noFill/>
-          <a:ln w="9525">
-            <a:noFill/>
-            <a:headEnd/>
-            <a:tailEnd/>
-          </a:ln>
-        </p:spPr>
-      </p:pic>
-    </p:spTree>
-  </p:cSld>
-</p:sld>
-</file>
-
-<file path=ppt/slides/slide15.xml><?xml version="1.0" encoding="utf-8"?>
-<p:sld xmlns:a="http://schemas.openxmlformats.org/drawingml/2006/main" xmlns:r="http://schemas.openxmlformats.org/officeDocument/2006/relationships" xmlns:p="http://schemas.openxmlformats.org/presentationml/2006/main">
-  <p:cSld>
-    <p:spTree>
-      <p:nvGrpSpPr>
-        <p:cNvPr id="1" name=""/>
-        <p:cNvGrpSpPr/>
-        <p:nvPr/>
-      </p:nvGrpSpPr>
-      <p:grpSpPr>
-        <a:xfrm>
-          <a:off x="0" y="0"/>
-          <a:ext cx="0" cy="0"/>
-          <a:chOff x="0" y="0"/>
-          <a:chExt cx="0" cy="0"/>
-        </a:xfrm>
-      </p:grpSpPr>
-      <p:sp>
-        <p:nvSpPr>
-          <p:cNvPr id="2" name="Title 1"/>
-          <p:cNvSpPr>
-            <a:spLocks noGrp="1"/>
-          </p:cNvSpPr>
-          <p:nvPr>
-            <p:ph type="title"/>
-          </p:nvPr>
-        </p:nvSpPr>
-        <p:spPr/>
-        <p:txBody>
-          <a:bodyPr/>
-          <a:lstStyle/>
-          <a:p>
-            <a:pPr lvl="0" indent="0" marL="0">
-              <a:buNone/>
-            </a:pPr>
-            <a:r>
-              <a:rPr/>
-              <a:t>Time-series plotting</a:t>
-            </a:r>
-          </a:p>
-        </p:txBody>
-      </p:sp>
-      <p:sp>
-        <p:nvSpPr>
-          <p:cNvPr id="3" name="Content Placeholder 2"/>
-          <p:cNvSpPr>
-            <a:spLocks noGrp="1"/>
-          </p:cNvSpPr>
-          <p:nvPr>
-            <p:ph idx="1" sz="half"/>
-          </p:nvPr>
-        </p:nvSpPr>
-        <p:spPr/>
-        <p:txBody>
-          <a:bodyPr/>
-          <a:lstStyle/>
-          <a:p>
-            <a:pPr lvl="0" indent="0">
-              <a:buNone/>
-            </a:pPr>
-            <a:r>
-              <a:rPr>
-                <a:solidFill>
-                  <a:srgbClr val="4758AB"/>
-                </a:solidFill>
-                <a:latin typeface="Courier"/>
-              </a:rPr>
-              <a:t>plot_biomass</a:t>
-            </a:r>
-            <a:r>
-              <a:rPr>
-                <a:solidFill>
-                  <a:srgbClr val="003B4F"/>
-                </a:solidFill>
-                <a:latin typeface="Courier"/>
-              </a:rPr>
-              <a:t>(mymodel)</a:t>
-            </a:r>
-            <a:br/>
-            <a:r>
-              <a:rPr>
-                <a:solidFill>
-                  <a:srgbClr val="4758AB"/>
-                </a:solidFill>
-                <a:latin typeface="Courier"/>
-              </a:rPr>
-              <a:t>plot_recruitment</a:t>
-            </a:r>
-            <a:r>
-              <a:rPr>
-                <a:solidFill>
-                  <a:srgbClr val="003B4F"/>
-                </a:solidFill>
-                <a:latin typeface="Courier"/>
-              </a:rPr>
-              <a:t>(</a:t>
-            </a:r>
-            <a:r>
-              <a:rPr>
-                <a:solidFill>
-                  <a:srgbClr val="4758AB"/>
-                </a:solidFill>
-                <a:latin typeface="Courier"/>
-              </a:rPr>
-              <a:t>list</a:t>
-            </a:r>
-            <a:r>
-              <a:rPr>
-                <a:solidFill>
-                  <a:srgbClr val="003B4F"/>
-                </a:solidFill>
-                <a:latin typeface="Courier"/>
-              </a:rPr>
-              <a:t>(mymodel1, mymodel2))</a:t>
-            </a:r>
-            <a:br/>
-            <a:r>
-              <a:rPr>
-                <a:solidFill>
-                  <a:srgbClr val="4758AB"/>
-                </a:solidFill>
-                <a:latin typeface="Courier"/>
-              </a:rPr>
-              <a:t>plot_depletion</a:t>
-            </a:r>
-            <a:r>
-              <a:rPr>
-                <a:solidFill>
-                  <a:srgbClr val="003B4F"/>
-                </a:solidFill>
-                <a:latin typeface="Courier"/>
-              </a:rPr>
-              <a:t>()</a:t>
-            </a:r>
-            <a:br/>
-            <a:r>
-              <a:rPr>
-                <a:solidFill>
-                  <a:srgbClr val="4758AB"/>
-                </a:solidFill>
-                <a:latin typeface="Courier"/>
-              </a:rPr>
-              <a:t>plot_depletionSSB</a:t>
-            </a:r>
-            <a:r>
-              <a:rPr>
-                <a:solidFill>
-                  <a:srgbClr val="003B4F"/>
-                </a:solidFill>
-                <a:latin typeface="Courier"/>
-              </a:rPr>
-              <a:t>()</a:t>
-            </a:r>
-            <a:br/>
-            <a:r>
-              <a:rPr>
-                <a:solidFill>
-                  <a:srgbClr val="4758AB"/>
-                </a:solidFill>
-                <a:latin typeface="Courier"/>
-              </a:rPr>
-              <a:t>plot_mortality</a:t>
-            </a:r>
-            <a:r>
-              <a:rPr>
-                <a:solidFill>
-                  <a:srgbClr val="003B4F"/>
-                </a:solidFill>
-                <a:latin typeface="Courier"/>
-              </a:rPr>
-              <a:t>()</a:t>
             </a:r>
           </a:p>
         </p:txBody>
@@ -5594,7 +5700,217 @@
 </p:sld>
 </file>
 
-<file path=ppt/slides/slide16.xml><?xml version="1.0" encoding="utf-8"?>
+<file path=ppt/slides/slide17.xml><?xml version="1.0" encoding="utf-8"?>
+<p:sld xmlns:a="http://schemas.openxmlformats.org/drawingml/2006/main" xmlns:r="http://schemas.openxmlformats.org/officeDocument/2006/relationships" xmlns:p="http://schemas.openxmlformats.org/presentationml/2006/main">
+  <p:cSld>
+    <p:spTree>
+      <p:nvGrpSpPr>
+        <p:cNvPr id="1" name=""/>
+        <p:cNvGrpSpPr/>
+        <p:nvPr/>
+      </p:nvGrpSpPr>
+      <p:grpSpPr>
+        <a:xfrm>
+          <a:off x="0" y="0"/>
+          <a:ext cx="0" cy="0"/>
+          <a:chOff x="0" y="0"/>
+          <a:chExt cx="0" cy="0"/>
+        </a:xfrm>
+      </p:grpSpPr>
+      <p:sp>
+        <p:nvSpPr>
+          <p:cNvPr id="2" name="Title 1"/>
+          <p:cNvSpPr>
+            <a:spLocks noGrp="1"/>
+          </p:cNvSpPr>
+          <p:nvPr>
+            <p:ph type="title"/>
+          </p:nvPr>
+        </p:nvSpPr>
+        <p:spPr/>
+        <p:txBody>
+          <a:bodyPr/>
+          <a:lstStyle/>
+          <a:p>
+            <a:pPr lvl="0" indent="0" marL="0">
+              <a:buNone/>
+            </a:pPr>
+            <a:r>
+              <a:rPr/>
+              <a:t>Time-series plotting</a:t>
+            </a:r>
+          </a:p>
+        </p:txBody>
+      </p:sp>
+      <p:sp>
+        <p:nvSpPr>
+          <p:cNvPr id="3" name="Content Placeholder 2"/>
+          <p:cNvSpPr>
+            <a:spLocks noGrp="1"/>
+          </p:cNvSpPr>
+          <p:nvPr>
+            <p:ph idx="1" sz="half"/>
+          </p:nvPr>
+        </p:nvSpPr>
+        <p:spPr/>
+        <p:txBody>
+          <a:bodyPr/>
+          <a:lstStyle/>
+          <a:p>
+            <a:pPr lvl="0" indent="0">
+              <a:buNone/>
+            </a:pPr>
+            <a:r>
+              <a:rPr>
+                <a:solidFill>
+                  <a:srgbClr val="4758AB"/>
+                </a:solidFill>
+                <a:latin typeface="Courier"/>
+              </a:rPr>
+              <a:t>plot_biomass</a:t>
+            </a:r>
+            <a:r>
+              <a:rPr>
+                <a:solidFill>
+                  <a:srgbClr val="003B4F"/>
+                </a:solidFill>
+                <a:latin typeface="Courier"/>
+              </a:rPr>
+              <a:t>(mymodel)</a:t>
+            </a:r>
+            <a:br/>
+            <a:r>
+              <a:rPr>
+                <a:solidFill>
+                  <a:srgbClr val="4758AB"/>
+                </a:solidFill>
+                <a:latin typeface="Courier"/>
+              </a:rPr>
+              <a:t>plot_recruitment</a:t>
+            </a:r>
+            <a:r>
+              <a:rPr>
+                <a:solidFill>
+                  <a:srgbClr val="003B4F"/>
+                </a:solidFill>
+                <a:latin typeface="Courier"/>
+              </a:rPr>
+              <a:t>(</a:t>
+            </a:r>
+            <a:r>
+              <a:rPr>
+                <a:solidFill>
+                  <a:srgbClr val="4758AB"/>
+                </a:solidFill>
+                <a:latin typeface="Courier"/>
+              </a:rPr>
+              <a:t>list</a:t>
+            </a:r>
+            <a:r>
+              <a:rPr>
+                <a:solidFill>
+                  <a:srgbClr val="003B4F"/>
+                </a:solidFill>
+                <a:latin typeface="Courier"/>
+              </a:rPr>
+              <a:t>(mymodel1, mymodel2))</a:t>
+            </a:r>
+            <a:br/>
+            <a:r>
+              <a:rPr>
+                <a:solidFill>
+                  <a:srgbClr val="4758AB"/>
+                </a:solidFill>
+                <a:latin typeface="Courier"/>
+              </a:rPr>
+              <a:t>plot_depletion</a:t>
+            </a:r>
+            <a:r>
+              <a:rPr>
+                <a:solidFill>
+                  <a:srgbClr val="003B4F"/>
+                </a:solidFill>
+                <a:latin typeface="Courier"/>
+              </a:rPr>
+              <a:t>()</a:t>
+            </a:r>
+            <a:br/>
+            <a:r>
+              <a:rPr>
+                <a:solidFill>
+                  <a:srgbClr val="4758AB"/>
+                </a:solidFill>
+                <a:latin typeface="Courier"/>
+              </a:rPr>
+              <a:t>plot_depletionSSB</a:t>
+            </a:r>
+            <a:r>
+              <a:rPr>
+                <a:solidFill>
+                  <a:srgbClr val="003B4F"/>
+                </a:solidFill>
+                <a:latin typeface="Courier"/>
+              </a:rPr>
+              <a:t>()</a:t>
+            </a:r>
+            <a:br/>
+            <a:r>
+              <a:rPr>
+                <a:solidFill>
+                  <a:srgbClr val="4758AB"/>
+                </a:solidFill>
+                <a:latin typeface="Courier"/>
+              </a:rPr>
+              <a:t>plot_mortality</a:t>
+            </a:r>
+            <a:r>
+              <a:rPr>
+                <a:solidFill>
+                  <a:srgbClr val="003B4F"/>
+                </a:solidFill>
+                <a:latin typeface="Courier"/>
+              </a:rPr>
+              <a:t>()</a:t>
+            </a:r>
+          </a:p>
+        </p:txBody>
+      </p:sp>
+      <p:pic>
+        <p:nvPicPr>
+          <p:cNvPr descr="Rceattle-overview-4_17_2025_files/figure-pptx/unnamed-chunk-9-1.png" id="0" name="Picture 1"/>
+          <p:cNvPicPr>
+            <a:picLocks noGrp="1" noChangeAspect="1"/>
+          </p:cNvPicPr>
+          <p:nvPr/>
+        </p:nvPicPr>
+        <p:blipFill>
+          <a:blip r:embed="rId2"/>
+          <a:stretch>
+            <a:fillRect/>
+          </a:stretch>
+        </p:blipFill>
+        <p:spPr bwMode="auto">
+          <a:xfrm>
+            <a:off x="4648200" y="1879600"/>
+            <a:ext cx="4038600" cy="2019300"/>
+          </a:xfrm>
+          <a:prstGeom prst="rect">
+            <a:avLst/>
+          </a:prstGeom>
+          <a:noFill/>
+          <a:ln w="9525">
+            <a:noFill/>
+            <a:headEnd/>
+            <a:tailEnd/>
+          </a:ln>
+        </p:spPr>
+      </p:pic>
+    </p:spTree>
+  </p:cSld>
+</p:sld>
+</file>
+
+<file path=ppt/slides/slide18.xml><?xml version="1.0" encoding="utf-8"?>
 <p:sld xmlns:a="http://schemas.openxmlformats.org/drawingml/2006/main" xmlns:r="http://schemas.openxmlformats.org/officeDocument/2006/relationships" xmlns:p="http://schemas.openxmlformats.org/presentationml/2006/main">
   <p:cSld>
     <p:spTree>
@@ -5724,7 +6040,7 @@
       </p:sp>
       <p:pic>
         <p:nvPicPr>
-          <p:cNvPr descr="Rceattle-overview-4_17_2025_files/figure-pptx/unnamed-chunk-8-1.png" id="0" name="Picture 1"/>
+          <p:cNvPr descr="Rceattle-overview-4_17_2025_files/figure-pptx/unnamed-chunk-10-1.png" id="0" name="Picture 1"/>
           <p:cNvPicPr>
             <a:picLocks noGrp="1" noChangeAspect="1"/>
           </p:cNvPicPr>
@@ -5740,149 +6056,6 @@
           <a:xfrm>
             <a:off x="3568700" y="1117600"/>
             <a:ext cx="5105400" cy="2552700"/>
-          </a:xfrm>
-          <a:prstGeom prst="rect">
-            <a:avLst/>
-          </a:prstGeom>
-          <a:noFill/>
-          <a:ln w="9525">
-            <a:noFill/>
-            <a:headEnd/>
-            <a:tailEnd/>
-          </a:ln>
-        </p:spPr>
-      </p:pic>
-    </p:spTree>
-  </p:cSld>
-</p:sld>
-</file>
-
-<file path=ppt/slides/slide17.xml><?xml version="1.0" encoding="utf-8"?>
-<p:sld xmlns:a="http://schemas.openxmlformats.org/drawingml/2006/main" xmlns:r="http://schemas.openxmlformats.org/officeDocument/2006/relationships" xmlns:p="http://schemas.openxmlformats.org/presentationml/2006/main">
-  <p:cSld>
-    <p:spTree>
-      <p:nvGrpSpPr>
-        <p:cNvPr id="1" name=""/>
-        <p:cNvGrpSpPr/>
-        <p:nvPr/>
-      </p:nvGrpSpPr>
-      <p:grpSpPr>
-        <a:xfrm>
-          <a:off x="0" y="0"/>
-          <a:ext cx="0" cy="0"/>
-          <a:chOff x="0" y="0"/>
-          <a:chExt cx="0" cy="0"/>
-        </a:xfrm>
-      </p:grpSpPr>
-      <p:sp>
-        <p:nvSpPr>
-          <p:cNvPr id="4" name="Text Placeholder 3"/>
-          <p:cNvSpPr>
-            <a:spLocks noGrp="1"/>
-          </p:cNvSpPr>
-          <p:nvPr>
-            <p:ph idx="2" sz="half" type="body"/>
-          </p:nvPr>
-        </p:nvSpPr>
-        <p:spPr/>
-        <p:txBody>
-          <a:bodyPr/>
-          <a:lstStyle/>
-          <a:p>
-            <a:pPr lvl="0" indent="0">
-              <a:buNone/>
-            </a:pPr>
-            <a:r>
-              <a:rPr>
-                <a:solidFill>
-                  <a:srgbClr val="4758AB"/>
-                </a:solidFill>
-                <a:latin typeface="Courier"/>
-              </a:rPr>
-              <a:t>plot_comp</a:t>
-            </a:r>
-            <a:r>
-              <a:rPr>
-                <a:solidFill>
-                  <a:srgbClr val="003B4F"/>
-                </a:solidFill>
-                <a:latin typeface="Courier"/>
-              </a:rPr>
-              <a:t>(mymodel)</a:t>
-            </a:r>
-          </a:p>
-        </p:txBody>
-      </p:sp>
-      <p:pic>
-        <p:nvPicPr>
-          <p:cNvPr descr="Rceattle-overview-4_17_2025_files/figure-pptx/unnamed-chunk-9-1.png" id="0" name="Picture 1"/>
-          <p:cNvPicPr>
-            <a:picLocks noGrp="1" noChangeAspect="1"/>
-          </p:cNvPicPr>
-          <p:nvPr/>
-        </p:nvPicPr>
-        <p:blipFill>
-          <a:blip r:embed="rId2"/>
-          <a:stretch>
-            <a:fillRect/>
-          </a:stretch>
-        </p:blipFill>
-        <p:spPr bwMode="auto">
-          <a:xfrm>
-            <a:off x="3568700" y="1117600"/>
-            <a:ext cx="5105400" cy="2552700"/>
-          </a:xfrm>
-          <a:prstGeom prst="rect">
-            <a:avLst/>
-          </a:prstGeom>
-          <a:noFill/>
-          <a:ln w="9525">
-            <a:noFill/>
-            <a:headEnd/>
-            <a:tailEnd/>
-          </a:ln>
-        </p:spPr>
-      </p:pic>
-    </p:spTree>
-  </p:cSld>
-</p:sld>
-</file>
-
-<file path=ppt/slides/slide18.xml><?xml version="1.0" encoding="utf-8"?>
-<p:sld xmlns:a="http://schemas.openxmlformats.org/drawingml/2006/main" xmlns:r="http://schemas.openxmlformats.org/officeDocument/2006/relationships" xmlns:p="http://schemas.openxmlformats.org/presentationml/2006/main">
-  <p:cSld>
-    <p:spTree>
-      <p:nvGrpSpPr>
-        <p:cNvPr id="1" name=""/>
-        <p:cNvGrpSpPr/>
-        <p:nvPr/>
-      </p:nvGrpSpPr>
-      <p:grpSpPr>
-        <a:xfrm>
-          <a:off x="0" y="0"/>
-          <a:ext cx="0" cy="0"/>
-          <a:chOff x="0" y="0"/>
-          <a:chExt cx="0" cy="0"/>
-        </a:xfrm>
-      </p:grpSpPr>
-      <p:pic>
-        <p:nvPicPr>
-          <p:cNvPr descr="Rceattle-overview-4_17_2025_files/figure-pptx/unnamed-chunk-9-2.png" id="0" name="Picture 1"/>
-          <p:cNvPicPr>
-            <a:picLocks noGrp="1" noChangeAspect="1"/>
-          </p:cNvPicPr>
-          <p:nvPr/>
-        </p:nvPicPr>
-        <p:blipFill>
-          <a:blip r:embed="rId2"/>
-          <a:stretch>
-            <a:fillRect/>
-          </a:stretch>
-        </p:blipFill>
-        <p:spPr bwMode="auto">
-          <a:xfrm>
-            <a:off x="1181100" y="1193800"/>
-            <a:ext cx="6781800" cy="3390900"/>
           </a:xfrm>
           <a:prstGeom prst="rect">
             <a:avLst/>
@@ -5917,9 +6090,48 @@
           <a:chExt cx="0" cy="0"/>
         </a:xfrm>
       </p:grpSpPr>
+      <p:sp>
+        <p:nvSpPr>
+          <p:cNvPr id="4" name="Text Placeholder 3"/>
+          <p:cNvSpPr>
+            <a:spLocks noGrp="1"/>
+          </p:cNvSpPr>
+          <p:nvPr>
+            <p:ph idx="2" sz="half" type="body"/>
+          </p:nvPr>
+        </p:nvSpPr>
+        <p:spPr/>
+        <p:txBody>
+          <a:bodyPr/>
+          <a:lstStyle/>
+          <a:p>
+            <a:pPr lvl="0" indent="0">
+              <a:buNone/>
+            </a:pPr>
+            <a:r>
+              <a:rPr>
+                <a:solidFill>
+                  <a:srgbClr val="4758AB"/>
+                </a:solidFill>
+                <a:latin typeface="Courier"/>
+              </a:rPr>
+              <a:t>plot_comp</a:t>
+            </a:r>
+            <a:r>
+              <a:rPr>
+                <a:solidFill>
+                  <a:srgbClr val="003B4F"/>
+                </a:solidFill>
+                <a:latin typeface="Courier"/>
+              </a:rPr>
+              <a:t>(mymodel)</a:t>
+            </a:r>
+          </a:p>
+        </p:txBody>
+      </p:sp>
       <p:pic>
         <p:nvPicPr>
-          <p:cNvPr descr="Rceattle-overview-4_17_2025_files/figure-pptx/unnamed-chunk-9-3.png" id="0" name="Picture 1"/>
+          <p:cNvPr descr="Rceattle-overview-4_17_2025_files/figure-pptx/unnamed-chunk-11-1.png" id="0" name="Picture 1"/>
           <p:cNvPicPr>
             <a:picLocks noGrp="1" noChangeAspect="1"/>
           </p:cNvPicPr>
@@ -5933,8 +6145,8 @@
         </p:blipFill>
         <p:spPr bwMode="auto">
           <a:xfrm>
-            <a:off x="1181100" y="1193800"/>
-            <a:ext cx="6781800" cy="3390900"/>
+            <a:off x="3568700" y="1117600"/>
+            <a:ext cx="5105400" cy="2552700"/>
           </a:xfrm>
           <a:prstGeom prst="rect">
             <a:avLst/>
@@ -6085,7 +6297,7 @@
       </p:grpSpPr>
       <p:pic>
         <p:nvPicPr>
-          <p:cNvPr descr="Rceattle-overview-4_17_2025_files/figure-pptx/unnamed-chunk-9-4.png" id="0" name="Picture 1"/>
+          <p:cNvPr descr="Rceattle-overview-4_17_2025_files/figure-pptx/unnamed-chunk-11-2.png" id="0" name="Picture 1"/>
           <p:cNvPicPr>
             <a:picLocks noGrp="1" noChangeAspect="1"/>
           </p:cNvPicPr>
@@ -6137,7 +6349,7 @@
       </p:grpSpPr>
       <p:pic>
         <p:nvPicPr>
-          <p:cNvPr descr="Rceattle-overview-4_17_2025_files/figure-pptx/unnamed-chunk-9-5.png" id="0" name="Picture 1"/>
+          <p:cNvPr descr="Rceattle-overview-4_17_2025_files/figure-pptx/unnamed-chunk-11-3.png" id="0" name="Picture 1"/>
           <p:cNvPicPr>
             <a:picLocks noGrp="1" noChangeAspect="1"/>
           </p:cNvPicPr>
@@ -6189,7 +6401,7 @@
       </p:grpSpPr>
       <p:pic>
         <p:nvPicPr>
-          <p:cNvPr descr="Rceattle-overview-4_17_2025_files/figure-pptx/unnamed-chunk-9-6.png" id="0" name="Picture 1"/>
+          <p:cNvPr descr="Rceattle-overview-4_17_2025_files/figure-pptx/unnamed-chunk-11-4.png" id="0" name="Picture 1"/>
           <p:cNvPicPr>
             <a:picLocks noGrp="1" noChangeAspect="1"/>
           </p:cNvPicPr>
@@ -6241,7 +6453,7 @@
       </p:grpSpPr>
       <p:pic>
         <p:nvPicPr>
-          <p:cNvPr descr="Rceattle-overview-4_17_2025_files/figure-pptx/unnamed-chunk-9-7.png" id="0" name="Picture 1"/>
+          <p:cNvPr descr="Rceattle-overview-4_17_2025_files/figure-pptx/unnamed-chunk-11-5.png" id="0" name="Picture 1"/>
           <p:cNvPicPr>
             <a:picLocks noGrp="1" noChangeAspect="1"/>
           </p:cNvPicPr>
@@ -6293,7 +6505,7 @@
       </p:grpSpPr>
       <p:pic>
         <p:nvPicPr>
-          <p:cNvPr descr="Rceattle-overview-4_17_2025_files/figure-pptx/unnamed-chunk-9-8.png" id="0" name="Picture 1"/>
+          <p:cNvPr descr="Rceattle-overview-4_17_2025_files/figure-pptx/unnamed-chunk-11-6.png" id="0" name="Picture 1"/>
           <p:cNvPicPr>
             <a:picLocks noGrp="1" noChangeAspect="1"/>
           </p:cNvPicPr>
@@ -6345,7 +6557,7 @@
       </p:grpSpPr>
       <p:pic>
         <p:nvPicPr>
-          <p:cNvPr descr="Rceattle-overview-4_17_2025_files/figure-pptx/unnamed-chunk-9-9.png" id="0" name="Picture 1"/>
+          <p:cNvPr descr="Rceattle-overview-4_17_2025_files/figure-pptx/unnamed-chunk-11-7.png" id="0" name="Picture 1"/>
           <p:cNvPicPr>
             <a:picLocks noGrp="1" noChangeAspect="1"/>
           </p:cNvPicPr>
@@ -6397,7 +6609,7 @@
       </p:grpSpPr>
       <p:pic>
         <p:nvPicPr>
-          <p:cNvPr descr="Rceattle-overview-4_17_2025_files/figure-pptx/unnamed-chunk-9-10.png" id="0" name="Picture 1"/>
+          <p:cNvPr descr="Rceattle-overview-4_17_2025_files/figure-pptx/unnamed-chunk-11-8.png" id="0" name="Picture 1"/>
           <p:cNvPicPr>
             <a:picLocks noGrp="1" noChangeAspect="1"/>
           </p:cNvPicPr>
@@ -6449,7 +6661,7 @@
       </p:grpSpPr>
       <p:pic>
         <p:nvPicPr>
-          <p:cNvPr descr="Rceattle-overview-4_17_2025_files/figure-pptx/unnamed-chunk-9-11.png" id="0" name="Picture 1"/>
+          <p:cNvPr descr="Rceattle-overview-4_17_2025_files/figure-pptx/unnamed-chunk-11-9.png" id="0" name="Picture 1"/>
           <p:cNvPicPr>
             <a:picLocks noGrp="1" noChangeAspect="1"/>
           </p:cNvPicPr>
@@ -6501,7 +6713,7 @@
       </p:grpSpPr>
       <p:pic>
         <p:nvPicPr>
-          <p:cNvPr descr="Rceattle-overview-4_17_2025_files/figure-pptx/unnamed-chunk-9-12.png" id="0" name="Picture 1"/>
+          <p:cNvPr descr="Rceattle-overview-4_17_2025_files/figure-pptx/unnamed-chunk-11-10.png" id="0" name="Picture 1"/>
           <p:cNvPicPr>
             <a:picLocks noGrp="1" noChangeAspect="1"/>
           </p:cNvPicPr>
@@ -6553,7 +6765,7 @@
       </p:grpSpPr>
       <p:pic>
         <p:nvPicPr>
-          <p:cNvPr descr="Rceattle-overview-4_17_2025_files/figure-pptx/unnamed-chunk-9-13.png" id="0" name="Picture 1"/>
+          <p:cNvPr descr="Rceattle-overview-4_17_2025_files/figure-pptx/unnamed-chunk-11-11.png" id="0" name="Picture 1"/>
           <p:cNvPicPr>
             <a:picLocks noGrp="1" noChangeAspect="1"/>
           </p:cNvPicPr>
@@ -6704,7 +6916,7 @@
       </p:grpSpPr>
       <p:pic>
         <p:nvPicPr>
-          <p:cNvPr descr="Rceattle-overview-4_17_2025_files/figure-pptx/unnamed-chunk-9-14.png" id="0" name="Picture 1"/>
+          <p:cNvPr descr="Rceattle-overview-4_17_2025_files/figure-pptx/unnamed-chunk-11-12.png" id="0" name="Picture 1"/>
           <p:cNvPicPr>
             <a:picLocks noGrp="1" noChangeAspect="1"/>
           </p:cNvPicPr>
@@ -6756,7 +6968,7 @@
       </p:grpSpPr>
       <p:pic>
         <p:nvPicPr>
-          <p:cNvPr descr="Rceattle-overview-4_17_2025_files/figure-pptx/unnamed-chunk-9-15.png" id="0" name="Picture 1"/>
+          <p:cNvPr descr="Rceattle-overview-4_17_2025_files/figure-pptx/unnamed-chunk-11-13.png" id="0" name="Picture 1"/>
           <p:cNvPicPr>
             <a:picLocks noGrp="1" noChangeAspect="1"/>
           </p:cNvPicPr>
@@ -6808,7 +7020,7 @@
       </p:grpSpPr>
       <p:pic>
         <p:nvPicPr>
-          <p:cNvPr descr="Rceattle-overview-4_17_2025_files/figure-pptx/unnamed-chunk-9-16.png" id="0" name="Picture 1"/>
+          <p:cNvPr descr="Rceattle-overview-4_17_2025_files/figure-pptx/unnamed-chunk-11-14.png" id="0" name="Picture 1"/>
           <p:cNvPicPr>
             <a:picLocks noGrp="1" noChangeAspect="1"/>
           </p:cNvPicPr>
@@ -6860,7 +7072,7 @@
       </p:grpSpPr>
       <p:pic>
         <p:nvPicPr>
-          <p:cNvPr descr="Rceattle-overview-4_17_2025_files/figure-pptx/unnamed-chunk-9-17.png" id="0" name="Picture 1"/>
+          <p:cNvPr descr="Rceattle-overview-4_17_2025_files/figure-pptx/unnamed-chunk-11-15.png" id="0" name="Picture 1"/>
           <p:cNvPicPr>
             <a:picLocks noGrp="1" noChangeAspect="1"/>
           </p:cNvPicPr>
@@ -6912,7 +7124,7 @@
       </p:grpSpPr>
       <p:pic>
         <p:nvPicPr>
-          <p:cNvPr descr="Rceattle-overview-4_17_2025_files/figure-pptx/unnamed-chunk-9-18.png" id="0" name="Picture 1"/>
+          <p:cNvPr descr="Rceattle-overview-4_17_2025_files/figure-pptx/unnamed-chunk-11-16.png" id="0" name="Picture 1"/>
           <p:cNvPicPr>
             <a:picLocks noGrp="1" noChangeAspect="1"/>
           </p:cNvPicPr>
@@ -6964,7 +7176,7 @@
       </p:grpSpPr>
       <p:pic>
         <p:nvPicPr>
-          <p:cNvPr descr="Rceattle-overview-4_17_2025_files/figure-pptx/unnamed-chunk-9-19.png" id="0" name="Picture 1"/>
+          <p:cNvPr descr="Rceattle-overview-4_17_2025_files/figure-pptx/unnamed-chunk-11-17.png" id="0" name="Picture 1"/>
           <p:cNvPicPr>
             <a:picLocks noGrp="1" noChangeAspect="1"/>
           </p:cNvPicPr>
@@ -7016,7 +7228,7 @@
       </p:grpSpPr>
       <p:pic>
         <p:nvPicPr>
-          <p:cNvPr descr="Rceattle-overview-4_17_2025_files/figure-pptx/unnamed-chunk-9-20.png" id="0" name="Picture 1"/>
+          <p:cNvPr descr="Rceattle-overview-4_17_2025_files/figure-pptx/unnamed-chunk-11-18.png" id="0" name="Picture 1"/>
           <p:cNvPicPr>
             <a:picLocks noGrp="1" noChangeAspect="1"/>
           </p:cNvPicPr>
@@ -7068,7 +7280,7 @@
       </p:grpSpPr>
       <p:pic>
         <p:nvPicPr>
-          <p:cNvPr descr="Rceattle-overview-4_17_2025_files/figure-pptx/unnamed-chunk-9-21.png" id="0" name="Picture 1"/>
+          <p:cNvPr descr="Rceattle-overview-4_17_2025_files/figure-pptx/unnamed-chunk-11-19.png" id="0" name="Picture 1"/>
           <p:cNvPicPr>
             <a:picLocks noGrp="1" noChangeAspect="1"/>
           </p:cNvPicPr>
@@ -7118,196 +7330,9 @@
           <a:chExt cx="0" cy="0"/>
         </a:xfrm>
       </p:grpSpPr>
-      <p:sp>
-        <p:nvSpPr>
-          <p:cNvPr id="2" name="Title 1"/>
-          <p:cNvSpPr>
-            <a:spLocks noGrp="1"/>
-          </p:cNvSpPr>
-          <p:nvPr>
-            <p:ph type="title"/>
-          </p:nvPr>
-        </p:nvSpPr>
-        <p:spPr>
-          <a:xfrm>
-            <a:off x="457201" y="204787"/>
-            <a:ext cx="3008313" cy="871538"/>
-          </a:xfrm>
-        </p:spPr>
-        <p:txBody>
-          <a:bodyPr/>
-          <a:lstStyle/>
-          <a:p>
-            <a:pPr lvl="0" indent="0" marL="0">
-              <a:buNone/>
-            </a:pPr>
-            <a:r>
-              <a:rPr/>
-              <a:t>Retrospectives</a:t>
-            </a:r>
-          </a:p>
-        </p:txBody>
-      </p:sp>
-      <p:sp>
-        <p:nvSpPr>
-          <p:cNvPr id="4" name="Text Placeholder 3"/>
-          <p:cNvSpPr>
-            <a:spLocks noGrp="1"/>
-          </p:cNvSpPr>
-          <p:nvPr>
-            <p:ph idx="2" sz="half" type="body"/>
-          </p:nvPr>
-        </p:nvSpPr>
-        <p:spPr/>
-        <p:txBody>
-          <a:bodyPr/>
-          <a:lstStyle/>
-          <a:p>
-            <a:pPr lvl="0" indent="0">
-              <a:buNone/>
-            </a:pPr>
-            <a:r>
-              <a:rPr>
-                <a:solidFill>
-                  <a:srgbClr val="003B4F"/>
-                </a:solidFill>
-                <a:latin typeface="Courier"/>
-              </a:rPr>
-              <a:t>retro &lt;- </a:t>
-            </a:r>
-            <a:r>
-              <a:rPr>
-                <a:solidFill>
-                  <a:srgbClr val="4758AB"/>
-                </a:solidFill>
-                <a:latin typeface="Courier"/>
-              </a:rPr>
-              <a:t>retrospective</a:t>
-            </a:r>
-            <a:r>
-              <a:rPr>
-                <a:solidFill>
-                  <a:srgbClr val="003B4F"/>
-                </a:solidFill>
-                <a:latin typeface="Courier"/>
-              </a:rPr>
-              <a:t>(mymodel, </a:t>
-            </a:r>
-            <a:r>
-              <a:rPr>
-                <a:solidFill>
-                  <a:srgbClr val="657422"/>
-                </a:solidFill>
-                <a:latin typeface="Courier"/>
-              </a:rPr>
-              <a:t>peels =</a:t>
-            </a:r>
-            <a:r>
-              <a:rPr>
-                <a:solidFill>
-                  <a:srgbClr val="003B4F"/>
-                </a:solidFill>
-                <a:latin typeface="Courier"/>
-              </a:rPr>
-              <a:t> </a:t>
-            </a:r>
-            <a:r>
-              <a:rPr>
-                <a:solidFill>
-                  <a:srgbClr val="AD0000"/>
-                </a:solidFill>
-                <a:latin typeface="Courier"/>
-              </a:rPr>
-              <a:t>6</a:t>
-            </a:r>
-            <a:r>
-              <a:rPr>
-                <a:solidFill>
-                  <a:srgbClr val="003B4F"/>
-                </a:solidFill>
-                <a:latin typeface="Courier"/>
-              </a:rPr>
-              <a:t>)</a:t>
-            </a:r>
-            <a:br/>
-            <a:r>
-              <a:rPr>
-                <a:solidFill>
-                  <a:srgbClr val="4758AB"/>
-                </a:solidFill>
-                <a:latin typeface="Courier"/>
-              </a:rPr>
-              <a:t>plot_biomass</a:t>
-            </a:r>
-            <a:r>
-              <a:rPr>
-                <a:solidFill>
-                  <a:srgbClr val="003B4F"/>
-                </a:solidFill>
-                <a:latin typeface="Courier"/>
-              </a:rPr>
-              <a:t>(retro</a:t>
-            </a:r>
-            <a:r>
-              <a:rPr>
-                <a:solidFill>
-                  <a:srgbClr val="5E5E5E"/>
-                </a:solidFill>
-                <a:latin typeface="Courier"/>
-              </a:rPr>
-              <a:t>$</a:t>
-            </a:r>
-            <a:r>
-              <a:rPr>
-                <a:solidFill>
-                  <a:srgbClr val="003B4F"/>
-                </a:solidFill>
-                <a:latin typeface="Courier"/>
-              </a:rPr>
-              <a:t>Rceattle_list, </a:t>
-            </a:r>
-            <a:r>
-              <a:rPr>
-                <a:solidFill>
-                  <a:srgbClr val="657422"/>
-                </a:solidFill>
-                <a:latin typeface="Courier"/>
-              </a:rPr>
-              <a:t>species =</a:t>
-            </a:r>
-            <a:r>
-              <a:rPr>
-                <a:solidFill>
-                  <a:srgbClr val="003B4F"/>
-                </a:solidFill>
-                <a:latin typeface="Courier"/>
-              </a:rPr>
-              <a:t> </a:t>
-            </a:r>
-            <a:r>
-              <a:rPr>
-                <a:solidFill>
-                  <a:srgbClr val="AD0000"/>
-                </a:solidFill>
-                <a:latin typeface="Courier"/>
-              </a:rPr>
-              <a:t>1</a:t>
-            </a:r>
-            <a:r>
-              <a:rPr>
-                <a:solidFill>
-                  <a:srgbClr val="003B4F"/>
-                </a:solidFill>
-                <a:latin typeface="Courier"/>
-              </a:rPr>
-              <a:t>)</a:t>
-            </a:r>
-          </a:p>
-        </p:txBody>
-      </p:sp>
       <p:pic>
         <p:nvPicPr>
-          <p:cNvPr descr="Rceattle-overview-4_17_2025_files/figure-pptx/unnamed-chunk-10-1.png" id="0" name="Picture 1"/>
+          <p:cNvPr descr="Rceattle-overview-4_17_2025_files/figure-pptx/unnamed-chunk-11-20.png" id="0" name="Picture 1"/>
           <p:cNvPicPr>
             <a:picLocks noGrp="1" noChangeAspect="1"/>
           </p:cNvPicPr>
@@ -7321,8 +7346,8 @@
         </p:blipFill>
         <p:spPr bwMode="auto">
           <a:xfrm>
-            <a:off x="3568700" y="1117600"/>
-            <a:ext cx="5105400" cy="2552700"/>
+            <a:off x="1181100" y="1193800"/>
+            <a:ext cx="6781800" cy="3390900"/>
           </a:xfrm>
           <a:prstGeom prst="rect">
             <a:avLst/>
@@ -7357,6 +7382,36 @@
           <a:chExt cx="0" cy="0"/>
         </a:xfrm>
       </p:grpSpPr>
+      <p:pic>
+        <p:nvPicPr>
+          <p:cNvPr descr="Rceattle-overview-4_17_2025_files/figure-pptx/unnamed-chunk-11-21.png" id="0" name="Picture 1"/>
+          <p:cNvPicPr>
+            <a:picLocks noGrp="1" noChangeAspect="1"/>
+          </p:cNvPicPr>
+          <p:nvPr/>
+        </p:nvPicPr>
+        <p:blipFill>
+          <a:blip r:embed="rId2"/>
+          <a:stretch>
+            <a:fillRect/>
+          </a:stretch>
+        </p:blipFill>
+        <p:spPr bwMode="auto">
+          <a:xfrm>
+            <a:off x="1181100" y="1193800"/>
+            <a:ext cx="6781800" cy="3390900"/>
+          </a:xfrm>
+          <a:prstGeom prst="rect">
+            <a:avLst/>
+          </a:prstGeom>
+          <a:noFill/>
+          <a:ln w="9525">
+            <a:noFill/>
+            <a:headEnd/>
+            <a:tailEnd/>
+          </a:ln>
+        </p:spPr>
+      </p:pic>
     </p:spTree>
   </p:cSld>
 </p:sld>
@@ -7399,17 +7454,7 @@
             </a:pPr>
             <a:r>
               <a:rPr/>
-              <a:t>Existing </a:t>
-            </a:r>
-            <a:r>
-              <a:rPr>
-                <a:latin typeface="Courier"/>
-              </a:rPr>
-              <a:t>Rceattle</a:t>
-            </a:r>
-            <a:r>
-              <a:rPr/>
-              <a:t> applications</a:t>
+              <a:t>Key links</a:t>
             </a:r>
           </a:p>
         </p:txBody>
@@ -7429,38 +7474,29 @@
           <a:bodyPr/>
           <a:lstStyle/>
           <a:p>
-            <a:pPr lvl="0"/>
+            <a:pPr lvl="0" indent="0" marL="0">
+              <a:buNone/>
+            </a:pPr>
             <a:r>
               <a:rPr/>
-              <a:t>Pacific hake: 1 species (Sophia Wasserman)</a:t>
-            </a:r>
-          </a:p>
-          <a:p>
-            <a:pPr lvl="0"/>
-            <a:r>
-              <a:rPr/>
-              <a:t>GOA ATF SAFE model: 1 species (Kalei Shotwell and Grant Adams)</a:t>
-            </a:r>
-          </a:p>
-          <a:p>
-            <a:pPr lvl="0"/>
-            <a:r>
-              <a:rPr/>
-              <a:t>Hake + ATF: 2 species (Raquel Ruiz Diaz)</a:t>
-            </a:r>
-          </a:p>
-          <a:p>
-            <a:pPr lvl="0"/>
-            <a:r>
-              <a:rPr/>
-              <a:t>EBS CEATTLE: 3 species (Kirstin Holsman)</a:t>
-            </a:r>
-          </a:p>
-          <a:p>
-            <a:pPr lvl="0"/>
-            <a:r>
-              <a:rPr/>
-              <a:t>GOA CEATTLE: 4 species (Grant Adams)</a:t>
+              <a:t>GitHub: </a:t>
+            </a:r>
+            <a:r>
+              <a:rPr>
+                <a:hlinkClick r:id="rId2"/>
+              </a:rPr>
+              <a:t>https://github.com/grantdadams/Rceattle</a:t>
+            </a:r>
+          </a:p>
+          <a:p>
+            <a:pPr lvl="0" indent="0" marL="0">
+              <a:buNone/>
+            </a:pPr>
+            <a:r>
+              <a:rPr>
+                <a:hlinkClick r:id="rId3"/>
+              </a:rPr>
+              <a:t>On-boarding doc</a:t>
             </a:r>
           </a:p>
         </p:txBody>
@@ -7497,6 +7533,245 @@
             <p:ph type="title"/>
           </p:nvPr>
         </p:nvSpPr>
+        <p:spPr>
+          <a:xfrm>
+            <a:off x="457201" y="204787"/>
+            <a:ext cx="3008313" cy="871538"/>
+          </a:xfrm>
+        </p:spPr>
+        <p:txBody>
+          <a:bodyPr/>
+          <a:lstStyle/>
+          <a:p>
+            <a:pPr lvl="0" indent="0" marL="0">
+              <a:buNone/>
+            </a:pPr>
+            <a:r>
+              <a:rPr/>
+              <a:t>Retrospectives</a:t>
+            </a:r>
+          </a:p>
+        </p:txBody>
+      </p:sp>
+      <p:sp>
+        <p:nvSpPr>
+          <p:cNvPr id="4" name="Text Placeholder 3"/>
+          <p:cNvSpPr>
+            <a:spLocks noGrp="1"/>
+          </p:cNvSpPr>
+          <p:nvPr>
+            <p:ph idx="2" sz="half" type="body"/>
+          </p:nvPr>
+        </p:nvSpPr>
+        <p:spPr/>
+        <p:txBody>
+          <a:bodyPr/>
+          <a:lstStyle/>
+          <a:p>
+            <a:pPr lvl="0" indent="0">
+              <a:buNone/>
+            </a:pPr>
+            <a:r>
+              <a:rPr>
+                <a:solidFill>
+                  <a:srgbClr val="003B4F"/>
+                </a:solidFill>
+                <a:latin typeface="Courier"/>
+              </a:rPr>
+              <a:t>retro &lt;- </a:t>
+            </a:r>
+            <a:r>
+              <a:rPr>
+                <a:solidFill>
+                  <a:srgbClr val="4758AB"/>
+                </a:solidFill>
+                <a:latin typeface="Courier"/>
+              </a:rPr>
+              <a:t>retrospective</a:t>
+            </a:r>
+            <a:r>
+              <a:rPr>
+                <a:solidFill>
+                  <a:srgbClr val="003B4F"/>
+                </a:solidFill>
+                <a:latin typeface="Courier"/>
+              </a:rPr>
+              <a:t>(mymodel, </a:t>
+            </a:r>
+            <a:r>
+              <a:rPr>
+                <a:solidFill>
+                  <a:srgbClr val="657422"/>
+                </a:solidFill>
+                <a:latin typeface="Courier"/>
+              </a:rPr>
+              <a:t>peels =</a:t>
+            </a:r>
+            <a:r>
+              <a:rPr>
+                <a:solidFill>
+                  <a:srgbClr val="003B4F"/>
+                </a:solidFill>
+                <a:latin typeface="Courier"/>
+              </a:rPr>
+              <a:t> </a:t>
+            </a:r>
+            <a:r>
+              <a:rPr>
+                <a:solidFill>
+                  <a:srgbClr val="AD0000"/>
+                </a:solidFill>
+                <a:latin typeface="Courier"/>
+              </a:rPr>
+              <a:t>6</a:t>
+            </a:r>
+            <a:r>
+              <a:rPr>
+                <a:solidFill>
+                  <a:srgbClr val="003B4F"/>
+                </a:solidFill>
+                <a:latin typeface="Courier"/>
+              </a:rPr>
+              <a:t>)</a:t>
+            </a:r>
+            <a:br/>
+            <a:r>
+              <a:rPr>
+                <a:solidFill>
+                  <a:srgbClr val="4758AB"/>
+                </a:solidFill>
+                <a:latin typeface="Courier"/>
+              </a:rPr>
+              <a:t>plot_biomass</a:t>
+            </a:r>
+            <a:r>
+              <a:rPr>
+                <a:solidFill>
+                  <a:srgbClr val="003B4F"/>
+                </a:solidFill>
+                <a:latin typeface="Courier"/>
+              </a:rPr>
+              <a:t>(retro</a:t>
+            </a:r>
+            <a:r>
+              <a:rPr>
+                <a:solidFill>
+                  <a:srgbClr val="5E5E5E"/>
+                </a:solidFill>
+                <a:latin typeface="Courier"/>
+              </a:rPr>
+              <a:t>$</a:t>
+            </a:r>
+            <a:r>
+              <a:rPr>
+                <a:solidFill>
+                  <a:srgbClr val="003B4F"/>
+                </a:solidFill>
+                <a:latin typeface="Courier"/>
+              </a:rPr>
+              <a:t>Rceattle_list, </a:t>
+            </a:r>
+            <a:r>
+              <a:rPr>
+                <a:solidFill>
+                  <a:srgbClr val="657422"/>
+                </a:solidFill>
+                <a:latin typeface="Courier"/>
+              </a:rPr>
+              <a:t>species =</a:t>
+            </a:r>
+            <a:r>
+              <a:rPr>
+                <a:solidFill>
+                  <a:srgbClr val="003B4F"/>
+                </a:solidFill>
+                <a:latin typeface="Courier"/>
+              </a:rPr>
+              <a:t> </a:t>
+            </a:r>
+            <a:r>
+              <a:rPr>
+                <a:solidFill>
+                  <a:srgbClr val="AD0000"/>
+                </a:solidFill>
+                <a:latin typeface="Courier"/>
+              </a:rPr>
+              <a:t>1</a:t>
+            </a:r>
+            <a:r>
+              <a:rPr>
+                <a:solidFill>
+                  <a:srgbClr val="003B4F"/>
+                </a:solidFill>
+                <a:latin typeface="Courier"/>
+              </a:rPr>
+              <a:t>)</a:t>
+            </a:r>
+          </a:p>
+        </p:txBody>
+      </p:sp>
+      <p:pic>
+        <p:nvPicPr>
+          <p:cNvPr descr="Rceattle-overview-4_17_2025_files/figure-pptx/unnamed-chunk-12-1.png" id="0" name="Picture 1"/>
+          <p:cNvPicPr>
+            <a:picLocks noGrp="1" noChangeAspect="1"/>
+          </p:cNvPicPr>
+          <p:nvPr/>
+        </p:nvPicPr>
+        <p:blipFill>
+          <a:blip r:embed="rId2"/>
+          <a:stretch>
+            <a:fillRect/>
+          </a:stretch>
+        </p:blipFill>
+        <p:spPr bwMode="auto">
+          <a:xfrm>
+            <a:off x="3568700" y="1117600"/>
+            <a:ext cx="5105400" cy="2552700"/>
+          </a:xfrm>
+          <a:prstGeom prst="rect">
+            <a:avLst/>
+          </a:prstGeom>
+          <a:noFill/>
+          <a:ln w="9525">
+            <a:noFill/>
+            <a:headEnd/>
+            <a:tailEnd/>
+          </a:ln>
+        </p:spPr>
+      </p:pic>
+    </p:spTree>
+  </p:cSld>
+</p:sld>
+</file>
+
+<file path=ppt/slides/slide41.xml><?xml version="1.0" encoding="utf-8"?>
+<p:sld xmlns:a="http://schemas.openxmlformats.org/drawingml/2006/main" xmlns:r="http://schemas.openxmlformats.org/officeDocument/2006/relationships" xmlns:p="http://schemas.openxmlformats.org/presentationml/2006/main">
+  <p:cSld>
+    <p:spTree>
+      <p:nvGrpSpPr>
+        <p:cNvPr id="1" name=""/>
+        <p:cNvGrpSpPr/>
+        <p:nvPr/>
+      </p:nvGrpSpPr>
+      <p:grpSpPr>
+        <a:xfrm>
+          <a:off x="0" y="0"/>
+          <a:ext cx="0" cy="0"/>
+          <a:chOff x="0" y="0"/>
+          <a:chExt cx="0" cy="0"/>
+        </a:xfrm>
+      </p:grpSpPr>
+      <p:sp>
+        <p:nvSpPr>
+          <p:cNvPr id="2" name="Title 1"/>
+          <p:cNvSpPr>
+            <a:spLocks noGrp="1"/>
+          </p:cNvSpPr>
+          <p:nvPr>
+            <p:ph type="title"/>
+          </p:nvPr>
+        </p:nvSpPr>
         <p:spPr/>
         <p:txBody>
           <a:bodyPr/>
@@ -7770,7 +8045,7 @@
 </p:sld>
 </file>
 
-<file path=ppt/slides/slide41.xml><?xml version="1.0" encoding="utf-8"?>
+<file path=ppt/slides/slide42.xml><?xml version="1.0" encoding="utf-8"?>
 <p:sld xmlns:a="http://schemas.openxmlformats.org/drawingml/2006/main" xmlns:r="http://schemas.openxmlformats.org/officeDocument/2006/relationships" xmlns:p="http://schemas.openxmlformats.org/presentationml/2006/main">
   <p:cSld>
     <p:spTree>
@@ -7936,7 +8211,7 @@
       </p:sp>
       <p:pic>
         <p:nvPicPr>
-          <p:cNvPr descr="Rceattle-overview-4_17_2025_files/figure-pptx/unnamed-chunk-12-1.png" id="0" name="Picture 1"/>
+          <p:cNvPr descr="Rceattle-overview-4_17_2025_files/figure-pptx/unnamed-chunk-14-1.png" id="0" name="Picture 1"/>
           <p:cNvPicPr>
             <a:picLocks noGrp="1" noChangeAspect="1"/>
           </p:cNvPicPr>
@@ -8113,7 +8388,7 @@
       </p:sp>
       <p:pic>
         <p:nvPicPr>
-          <p:cNvPr descr="Rceattle-overview-4_17_2025_files/figure-pptx/unnamed-chunk-13-1.png" id="0" name="Picture 1"/>
+          <p:cNvPr descr="Rceattle-overview-4_17_2025_files/figure-pptx/unnamed-chunk-15-1.png" id="0" name="Picture 1"/>
           <p:cNvPicPr>
             <a:picLocks noGrp="1" noChangeAspect="1"/>
           </p:cNvPicPr>
@@ -8141,6 +8416,676 @@
           </a:ln>
         </p:spPr>
       </p:pic>
+    </p:spTree>
+  </p:cSld>
+</p:sld>
+</file>
+
+<file path=ppt/slides/slide43.xml><?xml version="1.0" encoding="utf-8"?>
+<p:sld xmlns:a="http://schemas.openxmlformats.org/drawingml/2006/main" xmlns:r="http://schemas.openxmlformats.org/officeDocument/2006/relationships" xmlns:p="http://schemas.openxmlformats.org/presentationml/2006/main">
+  <p:cSld>
+    <p:spTree>
+      <p:nvGrpSpPr>
+        <p:cNvPr id="1" name=""/>
+        <p:cNvGrpSpPr/>
+        <p:nvPr/>
+      </p:nvGrpSpPr>
+      <p:grpSpPr>
+        <a:xfrm>
+          <a:off x="0" y="0"/>
+          <a:ext cx="0" cy="0"/>
+          <a:chOff x="0" y="0"/>
+          <a:chExt cx="0" cy="0"/>
+        </a:xfrm>
+      </p:grpSpPr>
+      <p:sp>
+        <p:nvSpPr>
+          <p:cNvPr id="2" name="Title 1"/>
+          <p:cNvSpPr>
+            <a:spLocks noGrp="1"/>
+          </p:cNvSpPr>
+          <p:nvPr>
+            <p:ph type="title"/>
+          </p:nvPr>
+        </p:nvSpPr>
+        <p:spPr/>
+        <p:txBody>
+          <a:bodyPr/>
+          <a:lstStyle/>
+          <a:p>
+            <a:pPr lvl="0" indent="0" marL="0">
+              <a:buNone/>
+            </a:pPr>
+            <a:r>
+              <a:rPr/>
+              <a:t>MCMC with </a:t>
+            </a:r>
+            <a:r>
+              <a:rPr>
+                <a:latin typeface="Courier"/>
+              </a:rPr>
+              <a:t>tmbstan</a:t>
+            </a:r>
+          </a:p>
+        </p:txBody>
+      </p:sp>
+      <p:sp>
+        <p:nvSpPr>
+          <p:cNvPr id="3" name="Content Placeholder 2"/>
+          <p:cNvSpPr>
+            <a:spLocks noGrp="1"/>
+          </p:cNvSpPr>
+          <p:nvPr>
+            <p:ph idx="1"/>
+          </p:nvPr>
+        </p:nvSpPr>
+        <p:spPr/>
+        <p:txBody>
+          <a:bodyPr/>
+          <a:lstStyle/>
+          <a:p>
+            <a:pPr lvl="0" indent="0">
+              <a:buNone/>
+            </a:pPr>
+            <a:r>
+              <a:rPr i="1">
+                <a:solidFill>
+                  <a:srgbClr val="5E5E5E"/>
+                </a:solidFill>
+                <a:latin typeface="Courier"/>
+              </a:rPr>
+              <a:t>## Run in parallel</a:t>
+            </a:r>
+            <a:br/>
+            <a:r>
+              <a:rPr>
+                <a:solidFill>
+                  <a:srgbClr val="4758AB"/>
+                </a:solidFill>
+                <a:latin typeface="Courier"/>
+              </a:rPr>
+              <a:t>library</a:t>
+            </a:r>
+            <a:r>
+              <a:rPr>
+                <a:solidFill>
+                  <a:srgbClr val="003B4F"/>
+                </a:solidFill>
+                <a:latin typeface="Courier"/>
+              </a:rPr>
+              <a:t>(tmbstan)</a:t>
+            </a:r>
+            <a:br/>
+            <a:br/>
+            <a:r>
+              <a:rPr>
+                <a:solidFill>
+                  <a:srgbClr val="003B4F"/>
+                </a:solidFill>
+                <a:latin typeface="Courier"/>
+              </a:rPr>
+              <a:t>warmup = </a:t>
+            </a:r>
+            <a:r>
+              <a:rPr>
+                <a:solidFill>
+                  <a:srgbClr val="AD0000"/>
+                </a:solidFill>
+                <a:latin typeface="Courier"/>
+              </a:rPr>
+              <a:t>6000</a:t>
+            </a:r>
+            <a:r>
+              <a:rPr>
+                <a:solidFill>
+                  <a:srgbClr val="003B4F"/>
+                </a:solidFill>
+                <a:latin typeface="Courier"/>
+              </a:rPr>
+              <a:t>       </a:t>
+            </a:r>
+            <a:br/>
+            <a:r>
+              <a:rPr>
+                <a:solidFill>
+                  <a:srgbClr val="003B4F"/>
+                </a:solidFill>
+                <a:latin typeface="Courier"/>
+              </a:rPr>
+              <a:t>thin = </a:t>
+            </a:r>
+            <a:r>
+              <a:rPr>
+                <a:solidFill>
+                  <a:srgbClr val="AD0000"/>
+                </a:solidFill>
+                <a:latin typeface="Courier"/>
+              </a:rPr>
+              <a:t>1</a:t>
+            </a:r>
+            <a:br/>
+            <a:r>
+              <a:rPr>
+                <a:solidFill>
+                  <a:srgbClr val="003B4F"/>
+                </a:solidFill>
+                <a:latin typeface="Courier"/>
+              </a:rPr>
+              <a:t>iter = </a:t>
+            </a:r>
+            <a:r>
+              <a:rPr>
+                <a:solidFill>
+                  <a:srgbClr val="AD0000"/>
+                </a:solidFill>
+                <a:latin typeface="Courier"/>
+              </a:rPr>
+              <a:t>6000</a:t>
+            </a:r>
+            <a:r>
+              <a:rPr>
+                <a:solidFill>
+                  <a:srgbClr val="003B4F"/>
+                </a:solidFill>
+                <a:latin typeface="Courier"/>
+              </a:rPr>
+              <a:t>    </a:t>
+            </a:r>
+            <a:br/>
+            <a:br/>
+            <a:r>
+              <a:rPr>
+                <a:solidFill>
+                  <a:srgbClr val="003B4F"/>
+                </a:solidFill>
+                <a:latin typeface="Courier"/>
+              </a:rPr>
+              <a:t>cores &lt;- </a:t>
+            </a:r>
+            <a:r>
+              <a:rPr>
+                <a:solidFill>
+                  <a:srgbClr val="AD0000"/>
+                </a:solidFill>
+                <a:latin typeface="Courier"/>
+              </a:rPr>
+              <a:t>3</a:t>
+            </a:r>
+            <a:br/>
+            <a:r>
+              <a:rPr>
+                <a:solidFill>
+                  <a:srgbClr val="4758AB"/>
+                </a:solidFill>
+                <a:latin typeface="Courier"/>
+              </a:rPr>
+              <a:t>options</a:t>
+            </a:r>
+            <a:r>
+              <a:rPr>
+                <a:solidFill>
+                  <a:srgbClr val="003B4F"/>
+                </a:solidFill>
+                <a:latin typeface="Courier"/>
+              </a:rPr>
+              <a:t>(</a:t>
+            </a:r>
+            <a:r>
+              <a:rPr>
+                <a:solidFill>
+                  <a:srgbClr val="657422"/>
+                </a:solidFill>
+                <a:latin typeface="Courier"/>
+              </a:rPr>
+              <a:t>mc.cores =</a:t>
+            </a:r>
+            <a:r>
+              <a:rPr>
+                <a:solidFill>
+                  <a:srgbClr val="003B4F"/>
+                </a:solidFill>
+                <a:latin typeface="Courier"/>
+              </a:rPr>
+              <a:t> cores)</a:t>
+            </a:r>
+            <a:br/>
+            <a:r>
+              <a:rPr>
+                <a:solidFill>
+                  <a:srgbClr val="003B4F"/>
+                </a:solidFill>
+                <a:latin typeface="Courier"/>
+              </a:rPr>
+              <a:t>fit &lt;- </a:t>
+            </a:r>
+            <a:r>
+              <a:rPr>
+                <a:solidFill>
+                  <a:srgbClr val="4758AB"/>
+                </a:solidFill>
+                <a:latin typeface="Courier"/>
+              </a:rPr>
+              <a:t>tmbstan</a:t>
+            </a:r>
+            <a:r>
+              <a:rPr>
+                <a:solidFill>
+                  <a:srgbClr val="003B4F"/>
+                </a:solidFill>
+                <a:latin typeface="Courier"/>
+              </a:rPr>
+              <a:t>(mymodel</a:t>
+            </a:r>
+            <a:r>
+              <a:rPr>
+                <a:solidFill>
+                  <a:srgbClr val="5E5E5E"/>
+                </a:solidFill>
+                <a:latin typeface="Courier"/>
+              </a:rPr>
+              <a:t>$</a:t>
+            </a:r>
+            <a:r>
+              <a:rPr>
+                <a:solidFill>
+                  <a:srgbClr val="003B4F"/>
+                </a:solidFill>
+                <a:latin typeface="Courier"/>
+              </a:rPr>
+              <a:t>obj, </a:t>
+            </a:r>
+            <a:br/>
+            <a:r>
+              <a:rPr>
+                <a:solidFill>
+                  <a:srgbClr val="003B4F"/>
+                </a:solidFill>
+                <a:latin typeface="Courier"/>
+              </a:rPr>
+              <a:t>               </a:t>
+            </a:r>
+            <a:r>
+              <a:rPr>
+                <a:solidFill>
+                  <a:srgbClr val="657422"/>
+                </a:solidFill>
+                <a:latin typeface="Courier"/>
+              </a:rPr>
+              <a:t>init =</a:t>
+            </a:r>
+            <a:r>
+              <a:rPr>
+                <a:solidFill>
+                  <a:srgbClr val="003B4F"/>
+                </a:solidFill>
+                <a:latin typeface="Courier"/>
+              </a:rPr>
+              <a:t> mymodel</a:t>
+            </a:r>
+            <a:r>
+              <a:rPr>
+                <a:solidFill>
+                  <a:srgbClr val="5E5E5E"/>
+                </a:solidFill>
+                <a:latin typeface="Courier"/>
+              </a:rPr>
+              <a:t>$</a:t>
+            </a:r>
+            <a:r>
+              <a:rPr>
+                <a:solidFill>
+                  <a:srgbClr val="003B4F"/>
+                </a:solidFill>
+                <a:latin typeface="Courier"/>
+              </a:rPr>
+              <a:t>opt</a:t>
+            </a:r>
+            <a:r>
+              <a:rPr>
+                <a:solidFill>
+                  <a:srgbClr val="5E5E5E"/>
+                </a:solidFill>
+                <a:latin typeface="Courier"/>
+              </a:rPr>
+              <a:t>$</a:t>
+            </a:r>
+            <a:r>
+              <a:rPr>
+                <a:solidFill>
+                  <a:srgbClr val="003B4F"/>
+                </a:solidFill>
+                <a:latin typeface="Courier"/>
+              </a:rPr>
+              <a:t>par, </a:t>
+            </a:r>
+            <a:r>
+              <a:rPr>
+                <a:solidFill>
+                  <a:srgbClr val="5E5E5E"/>
+                </a:solidFill>
+                <a:latin typeface="Courier"/>
+              </a:rPr>
+              <a:t># Start from MLE</a:t>
+            </a:r>
+            <a:br/>
+            <a:r>
+              <a:rPr>
+                <a:solidFill>
+                  <a:srgbClr val="003B4F"/>
+                </a:solidFill>
+                <a:latin typeface="Courier"/>
+              </a:rPr>
+              <a:t>               </a:t>
+            </a:r>
+            <a:r>
+              <a:rPr>
+                <a:solidFill>
+                  <a:srgbClr val="657422"/>
+                </a:solidFill>
+                <a:latin typeface="Courier"/>
+              </a:rPr>
+              <a:t>chains=</a:t>
+            </a:r>
+            <a:r>
+              <a:rPr>
+                <a:solidFill>
+                  <a:srgbClr val="003B4F"/>
+                </a:solidFill>
+                <a:latin typeface="Courier"/>
+              </a:rPr>
+              <a:t>cores, </a:t>
+            </a:r>
+            <a:br/>
+            <a:r>
+              <a:rPr>
+                <a:solidFill>
+                  <a:srgbClr val="003B4F"/>
+                </a:solidFill>
+                <a:latin typeface="Courier"/>
+              </a:rPr>
+              <a:t>               </a:t>
+            </a:r>
+            <a:r>
+              <a:rPr>
+                <a:solidFill>
+                  <a:srgbClr val="657422"/>
+                </a:solidFill>
+                <a:latin typeface="Courier"/>
+              </a:rPr>
+              <a:t>open_progress=</a:t>
+            </a:r>
+            <a:r>
+              <a:rPr>
+                <a:solidFill>
+                  <a:srgbClr val="8F5902"/>
+                </a:solidFill>
+                <a:latin typeface="Courier"/>
+              </a:rPr>
+              <a:t>FALSE</a:t>
+            </a:r>
+            <a:r>
+              <a:rPr>
+                <a:solidFill>
+                  <a:srgbClr val="003B4F"/>
+                </a:solidFill>
+                <a:latin typeface="Courier"/>
+              </a:rPr>
+              <a:t>,</a:t>
+            </a:r>
+            <a:br/>
+            <a:r>
+              <a:rPr>
+                <a:solidFill>
+                  <a:srgbClr val="003B4F"/>
+                </a:solidFill>
+                <a:latin typeface="Courier"/>
+              </a:rPr>
+              <a:t>               </a:t>
+            </a:r>
+            <a:r>
+              <a:rPr>
+                <a:solidFill>
+                  <a:srgbClr val="657422"/>
+                </a:solidFill>
+                <a:latin typeface="Courier"/>
+              </a:rPr>
+              <a:t>warmup =</a:t>
+            </a:r>
+            <a:r>
+              <a:rPr>
+                <a:solidFill>
+                  <a:srgbClr val="003B4F"/>
+                </a:solidFill>
+                <a:latin typeface="Courier"/>
+              </a:rPr>
+              <a:t> warmup,      </a:t>
+            </a:r>
+            <a:br/>
+            <a:r>
+              <a:rPr>
+                <a:solidFill>
+                  <a:srgbClr val="003B4F"/>
+                </a:solidFill>
+                <a:latin typeface="Courier"/>
+              </a:rPr>
+              <a:t>               </a:t>
+            </a:r>
+            <a:r>
+              <a:rPr>
+                <a:solidFill>
+                  <a:srgbClr val="657422"/>
+                </a:solidFill>
+                <a:latin typeface="Courier"/>
+              </a:rPr>
+              <a:t>thin =</a:t>
+            </a:r>
+            <a:r>
+              <a:rPr>
+                <a:solidFill>
+                  <a:srgbClr val="003B4F"/>
+                </a:solidFill>
+                <a:latin typeface="Courier"/>
+              </a:rPr>
+              <a:t> thin,</a:t>
+            </a:r>
+            <a:br/>
+            <a:r>
+              <a:rPr>
+                <a:solidFill>
+                  <a:srgbClr val="003B4F"/>
+                </a:solidFill>
+                <a:latin typeface="Courier"/>
+              </a:rPr>
+              <a:t>               </a:t>
+            </a:r>
+            <a:r>
+              <a:rPr>
+                <a:solidFill>
+                  <a:srgbClr val="657422"/>
+                </a:solidFill>
+                <a:latin typeface="Courier"/>
+              </a:rPr>
+              <a:t>iter =</a:t>
+            </a:r>
+            <a:r>
+              <a:rPr>
+                <a:solidFill>
+                  <a:srgbClr val="003B4F"/>
+                </a:solidFill>
+                <a:latin typeface="Courier"/>
+              </a:rPr>
+              <a:t> iter </a:t>
+            </a:r>
+            <a:r>
+              <a:rPr>
+                <a:solidFill>
+                  <a:srgbClr val="5E5E5E"/>
+                </a:solidFill>
+                <a:latin typeface="Courier"/>
+              </a:rPr>
+              <a:t>*</a:t>
+            </a:r>
+            <a:r>
+              <a:rPr>
+                <a:solidFill>
+                  <a:srgbClr val="003B4F"/>
+                </a:solidFill>
+                <a:latin typeface="Courier"/>
+              </a:rPr>
+              <a:t> thin </a:t>
+            </a:r>
+            <a:r>
+              <a:rPr>
+                <a:solidFill>
+                  <a:srgbClr val="5E5E5E"/>
+                </a:solidFill>
+                <a:latin typeface="Courier"/>
+              </a:rPr>
+              <a:t>+</a:t>
+            </a:r>
+            <a:r>
+              <a:rPr>
+                <a:solidFill>
+                  <a:srgbClr val="003B4F"/>
+                </a:solidFill>
+                <a:latin typeface="Courier"/>
+              </a:rPr>
+              <a:t> warmup,     </a:t>
+            </a:r>
+            <a:br/>
+            <a:r>
+              <a:rPr>
+                <a:solidFill>
+                  <a:srgbClr val="003B4F"/>
+                </a:solidFill>
+                <a:latin typeface="Courier"/>
+              </a:rPr>
+              <a:t>               </a:t>
+            </a:r>
+            <a:r>
+              <a:rPr>
+                <a:solidFill>
+                  <a:srgbClr val="657422"/>
+                </a:solidFill>
+                <a:latin typeface="Courier"/>
+              </a:rPr>
+              <a:t>control =</a:t>
+            </a:r>
+            <a:r>
+              <a:rPr>
+                <a:solidFill>
+                  <a:srgbClr val="003B4F"/>
+                </a:solidFill>
+                <a:latin typeface="Courier"/>
+              </a:rPr>
+              <a:t> </a:t>
+            </a:r>
+            <a:r>
+              <a:rPr>
+                <a:solidFill>
+                  <a:srgbClr val="4758AB"/>
+                </a:solidFill>
+                <a:latin typeface="Courier"/>
+              </a:rPr>
+              <a:t>list</a:t>
+            </a:r>
+            <a:r>
+              <a:rPr>
+                <a:solidFill>
+                  <a:srgbClr val="003B4F"/>
+                </a:solidFill>
+                <a:latin typeface="Courier"/>
+              </a:rPr>
+              <a:t>(</a:t>
+            </a:r>
+            <a:r>
+              <a:rPr>
+                <a:solidFill>
+                  <a:srgbClr val="657422"/>
+                </a:solidFill>
+                <a:latin typeface="Courier"/>
+              </a:rPr>
+              <a:t>max_treedepth =</a:t>
+            </a:r>
+            <a:r>
+              <a:rPr>
+                <a:solidFill>
+                  <a:srgbClr val="003B4F"/>
+                </a:solidFill>
+                <a:latin typeface="Courier"/>
+              </a:rPr>
+              <a:t> </a:t>
+            </a:r>
+            <a:r>
+              <a:rPr>
+                <a:solidFill>
+                  <a:srgbClr val="AD0000"/>
+                </a:solidFill>
+                <a:latin typeface="Courier"/>
+              </a:rPr>
+              <a:t>14</a:t>
+            </a:r>
+            <a:r>
+              <a:rPr>
+                <a:solidFill>
+                  <a:srgbClr val="003B4F"/>
+                </a:solidFill>
+                <a:latin typeface="Courier"/>
+              </a:rPr>
+              <a:t>))</a:t>
+            </a:r>
+            <a:br/>
+            <a:br/>
+            <a:r>
+              <a:rPr i="1">
+                <a:solidFill>
+                  <a:srgbClr val="5E5E5E"/>
+                </a:solidFill>
+                <a:latin typeface="Courier"/>
+              </a:rPr>
+              <a:t>## To explore the fit use shinystan</a:t>
+            </a:r>
+            <a:br/>
+            <a:r>
+              <a:rPr>
+                <a:solidFill>
+                  <a:srgbClr val="4758AB"/>
+                </a:solidFill>
+                <a:latin typeface="Courier"/>
+              </a:rPr>
+              <a:t>library</a:t>
+            </a:r>
+            <a:r>
+              <a:rPr>
+                <a:solidFill>
+                  <a:srgbClr val="003B4F"/>
+                </a:solidFill>
+                <a:latin typeface="Courier"/>
+              </a:rPr>
+              <a:t>(shinystan)</a:t>
+            </a:r>
+            <a:br/>
+            <a:r>
+              <a:rPr>
+                <a:solidFill>
+                  <a:srgbClr val="4758AB"/>
+                </a:solidFill>
+                <a:latin typeface="Courier"/>
+              </a:rPr>
+              <a:t>launch_shinystan</a:t>
+            </a:r>
+            <a:r>
+              <a:rPr>
+                <a:solidFill>
+                  <a:srgbClr val="003B4F"/>
+                </a:solidFill>
+                <a:latin typeface="Courier"/>
+              </a:rPr>
+              <a:t>(fit)</a:t>
+            </a:r>
+          </a:p>
+        </p:txBody>
+      </p:sp>
     </p:spTree>
   </p:cSld>
 </p:sld>
@@ -8183,7 +9128,17 @@
             </a:pPr>
             <a:r>
               <a:rPr/>
-              <a:t>Motivation and goals</a:t>
+              <a:t>Existing </a:t>
+            </a:r>
+            <a:r>
+              <a:rPr>
+                <a:latin typeface="Courier"/>
+              </a:rPr>
+              <a:t>Rceattle</a:t>
+            </a:r>
+            <a:r>
+              <a:rPr/>
+              <a:t> applications</a:t>
             </a:r>
           </a:p>
         </p:txBody>
@@ -8203,48 +9158,38 @@
           <a:bodyPr/>
           <a:lstStyle/>
           <a:p>
-            <a:pPr lvl="0" indent="-342900" marL="342900">
-              <a:buAutoNum type="arabicPeriod"/>
-            </a:pPr>
+            <a:pPr lvl="0"/>
             <a:r>
               <a:rPr/>
-              <a:t>Tool for “easily” fitting single- and multi-species model variants</a:t>
-            </a:r>
-          </a:p>
-          <a:p>
-            <a:pPr lvl="0" indent="-342900" marL="342900">
-              <a:buAutoNum type="arabicPeriod"/>
-            </a:pPr>
+              <a:t>Pacific hake: 1 species (Sophia Wasserman)</a:t>
+            </a:r>
+          </a:p>
+          <a:p>
+            <a:pPr lvl="0"/>
             <a:r>
               <a:rPr/>
-              <a:t>Fit models with random effects</a:t>
-            </a:r>
-          </a:p>
-          <a:p>
-            <a:pPr lvl="0" indent="-342900" marL="342900">
-              <a:buAutoNum type="arabicPeriod"/>
-            </a:pPr>
+              <a:t>GOA ATF SAFE model: 1 species (Kalei Shotwell and Grant Adams)</a:t>
+            </a:r>
+          </a:p>
+          <a:p>
+            <a:pPr lvl="0"/>
             <a:r>
               <a:rPr/>
-              <a:t>Easily assess model performance via diagnostics, fit metrics, simulation, and MSE</a:t>
-            </a:r>
-          </a:p>
-          <a:p>
-            <a:pPr lvl="0" indent="-342900" marL="342900">
-              <a:buAutoNum type="arabicPeriod"/>
-            </a:pPr>
+              <a:t>Hake + ATF: 2 species (Raquel Ruiz Diaz)</a:t>
+            </a:r>
+          </a:p>
+          <a:p>
+            <a:pPr lvl="0"/>
             <a:r>
               <a:rPr/>
-              <a:t>Help build environmentally-linked research models and MSE test SAFE models</a:t>
-            </a:r>
-          </a:p>
-          <a:p>
-            <a:pPr lvl="0" indent="-342900" marL="342900">
-              <a:buAutoNum type="arabicPeriod"/>
-            </a:pPr>
+              <a:t>EBS CEATTLE: 3 species (Kirstin Holsman)</a:t>
+            </a:r>
+          </a:p>
+          <a:p>
+            <a:pPr lvl="0"/>
             <a:r>
               <a:rPr/>
-              <a:t>Eye towards flexibility and documentation from PhD angst recreating custom/hard-coded models</a:t>
+              <a:t>GOA CEATTLE: 4 species (Grant Adams)</a:t>
             </a:r>
           </a:p>
         </p:txBody>
@@ -8291,17 +9236,7 @@
             </a:pPr>
             <a:r>
               <a:rPr/>
-              <a:t>Broad </a:t>
-            </a:r>
-            <a:r>
-              <a:rPr>
-                <a:latin typeface="Courier"/>
-              </a:rPr>
-              <a:t>Rceattle</a:t>
-            </a:r>
-            <a:r>
-              <a:rPr/>
-              <a:t> workflow</a:t>
+              <a:t>Motivation and goals</a:t>
             </a:r>
           </a:p>
         </p:txBody>
@@ -8321,79 +9256,48 @@
           <a:bodyPr/>
           <a:lstStyle/>
           <a:p>
-            <a:pPr lvl="0" indent="0" marL="0">
-              <a:buNone/>
+            <a:pPr lvl="0" indent="-342900" marL="342900">
+              <a:buAutoNum type="arabicPeriod"/>
             </a:pPr>
             <a:r>
               <a:rPr/>
-              <a:t>Excel document to specify observation model:</a:t>
-            </a:r>
-          </a:p>
-          <a:p>
-            <a:pPr lvl="0"/>
+              <a:t>Tool for “easily” fitting single- and multi-species model variants</a:t>
+            </a:r>
+          </a:p>
+          <a:p>
+            <a:pPr lvl="0" indent="-342900" marL="342900">
+              <a:buAutoNum type="arabicPeriod"/>
+            </a:pPr>
             <a:r>
               <a:rPr/>
-              <a:t>Data (age/length composition, indices, catch)</a:t>
-            </a:r>
-          </a:p>
-          <a:p>
-            <a:pPr lvl="0"/>
+              <a:t>Fit models with random effects</a:t>
+            </a:r>
+          </a:p>
+          <a:p>
+            <a:pPr lvl="0" indent="-342900" marL="342900">
+              <a:buAutoNum type="arabicPeriod"/>
+            </a:pPr>
             <a:r>
               <a:rPr/>
-              <a:t>Observation model specifications (q, selectivity, likelihood)</a:t>
-            </a:r>
-          </a:p>
-          <a:p>
-            <a:pPr lvl="0"/>
+              <a:t>Easily assess model performance via diagnostics, fit metrics, simulation, and MSE</a:t>
+            </a:r>
+          </a:p>
+          <a:p>
+            <a:pPr lvl="0" indent="-342900" marL="342900">
+              <a:buAutoNum type="arabicPeriod"/>
+            </a:pPr>
             <a:r>
               <a:rPr/>
-              <a:t>“Fixed” inputs (weight-at-age, M, maturity, sex ratio, transition matrix, ageing error)</a:t>
-            </a:r>
-          </a:p>
-          <a:p>
-            <a:pPr lvl="0" indent="0" marL="0">
-              <a:buNone/>
+              <a:t>Help build environmentally-linked research models and MSE test SAFE models</a:t>
+            </a:r>
+          </a:p>
+          <a:p>
+            <a:pPr lvl="0" indent="-342900" marL="342900">
+              <a:buAutoNum type="arabicPeriod"/>
             </a:pPr>
             <a:r>
-              <a:rPr>
-                <a:latin typeface="Courier"/>
-              </a:rPr>
-              <a:t>R</a:t>
-            </a:r>
-            <a:r>
               <a:rPr/>
-              <a:t> wrapper function </a:t>
-            </a:r>
-            <a:r>
-              <a:rPr>
-                <a:latin typeface="Courier"/>
-              </a:rPr>
-              <a:t>fit_mod</a:t>
-            </a:r>
-            <a:r>
-              <a:rPr/>
-              <a:t> to specify and fit</a:t>
-            </a:r>
-          </a:p>
-          <a:p>
-            <a:pPr lvl="0"/>
-            <a:r>
-              <a:rPr/>
-              <a:t>Population dynamics specifications (M, initial conditions, recruitment, predation)</a:t>
-            </a:r>
-          </a:p>
-          <a:p>
-            <a:pPr lvl="0"/>
-            <a:r>
-              <a:rPr/>
-              <a:t>Forecast (HCR form, BRPs, recruitment)</a:t>
-            </a:r>
-          </a:p>
-          <a:p>
-            <a:pPr lvl="0"/>
-            <a:r>
-              <a:rPr/>
-              <a:t>Estimation controls</a:t>
+              <a:t>Eye towards flexibility and documentation from PhD angst recreating custom/hard-coded models</a:t>
             </a:r>
           </a:p>
         </p:txBody>
@@ -8470,488 +9374,79 @@
           <a:bodyPr/>
           <a:lstStyle/>
           <a:p>
-            <a:pPr lvl="0" indent="0">
+            <a:pPr lvl="0" indent="0" marL="0">
               <a:buNone/>
             </a:pPr>
             <a:r>
-              <a:rPr>
-                <a:solidFill>
-                  <a:srgbClr val="4758AB"/>
-                </a:solidFill>
-                <a:latin typeface="Courier"/>
-              </a:rPr>
-              <a:t>library</a:t>
-            </a:r>
-            <a:r>
-              <a:rPr>
-                <a:solidFill>
-                  <a:srgbClr val="003B4F"/>
-                </a:solidFill>
-                <a:latin typeface="Courier"/>
-              </a:rPr>
-              <a:t>(Rceattle)</a:t>
-            </a:r>
-            <a:br/>
-            <a:br/>
-            <a:r>
-              <a:rPr>
-                <a:solidFill>
-                  <a:srgbClr val="003B4F"/>
-                </a:solidFill>
-                <a:latin typeface="Courier"/>
-              </a:rPr>
-              <a:t>mydata &lt;- </a:t>
-            </a:r>
-            <a:r>
-              <a:rPr>
-                <a:solidFill>
-                  <a:srgbClr val="4758AB"/>
-                </a:solidFill>
-                <a:latin typeface="Courier"/>
-              </a:rPr>
-              <a:t>read_data</a:t>
-            </a:r>
-            <a:r>
-              <a:rPr>
-                <a:solidFill>
-                  <a:srgbClr val="003B4F"/>
-                </a:solidFill>
-                <a:latin typeface="Courier"/>
-              </a:rPr>
-              <a:t>( </a:t>
-            </a:r>
-            <a:r>
-              <a:rPr>
-                <a:solidFill>
-                  <a:srgbClr val="657422"/>
-                </a:solidFill>
-                <a:latin typeface="Courier"/>
-              </a:rPr>
-              <a:t>file =</a:t>
-            </a:r>
-            <a:r>
-              <a:rPr>
-                <a:solidFill>
-                  <a:srgbClr val="003B4F"/>
-                </a:solidFill>
-                <a:latin typeface="Courier"/>
-              </a:rPr>
-              <a:t> </a:t>
-            </a:r>
-            <a:r>
-              <a:rPr>
-                <a:solidFill>
-                  <a:srgbClr val="20794D"/>
-                </a:solidFill>
-                <a:latin typeface="Courier"/>
-              </a:rPr>
-              <a:t>"mydata.xlsx"</a:t>
-            </a:r>
-            <a:r>
-              <a:rPr>
-                <a:solidFill>
-                  <a:srgbClr val="003B4F"/>
-                </a:solidFill>
-                <a:latin typeface="Courier"/>
-              </a:rPr>
-              <a:t>) </a:t>
-            </a:r>
-            <a:r>
-              <a:rPr>
-                <a:solidFill>
-                  <a:srgbClr val="5E5E5E"/>
-                </a:solidFill>
-                <a:latin typeface="Courier"/>
-              </a:rPr>
-              <a:t># Reads in as list of data.frames</a:t>
-            </a:r>
-            <a:br/>
-            <a:br/>
-            <a:r>
-              <a:rPr>
-                <a:solidFill>
-                  <a:srgbClr val="003B4F"/>
-                </a:solidFill>
-                <a:latin typeface="Courier"/>
-              </a:rPr>
-              <a:t>mymodel &lt;- </a:t>
-            </a:r>
-            <a:r>
-              <a:rPr>
-                <a:solidFill>
-                  <a:srgbClr val="4758AB"/>
-                </a:solidFill>
+              <a:rPr/>
+              <a:t>Excel document to specify observation model:</a:t>
+            </a:r>
+          </a:p>
+          <a:p>
+            <a:pPr lvl="0"/>
+            <a:r>
+              <a:rPr/>
+              <a:t>Data (age/length composition, indices, catch)</a:t>
+            </a:r>
+          </a:p>
+          <a:p>
+            <a:pPr lvl="0"/>
+            <a:r>
+              <a:rPr/>
+              <a:t>Observation model specifications (q, selectivity, likelihood)</a:t>
+            </a:r>
+          </a:p>
+          <a:p>
+            <a:pPr lvl="0"/>
+            <a:r>
+              <a:rPr/>
+              <a:t>“Fixed” inputs (weight-at-age, M, maturity, sex ratio, transition matrix, ageing error)</a:t>
+            </a:r>
+          </a:p>
+          <a:p>
+            <a:pPr lvl="0" indent="0" marL="0">
+              <a:buNone/>
+            </a:pPr>
+            <a:r>
+              <a:rPr>
+                <a:latin typeface="Courier"/>
+              </a:rPr>
+              <a:t>R</a:t>
+            </a:r>
+            <a:r>
+              <a:rPr/>
+              <a:t> wrapper function </a:t>
+            </a:r>
+            <a:r>
+              <a:rPr>
                 <a:latin typeface="Courier"/>
               </a:rPr>
               <a:t>fit_mod</a:t>
             </a:r>
             <a:r>
-              <a:rPr>
-                <a:solidFill>
-                  <a:srgbClr val="003B4F"/>
-                </a:solidFill>
-                <a:latin typeface="Courier"/>
-              </a:rPr>
-              <a:t>(</a:t>
-            </a:r>
-            <a:r>
-              <a:rPr>
-                <a:solidFill>
-                  <a:srgbClr val="657422"/>
-                </a:solidFill>
-                <a:latin typeface="Courier"/>
-              </a:rPr>
-              <a:t>data_list =</a:t>
-            </a:r>
-            <a:r>
-              <a:rPr>
-                <a:solidFill>
-                  <a:srgbClr val="003B4F"/>
-                </a:solidFill>
-                <a:latin typeface="Courier"/>
-              </a:rPr>
-              <a:t> mydata,</a:t>
-            </a:r>
-            <a:br/>
-            <a:r>
-              <a:rPr>
-                <a:solidFill>
-                  <a:srgbClr val="003B4F"/>
-                </a:solidFill>
-                <a:latin typeface="Courier"/>
-              </a:rPr>
-              <a:t>                   </a:t>
-            </a:r>
-            <a:r>
-              <a:rPr>
-                <a:solidFill>
-                  <a:srgbClr val="657422"/>
-                </a:solidFill>
-                <a:latin typeface="Courier"/>
-              </a:rPr>
-              <a:t>inits =</a:t>
-            </a:r>
-            <a:r>
-              <a:rPr>
-                <a:solidFill>
-                  <a:srgbClr val="003B4F"/>
-                </a:solidFill>
-                <a:latin typeface="Courier"/>
-              </a:rPr>
-              <a:t> </a:t>
-            </a:r>
-            <a:r>
-              <a:rPr>
-                <a:solidFill>
-                  <a:srgbClr val="8F5902"/>
-                </a:solidFill>
-                <a:latin typeface="Courier"/>
-              </a:rPr>
-              <a:t>NULL</a:t>
-            </a:r>
-            <a:r>
-              <a:rPr>
-                <a:solidFill>
-                  <a:srgbClr val="003B4F"/>
-                </a:solidFill>
-                <a:latin typeface="Courier"/>
-              </a:rPr>
-              <a:t>,       </a:t>
-            </a:r>
-            <a:r>
-              <a:rPr>
-                <a:solidFill>
-                  <a:srgbClr val="5E5E5E"/>
-                </a:solidFill>
-                <a:latin typeface="Courier"/>
-              </a:rPr>
-              <a:t># Initial parameters at default</a:t>
-            </a:r>
-            <a:br/>
-            <a:r>
-              <a:rPr>
-                <a:solidFill>
-                  <a:srgbClr val="003B4F"/>
-                </a:solidFill>
-                <a:latin typeface="Courier"/>
-              </a:rPr>
-              <a:t>                   </a:t>
-            </a:r>
-            <a:r>
-              <a:rPr>
-                <a:solidFill>
-                  <a:srgbClr val="657422"/>
-                </a:solidFill>
-                <a:latin typeface="Courier"/>
-              </a:rPr>
-              <a:t>estimateMode =</a:t>
-            </a:r>
-            <a:r>
-              <a:rPr>
-                <a:solidFill>
-                  <a:srgbClr val="003B4F"/>
-                </a:solidFill>
-                <a:latin typeface="Courier"/>
-              </a:rPr>
-              <a:t> </a:t>
-            </a:r>
-            <a:r>
-              <a:rPr>
-                <a:solidFill>
-                  <a:srgbClr val="AD0000"/>
-                </a:solidFill>
-                <a:latin typeface="Courier"/>
-              </a:rPr>
-              <a:t>0</a:t>
-            </a:r>
-            <a:r>
-              <a:rPr>
-                <a:solidFill>
-                  <a:srgbClr val="003B4F"/>
-                </a:solidFill>
-                <a:latin typeface="Courier"/>
-              </a:rPr>
-              <a:t>,   </a:t>
-            </a:r>
-            <a:r>
-              <a:rPr>
-                <a:solidFill>
-                  <a:srgbClr val="5E5E5E"/>
-                </a:solidFill>
-                <a:latin typeface="Courier"/>
-              </a:rPr>
-              <a:t># Estimate</a:t>
-            </a:r>
-            <a:br/>
-            <a:r>
-              <a:rPr>
-                <a:solidFill>
-                  <a:srgbClr val="003B4F"/>
-                </a:solidFill>
-                <a:latin typeface="Courier"/>
-              </a:rPr>
-              <a:t>                   </a:t>
-            </a:r>
-            <a:r>
-              <a:rPr>
-                <a:solidFill>
-                  <a:srgbClr val="657422"/>
-                </a:solidFill>
-                <a:latin typeface="Courier"/>
-              </a:rPr>
-              <a:t>random_rec =</a:t>
-            </a:r>
-            <a:r>
-              <a:rPr>
-                <a:solidFill>
-                  <a:srgbClr val="003B4F"/>
-                </a:solidFill>
-                <a:latin typeface="Courier"/>
-              </a:rPr>
-              <a:t> </a:t>
-            </a:r>
-            <a:r>
-              <a:rPr>
-                <a:solidFill>
-                  <a:srgbClr val="8F5902"/>
-                </a:solidFill>
-                <a:latin typeface="Courier"/>
-              </a:rPr>
-              <a:t>FALSE</a:t>
-            </a:r>
-            <a:r>
-              <a:rPr>
-                <a:solidFill>
-                  <a:srgbClr val="003B4F"/>
-                </a:solidFill>
-                <a:latin typeface="Courier"/>
-              </a:rPr>
-              <a:t>, </a:t>
-            </a:r>
-            <a:r>
-              <a:rPr>
-                <a:solidFill>
-                  <a:srgbClr val="5E5E5E"/>
-                </a:solidFill>
-                <a:latin typeface="Courier"/>
-              </a:rPr>
-              <a:t># No random recruitment</a:t>
-            </a:r>
-            <a:br/>
-            <a:r>
-              <a:rPr>
-                <a:solidFill>
-                  <a:srgbClr val="003B4F"/>
-                </a:solidFill>
-                <a:latin typeface="Courier"/>
-              </a:rPr>
-              <a:t>                   </a:t>
-            </a:r>
-            <a:r>
-              <a:rPr>
-                <a:solidFill>
-                  <a:srgbClr val="657422"/>
-                </a:solidFill>
-                <a:latin typeface="Courier"/>
-              </a:rPr>
-              <a:t>msmMode =</a:t>
-            </a:r>
-            <a:r>
-              <a:rPr>
-                <a:solidFill>
-                  <a:srgbClr val="003B4F"/>
-                </a:solidFill>
-                <a:latin typeface="Courier"/>
-              </a:rPr>
-              <a:t> </a:t>
-            </a:r>
-            <a:r>
-              <a:rPr>
-                <a:solidFill>
-                  <a:srgbClr val="AD0000"/>
-                </a:solidFill>
-                <a:latin typeface="Courier"/>
-              </a:rPr>
-              <a:t>0</a:t>
-            </a:r>
-            <a:r>
-              <a:rPr>
-                <a:solidFill>
-                  <a:srgbClr val="003B4F"/>
-                </a:solidFill>
-                <a:latin typeface="Courier"/>
-              </a:rPr>
-              <a:t>,        </a:t>
-            </a:r>
-            <a:r>
-              <a:rPr>
-                <a:solidFill>
-                  <a:srgbClr val="5E5E5E"/>
-                </a:solidFill>
-                <a:latin typeface="Courier"/>
-              </a:rPr>
-              <a:t># Single species mode</a:t>
-            </a:r>
-            <a:br/>
-            <a:r>
-              <a:rPr>
-                <a:solidFill>
-                  <a:srgbClr val="003B4F"/>
-                </a:solidFill>
-                <a:latin typeface="Courier"/>
-              </a:rPr>
-              <a:t>                   </a:t>
-            </a:r>
-            <a:r>
-              <a:rPr>
-                <a:solidFill>
-                  <a:srgbClr val="657422"/>
-                </a:solidFill>
-                <a:latin typeface="Courier"/>
-              </a:rPr>
-              <a:t>phase =</a:t>
-            </a:r>
-            <a:r>
-              <a:rPr>
-                <a:solidFill>
-                  <a:srgbClr val="003B4F"/>
-                </a:solidFill>
-                <a:latin typeface="Courier"/>
-              </a:rPr>
-              <a:t> </a:t>
-            </a:r>
-            <a:r>
-              <a:rPr>
-                <a:solidFill>
-                  <a:srgbClr val="8F5902"/>
-                </a:solidFill>
-                <a:latin typeface="Courier"/>
-              </a:rPr>
-              <a:t>TRUE</a:t>
-            </a:r>
-            <a:r>
-              <a:rPr>
-                <a:solidFill>
-                  <a:srgbClr val="003B4F"/>
-                </a:solidFill>
-                <a:latin typeface="Courier"/>
-              </a:rPr>
-              <a:t>,       </a:t>
-            </a:r>
-            <a:r>
-              <a:rPr>
-                <a:solidFill>
-                  <a:srgbClr val="5E5E5E"/>
-                </a:solidFill>
-                <a:latin typeface="Courier"/>
-              </a:rPr>
-              <a:t># Phase model</a:t>
-            </a:r>
-            <a:br/>
-            <a:r>
-              <a:rPr>
-                <a:solidFill>
-                  <a:srgbClr val="003B4F"/>
-                </a:solidFill>
-                <a:latin typeface="Courier"/>
-              </a:rPr>
-              <a:t>                   </a:t>
-            </a:r>
-            <a:r>
-              <a:rPr>
-                <a:solidFill>
-                  <a:srgbClr val="657422"/>
-                </a:solidFill>
-                <a:latin typeface="Courier"/>
-              </a:rPr>
-              <a:t>verbose =</a:t>
-            </a:r>
-            <a:r>
-              <a:rPr>
-                <a:solidFill>
-                  <a:srgbClr val="003B4F"/>
-                </a:solidFill>
-                <a:latin typeface="Courier"/>
-              </a:rPr>
-              <a:t> </a:t>
-            </a:r>
-            <a:r>
-              <a:rPr>
-                <a:solidFill>
-                  <a:srgbClr val="AD0000"/>
-                </a:solidFill>
-                <a:latin typeface="Courier"/>
-              </a:rPr>
-              <a:t>1</a:t>
-            </a:r>
-            <a:r>
-              <a:rPr>
-                <a:solidFill>
-                  <a:srgbClr val="003B4F"/>
-                </a:solidFill>
-                <a:latin typeface="Courier"/>
-              </a:rPr>
-              <a:t>)</a:t>
-            </a:r>
-            <a:br/>
-            <a:br/>
-            <a:r>
-              <a:rPr>
-                <a:solidFill>
-                  <a:srgbClr val="4758AB"/>
-                </a:solidFill>
-                <a:latin typeface="Courier"/>
-              </a:rPr>
-              <a:t>plot_biomass</a:t>
-            </a:r>
-            <a:r>
-              <a:rPr>
-                <a:solidFill>
-                  <a:srgbClr val="003B4F"/>
-                </a:solidFill>
-                <a:latin typeface="Courier"/>
-              </a:rPr>
-              <a:t>(mymodel)</a:t>
+              <a:rPr/>
+              <a:t> to specify and fit</a:t>
+            </a:r>
+          </a:p>
+          <a:p>
+            <a:pPr lvl="0"/>
+            <a:r>
+              <a:rPr/>
+              <a:t>Population dynamics specifications (M, initial conditions, recruitment, predation)</a:t>
+            </a:r>
+          </a:p>
+          <a:p>
+            <a:pPr lvl="0"/>
+            <a:r>
+              <a:rPr/>
+              <a:t>Forecast (HCR form, BRPs, recruitment)</a:t>
+            </a:r>
+          </a:p>
+          <a:p>
+            <a:pPr lvl="0"/>
+            <a:r>
+              <a:rPr/>
+              <a:t>Estimation controls</a:t>
             </a:r>
           </a:p>
         </p:txBody>
@@ -8998,7 +9493,17 @@
             </a:pPr>
             <a:r>
               <a:rPr/>
-              <a:t>Basic excel data</a:t>
+              <a:t>Broad </a:t>
+            </a:r>
+            <a:r>
+              <a:rPr>
+                <a:latin typeface="Courier"/>
+              </a:rPr>
+              <a:t>Rceattle</a:t>
+            </a:r>
+            <a:r>
+              <a:rPr/>
+              <a:t> workflow</a:t>
             </a:r>
           </a:p>
         </p:txBody>
@@ -9018,66 +9523,497 @@
           <a:bodyPr/>
           <a:lstStyle/>
           <a:p>
-            <a:pPr lvl="0"/>
-            <a:r>
-              <a:rPr/>
-              <a:t>meta_data: overview and description</a:t>
-            </a:r>
-          </a:p>
-          <a:p>
-            <a:pPr lvl="0"/>
-            <a:r>
-              <a:rPr/>
-              <a:t>control: species, year, age, length</a:t>
-            </a:r>
-          </a:p>
-          <a:p>
-            <a:pPr lvl="0"/>
-            <a:r>
-              <a:rPr/>
-              <a:t>fleet_control: observation model specification</a:t>
-            </a:r>
-          </a:p>
-          <a:p>
-            <a:pPr lvl="0"/>
-            <a:r>
-              <a:rPr/>
-              <a:t>index_data: survey or fishery indices (biomass/numbers)</a:t>
-            </a:r>
-          </a:p>
-          <a:p>
-            <a:pPr lvl="0"/>
-            <a:r>
-              <a:rPr/>
-              <a:t>catch_data: fishery catches</a:t>
-            </a:r>
-          </a:p>
-          <a:p>
-            <a:pPr lvl="0"/>
-            <a:r>
-              <a:rPr/>
-              <a:t>comp_data: age/length comp</a:t>
-            </a:r>
-          </a:p>
-          <a:p>
-            <a:pPr lvl="0"/>
-            <a:r>
-              <a:rPr/>
-              <a:t>weight: empirical weight-at-age (time-varying, fleet specific)</a:t>
-            </a:r>
-          </a:p>
-          <a:p>
-            <a:pPr lvl="0"/>
-            <a:r>
-              <a:rPr/>
-              <a:t>maturity: maturity-at-age (time-invariant)</a:t>
-            </a:r>
-          </a:p>
-          <a:p>
-            <a:pPr lvl="0"/>
-            <a:r>
-              <a:rPr/>
-              <a:t>sex_ratio: sex-ratio-at-age (time-invariant)</a:t>
+            <a:pPr lvl="0" indent="0">
+              <a:buNone/>
+            </a:pPr>
+            <a:r>
+              <a:rPr>
+                <a:solidFill>
+                  <a:srgbClr val="4758AB"/>
+                </a:solidFill>
+                <a:latin typeface="Courier"/>
+              </a:rPr>
+              <a:t>library</a:t>
+            </a:r>
+            <a:r>
+              <a:rPr>
+                <a:solidFill>
+                  <a:srgbClr val="003B4F"/>
+                </a:solidFill>
+                <a:latin typeface="Courier"/>
+              </a:rPr>
+              <a:t>(Rceattle)</a:t>
+            </a:r>
+            <a:br/>
+            <a:br/>
+            <a:r>
+              <a:rPr>
+                <a:solidFill>
+                  <a:srgbClr val="003B4F"/>
+                </a:solidFill>
+                <a:latin typeface="Courier"/>
+              </a:rPr>
+              <a:t>mydata &lt;- </a:t>
+            </a:r>
+            <a:r>
+              <a:rPr>
+                <a:solidFill>
+                  <a:srgbClr val="4758AB"/>
+                </a:solidFill>
+                <a:latin typeface="Courier"/>
+              </a:rPr>
+              <a:t>read_data</a:t>
+            </a:r>
+            <a:r>
+              <a:rPr>
+                <a:solidFill>
+                  <a:srgbClr val="003B4F"/>
+                </a:solidFill>
+                <a:latin typeface="Courier"/>
+              </a:rPr>
+              <a:t>( </a:t>
+            </a:r>
+            <a:r>
+              <a:rPr>
+                <a:solidFill>
+                  <a:srgbClr val="657422"/>
+                </a:solidFill>
+                <a:latin typeface="Courier"/>
+              </a:rPr>
+              <a:t>file =</a:t>
+            </a:r>
+            <a:r>
+              <a:rPr>
+                <a:solidFill>
+                  <a:srgbClr val="003B4F"/>
+                </a:solidFill>
+                <a:latin typeface="Courier"/>
+              </a:rPr>
+              <a:t> </a:t>
+            </a:r>
+            <a:r>
+              <a:rPr>
+                <a:solidFill>
+                  <a:srgbClr val="20794D"/>
+                </a:solidFill>
+                <a:latin typeface="Courier"/>
+              </a:rPr>
+              <a:t>"mydata.xlsx"</a:t>
+            </a:r>
+            <a:r>
+              <a:rPr>
+                <a:solidFill>
+                  <a:srgbClr val="003B4F"/>
+                </a:solidFill>
+                <a:latin typeface="Courier"/>
+              </a:rPr>
+              <a:t>) </a:t>
+            </a:r>
+            <a:r>
+              <a:rPr>
+                <a:solidFill>
+                  <a:srgbClr val="5E5E5E"/>
+                </a:solidFill>
+                <a:latin typeface="Courier"/>
+              </a:rPr>
+              <a:t># Reads in as list of data.frames</a:t>
+            </a:r>
+            <a:br/>
+            <a:br/>
+            <a:r>
+              <a:rPr>
+                <a:solidFill>
+                  <a:srgbClr val="003B4F"/>
+                </a:solidFill>
+                <a:latin typeface="Courier"/>
+              </a:rPr>
+              <a:t>mymodel &lt;- </a:t>
+            </a:r>
+            <a:r>
+              <a:rPr>
+                <a:solidFill>
+                  <a:srgbClr val="4758AB"/>
+                </a:solidFill>
+                <a:latin typeface="Courier"/>
+              </a:rPr>
+              <a:t>fit_mod</a:t>
+            </a:r>
+            <a:r>
+              <a:rPr>
+                <a:solidFill>
+                  <a:srgbClr val="003B4F"/>
+                </a:solidFill>
+                <a:latin typeface="Courier"/>
+              </a:rPr>
+              <a:t>(</a:t>
+            </a:r>
+            <a:r>
+              <a:rPr>
+                <a:solidFill>
+                  <a:srgbClr val="657422"/>
+                </a:solidFill>
+                <a:latin typeface="Courier"/>
+              </a:rPr>
+              <a:t>data_list =</a:t>
+            </a:r>
+            <a:r>
+              <a:rPr>
+                <a:solidFill>
+                  <a:srgbClr val="003B4F"/>
+                </a:solidFill>
+                <a:latin typeface="Courier"/>
+              </a:rPr>
+              <a:t> mydata,</a:t>
+            </a:r>
+            <a:br/>
+            <a:r>
+              <a:rPr>
+                <a:solidFill>
+                  <a:srgbClr val="003B4F"/>
+                </a:solidFill>
+                <a:latin typeface="Courier"/>
+              </a:rPr>
+              <a:t>                   </a:t>
+            </a:r>
+            <a:r>
+              <a:rPr>
+                <a:solidFill>
+                  <a:srgbClr val="657422"/>
+                </a:solidFill>
+                <a:latin typeface="Courier"/>
+              </a:rPr>
+              <a:t>inits =</a:t>
+            </a:r>
+            <a:r>
+              <a:rPr>
+                <a:solidFill>
+                  <a:srgbClr val="003B4F"/>
+                </a:solidFill>
+                <a:latin typeface="Courier"/>
+              </a:rPr>
+              <a:t> </a:t>
+            </a:r>
+            <a:r>
+              <a:rPr>
+                <a:solidFill>
+                  <a:srgbClr val="8F5902"/>
+                </a:solidFill>
+                <a:latin typeface="Courier"/>
+              </a:rPr>
+              <a:t>NULL</a:t>
+            </a:r>
+            <a:r>
+              <a:rPr>
+                <a:solidFill>
+                  <a:srgbClr val="003B4F"/>
+                </a:solidFill>
+                <a:latin typeface="Courier"/>
+              </a:rPr>
+              <a:t>,       </a:t>
+            </a:r>
+            <a:r>
+              <a:rPr>
+                <a:solidFill>
+                  <a:srgbClr val="5E5E5E"/>
+                </a:solidFill>
+                <a:latin typeface="Courier"/>
+              </a:rPr>
+              <a:t># Initial parameters at default</a:t>
+            </a:r>
+            <a:br/>
+            <a:r>
+              <a:rPr>
+                <a:solidFill>
+                  <a:srgbClr val="003B4F"/>
+                </a:solidFill>
+                <a:latin typeface="Courier"/>
+              </a:rPr>
+              <a:t>                   </a:t>
+            </a:r>
+            <a:r>
+              <a:rPr>
+                <a:solidFill>
+                  <a:srgbClr val="657422"/>
+                </a:solidFill>
+                <a:latin typeface="Courier"/>
+              </a:rPr>
+              <a:t>estimateMode =</a:t>
+            </a:r>
+            <a:r>
+              <a:rPr>
+                <a:solidFill>
+                  <a:srgbClr val="003B4F"/>
+                </a:solidFill>
+                <a:latin typeface="Courier"/>
+              </a:rPr>
+              <a:t> </a:t>
+            </a:r>
+            <a:r>
+              <a:rPr>
+                <a:solidFill>
+                  <a:srgbClr val="AD0000"/>
+                </a:solidFill>
+                <a:latin typeface="Courier"/>
+              </a:rPr>
+              <a:t>0</a:t>
+            </a:r>
+            <a:r>
+              <a:rPr>
+                <a:solidFill>
+                  <a:srgbClr val="003B4F"/>
+                </a:solidFill>
+                <a:latin typeface="Courier"/>
+              </a:rPr>
+              <a:t>,   </a:t>
+            </a:r>
+            <a:r>
+              <a:rPr>
+                <a:solidFill>
+                  <a:srgbClr val="5E5E5E"/>
+                </a:solidFill>
+                <a:latin typeface="Courier"/>
+              </a:rPr>
+              <a:t># Estimate</a:t>
+            </a:r>
+            <a:br/>
+            <a:r>
+              <a:rPr>
+                <a:solidFill>
+                  <a:srgbClr val="003B4F"/>
+                </a:solidFill>
+                <a:latin typeface="Courier"/>
+              </a:rPr>
+              <a:t>                   </a:t>
+            </a:r>
+            <a:r>
+              <a:rPr>
+                <a:solidFill>
+                  <a:srgbClr val="657422"/>
+                </a:solidFill>
+                <a:latin typeface="Courier"/>
+              </a:rPr>
+              <a:t>random_rec =</a:t>
+            </a:r>
+            <a:r>
+              <a:rPr>
+                <a:solidFill>
+                  <a:srgbClr val="003B4F"/>
+                </a:solidFill>
+                <a:latin typeface="Courier"/>
+              </a:rPr>
+              <a:t> </a:t>
+            </a:r>
+            <a:r>
+              <a:rPr>
+                <a:solidFill>
+                  <a:srgbClr val="8F5902"/>
+                </a:solidFill>
+                <a:latin typeface="Courier"/>
+              </a:rPr>
+              <a:t>FALSE</a:t>
+            </a:r>
+            <a:r>
+              <a:rPr>
+                <a:solidFill>
+                  <a:srgbClr val="003B4F"/>
+                </a:solidFill>
+                <a:latin typeface="Courier"/>
+              </a:rPr>
+              <a:t>, </a:t>
+            </a:r>
+            <a:r>
+              <a:rPr>
+                <a:solidFill>
+                  <a:srgbClr val="5E5E5E"/>
+                </a:solidFill>
+                <a:latin typeface="Courier"/>
+              </a:rPr>
+              <a:t># No random recruitment</a:t>
+            </a:r>
+            <a:br/>
+            <a:r>
+              <a:rPr>
+                <a:solidFill>
+                  <a:srgbClr val="003B4F"/>
+                </a:solidFill>
+                <a:latin typeface="Courier"/>
+              </a:rPr>
+              <a:t>                   </a:t>
+            </a:r>
+            <a:r>
+              <a:rPr>
+                <a:solidFill>
+                  <a:srgbClr val="657422"/>
+                </a:solidFill>
+                <a:latin typeface="Courier"/>
+              </a:rPr>
+              <a:t>msmMode =</a:t>
+            </a:r>
+            <a:r>
+              <a:rPr>
+                <a:solidFill>
+                  <a:srgbClr val="003B4F"/>
+                </a:solidFill>
+                <a:latin typeface="Courier"/>
+              </a:rPr>
+              <a:t> </a:t>
+            </a:r>
+            <a:r>
+              <a:rPr>
+                <a:solidFill>
+                  <a:srgbClr val="AD0000"/>
+                </a:solidFill>
+                <a:latin typeface="Courier"/>
+              </a:rPr>
+              <a:t>0</a:t>
+            </a:r>
+            <a:r>
+              <a:rPr>
+                <a:solidFill>
+                  <a:srgbClr val="003B4F"/>
+                </a:solidFill>
+                <a:latin typeface="Courier"/>
+              </a:rPr>
+              <a:t>,        </a:t>
+            </a:r>
+            <a:r>
+              <a:rPr>
+                <a:solidFill>
+                  <a:srgbClr val="5E5E5E"/>
+                </a:solidFill>
+                <a:latin typeface="Courier"/>
+              </a:rPr>
+              <a:t># Single species mode</a:t>
+            </a:r>
+            <a:br/>
+            <a:r>
+              <a:rPr>
+                <a:solidFill>
+                  <a:srgbClr val="003B4F"/>
+                </a:solidFill>
+                <a:latin typeface="Courier"/>
+              </a:rPr>
+              <a:t>                   </a:t>
+            </a:r>
+            <a:r>
+              <a:rPr>
+                <a:solidFill>
+                  <a:srgbClr val="657422"/>
+                </a:solidFill>
+                <a:latin typeface="Courier"/>
+              </a:rPr>
+              <a:t>phase =</a:t>
+            </a:r>
+            <a:r>
+              <a:rPr>
+                <a:solidFill>
+                  <a:srgbClr val="003B4F"/>
+                </a:solidFill>
+                <a:latin typeface="Courier"/>
+              </a:rPr>
+              <a:t> </a:t>
+            </a:r>
+            <a:r>
+              <a:rPr>
+                <a:solidFill>
+                  <a:srgbClr val="8F5902"/>
+                </a:solidFill>
+                <a:latin typeface="Courier"/>
+              </a:rPr>
+              <a:t>TRUE</a:t>
+            </a:r>
+            <a:r>
+              <a:rPr>
+                <a:solidFill>
+                  <a:srgbClr val="003B4F"/>
+                </a:solidFill>
+                <a:latin typeface="Courier"/>
+              </a:rPr>
+              <a:t>,       </a:t>
+            </a:r>
+            <a:r>
+              <a:rPr>
+                <a:solidFill>
+                  <a:srgbClr val="5E5E5E"/>
+                </a:solidFill>
+                <a:latin typeface="Courier"/>
+              </a:rPr>
+              <a:t># Phase model</a:t>
+            </a:r>
+            <a:br/>
+            <a:r>
+              <a:rPr>
+                <a:solidFill>
+                  <a:srgbClr val="003B4F"/>
+                </a:solidFill>
+                <a:latin typeface="Courier"/>
+              </a:rPr>
+              <a:t>                   </a:t>
+            </a:r>
+            <a:r>
+              <a:rPr>
+                <a:solidFill>
+                  <a:srgbClr val="657422"/>
+                </a:solidFill>
+                <a:latin typeface="Courier"/>
+              </a:rPr>
+              <a:t>verbose =</a:t>
+            </a:r>
+            <a:r>
+              <a:rPr>
+                <a:solidFill>
+                  <a:srgbClr val="003B4F"/>
+                </a:solidFill>
+                <a:latin typeface="Courier"/>
+              </a:rPr>
+              <a:t> </a:t>
+            </a:r>
+            <a:r>
+              <a:rPr>
+                <a:solidFill>
+                  <a:srgbClr val="AD0000"/>
+                </a:solidFill>
+                <a:latin typeface="Courier"/>
+              </a:rPr>
+              <a:t>1</a:t>
+            </a:r>
+            <a:r>
+              <a:rPr>
+                <a:solidFill>
+                  <a:srgbClr val="003B4F"/>
+                </a:solidFill>
+                <a:latin typeface="Courier"/>
+              </a:rPr>
+              <a:t>)        </a:t>
+            </a:r>
+            <a:r>
+              <a:rPr>
+                <a:solidFill>
+                  <a:srgbClr val="5E5E5E"/>
+                </a:solidFill>
+                <a:latin typeface="Courier"/>
+              </a:rPr>
+              <a:t># Minimal messaging</a:t>
+            </a:r>
+            <a:br/>
+            <a:br/>
+            <a:r>
+              <a:rPr>
+                <a:solidFill>
+                  <a:srgbClr val="4758AB"/>
+                </a:solidFill>
+                <a:latin typeface="Courier"/>
+              </a:rPr>
+              <a:t>plot_biomass</a:t>
+            </a:r>
+            <a:r>
+              <a:rPr>
+                <a:solidFill>
+                  <a:srgbClr val="003B4F"/>
+                </a:solidFill>
+                <a:latin typeface="Courier"/>
+              </a:rPr>
+              <a:t>(mymodel)</a:t>
             </a:r>
           </a:p>
         </p:txBody>
@@ -9124,17 +10060,7 @@
             </a:pPr>
             <a:r>
               <a:rPr/>
-              <a:t>Selectivity specifications (</a:t>
-            </a:r>
-            <a:r>
-              <a:rPr>
-                <a:latin typeface="Courier"/>
-              </a:rPr>
-              <a:t>fleet_control</a:t>
-            </a:r>
-            <a:r>
-              <a:rPr/>
-              <a:t>)</a:t>
+              <a:t>Outputs</a:t>
             </a:r>
           </a:p>
         </p:txBody>
@@ -9146,7 +10072,7 @@
             <a:spLocks noGrp="1"/>
           </p:cNvSpPr>
           <p:nvPr>
-            <p:ph idx="1" sz="half"/>
+            <p:ph idx="1"/>
           </p:nvPr>
         </p:nvSpPr>
         <p:spPr/>
@@ -9154,118 +10080,532 @@
           <a:bodyPr/>
           <a:lstStyle/>
           <a:p>
-            <a:pPr lvl="0" indent="0" marL="0">
+            <a:pPr lvl="0" indent="0">
               <a:buNone/>
             </a:pPr>
             <a:r>
               <a:rPr>
-                <a:latin typeface="Courier"/>
-              </a:rPr>
-              <a:t>selectivity</a:t>
-            </a:r>
-          </a:p>
-          <a:p>
-            <a:pPr lvl="0"/>
-            <a:r>
-              <a:rPr/>
-              <a:t>0: empirical selectivity</a:t>
-            </a:r>
-          </a:p>
-          <a:p>
-            <a:pPr lvl="0"/>
-            <a:r>
-              <a:rPr/>
-              <a:t>1: logistic selectivity</a:t>
-            </a:r>
-          </a:p>
-          <a:p>
-            <a:pPr lvl="0"/>
-            <a:r>
-              <a:rPr/>
-              <a:t>2: non-parametric selecitivty (Ianelli)</a:t>
-            </a:r>
-          </a:p>
-          <a:p>
-            <a:pPr lvl="0"/>
-            <a:r>
-              <a:rPr/>
-              <a:t>3: double logistic</a:t>
-            </a:r>
-          </a:p>
-          <a:p>
-            <a:pPr lvl="0"/>
-            <a:r>
-              <a:rPr/>
-              <a:t>4: descending logistic</a:t>
-            </a:r>
-          </a:p>
-          <a:p>
-            <a:pPr lvl="0"/>
-            <a:r>
-              <a:rPr/>
-              <a:t>5: non-parametric selectivity (Taylor/Hake)</a:t>
-            </a:r>
-          </a:p>
-        </p:txBody>
-      </p:sp>
-      <p:sp>
-        <p:nvSpPr>
-          <p:cNvPr id="4" name="Content Placeholder 3"/>
-          <p:cNvSpPr>
-            <a:spLocks noGrp="1"/>
-          </p:cNvSpPr>
-          <p:nvPr>
-            <p:ph idx="2" sz="half"/>
-          </p:nvPr>
-        </p:nvSpPr>
-        <p:spPr/>
-        <p:txBody>
-          <a:bodyPr/>
-          <a:lstStyle/>
-          <a:p>
-            <a:pPr lvl="0" indent="0" marL="0">
+                <a:solidFill>
+                  <a:srgbClr val="4758AB"/>
+                </a:solidFill>
+                <a:latin typeface="Courier"/>
+              </a:rPr>
+              <a:t>library</a:t>
+            </a:r>
+            <a:r>
+              <a:rPr>
+                <a:solidFill>
+                  <a:srgbClr val="003B4F"/>
+                </a:solidFill>
+                <a:latin typeface="Courier"/>
+              </a:rPr>
+              <a:t>(Rceattle)</a:t>
+            </a:r>
+            <a:br/>
+            <a:br/>
+            <a:r>
+              <a:rPr>
+                <a:solidFill>
+                  <a:srgbClr val="4758AB"/>
+                </a:solidFill>
+                <a:latin typeface="Courier"/>
+              </a:rPr>
+              <a:t>data</a:t>
+            </a:r>
+            <a:r>
+              <a:rPr>
+                <a:solidFill>
+                  <a:srgbClr val="003B4F"/>
+                </a:solidFill>
+                <a:latin typeface="Courier"/>
+              </a:rPr>
+              <a:t>(</a:t>
+            </a:r>
+            <a:r>
+              <a:rPr>
+                <a:solidFill>
+                  <a:srgbClr val="20794D"/>
+                </a:solidFill>
+                <a:latin typeface="Courier"/>
+              </a:rPr>
+              <a:t>"GOApollock"</a:t>
+            </a:r>
+            <a:r>
+              <a:rPr>
+                <a:solidFill>
+                  <a:srgbClr val="003B4F"/>
+                </a:solidFill>
+                <a:latin typeface="Courier"/>
+              </a:rPr>
+              <a:t>)                              </a:t>
+            </a:r>
+            <a:r>
+              <a:rPr>
+                <a:solidFill>
+                  <a:srgbClr val="5E5E5E"/>
+                </a:solidFill>
+                <a:latin typeface="Courier"/>
+              </a:rPr>
+              <a:t># 2018 Pollock model </a:t>
+            </a:r>
+            <a:br/>
+            <a:br/>
+            <a:r>
+              <a:rPr>
+                <a:solidFill>
+                  <a:srgbClr val="003B4F"/>
+                </a:solidFill>
+                <a:latin typeface="Courier"/>
+              </a:rPr>
+              <a:t>mymodel &lt;- Rceattle</a:t>
+            </a:r>
+            <a:r>
+              <a:rPr>
+                <a:solidFill>
+                  <a:srgbClr val="5E5E5E"/>
+                </a:solidFill>
+                <a:latin typeface="Courier"/>
+              </a:rPr>
+              <a:t>::</a:t>
+            </a:r>
+            <a:r>
+              <a:rPr>
+                <a:solidFill>
+                  <a:srgbClr val="4758AB"/>
+                </a:solidFill>
+                <a:latin typeface="Courier"/>
+              </a:rPr>
+              <a:t>fit_mod</a:t>
+            </a:r>
+            <a:r>
+              <a:rPr>
+                <a:solidFill>
+                  <a:srgbClr val="003B4F"/>
+                </a:solidFill>
+                <a:latin typeface="Courier"/>
+              </a:rPr>
+              <a:t>(</a:t>
+            </a:r>
+            <a:r>
+              <a:rPr>
+                <a:solidFill>
+                  <a:srgbClr val="657422"/>
+                </a:solidFill>
+                <a:latin typeface="Courier"/>
+              </a:rPr>
+              <a:t>data_list =</a:t>
+            </a:r>
+            <a:r>
+              <a:rPr>
+                <a:solidFill>
+                  <a:srgbClr val="003B4F"/>
+                </a:solidFill>
+                <a:latin typeface="Courier"/>
+              </a:rPr>
+              <a:t> GOApollock,</a:t>
+            </a:r>
+            <a:br/>
+            <a:r>
+              <a:rPr>
+                <a:solidFill>
+                  <a:srgbClr val="003B4F"/>
+                </a:solidFill>
+                <a:latin typeface="Courier"/>
+              </a:rPr>
+              <a:t>                            </a:t>
+            </a:r>
+            <a:r>
+              <a:rPr>
+                <a:solidFill>
+                  <a:srgbClr val="657422"/>
+                </a:solidFill>
+                <a:latin typeface="Courier"/>
+              </a:rPr>
+              <a:t>inits =</a:t>
+            </a:r>
+            <a:r>
+              <a:rPr>
+                <a:solidFill>
+                  <a:srgbClr val="003B4F"/>
+                </a:solidFill>
+                <a:latin typeface="Courier"/>
+              </a:rPr>
+              <a:t> </a:t>
+            </a:r>
+            <a:r>
+              <a:rPr>
+                <a:solidFill>
+                  <a:srgbClr val="8F5902"/>
+                </a:solidFill>
+                <a:latin typeface="Courier"/>
+              </a:rPr>
+              <a:t>NULL</a:t>
+            </a:r>
+            <a:r>
+              <a:rPr>
+                <a:solidFill>
+                  <a:srgbClr val="003B4F"/>
+                </a:solidFill>
+                <a:latin typeface="Courier"/>
+              </a:rPr>
+              <a:t>,       </a:t>
+            </a:r>
+            <a:r>
+              <a:rPr>
+                <a:solidFill>
+                  <a:srgbClr val="5E5E5E"/>
+                </a:solidFill>
+                <a:latin typeface="Courier"/>
+              </a:rPr>
+              <a:t># Initial parameters = 0</a:t>
+            </a:r>
+            <a:br/>
+            <a:r>
+              <a:rPr>
+                <a:solidFill>
+                  <a:srgbClr val="003B4F"/>
+                </a:solidFill>
+                <a:latin typeface="Courier"/>
+              </a:rPr>
+              <a:t>                            </a:t>
+            </a:r>
+            <a:r>
+              <a:rPr>
+                <a:solidFill>
+                  <a:srgbClr val="657422"/>
+                </a:solidFill>
+                <a:latin typeface="Courier"/>
+              </a:rPr>
+              <a:t>file =</a:t>
+            </a:r>
+            <a:r>
+              <a:rPr>
+                <a:solidFill>
+                  <a:srgbClr val="003B4F"/>
+                </a:solidFill>
+                <a:latin typeface="Courier"/>
+              </a:rPr>
+              <a:t> </a:t>
+            </a:r>
+            <a:r>
+              <a:rPr>
+                <a:solidFill>
+                  <a:srgbClr val="8F5902"/>
+                </a:solidFill>
+                <a:latin typeface="Courier"/>
+              </a:rPr>
+              <a:t>NULL</a:t>
+            </a:r>
+            <a:r>
+              <a:rPr>
+                <a:solidFill>
+                  <a:srgbClr val="003B4F"/>
+                </a:solidFill>
+                <a:latin typeface="Courier"/>
+              </a:rPr>
+              <a:t>,        </a:t>
+            </a:r>
+            <a:r>
+              <a:rPr>
+                <a:solidFill>
+                  <a:srgbClr val="5E5E5E"/>
+                </a:solidFill>
+                <a:latin typeface="Courier"/>
+              </a:rPr>
+              <a:t># Don't save</a:t>
+            </a:r>
+            <a:br/>
+            <a:r>
+              <a:rPr>
+                <a:solidFill>
+                  <a:srgbClr val="003B4F"/>
+                </a:solidFill>
+                <a:latin typeface="Courier"/>
+              </a:rPr>
+              <a:t>                            </a:t>
+            </a:r>
+            <a:r>
+              <a:rPr>
+                <a:solidFill>
+                  <a:srgbClr val="657422"/>
+                </a:solidFill>
+                <a:latin typeface="Courier"/>
+              </a:rPr>
+              <a:t>estimateMode =</a:t>
+            </a:r>
+            <a:r>
+              <a:rPr>
+                <a:solidFill>
+                  <a:srgbClr val="003B4F"/>
+                </a:solidFill>
+                <a:latin typeface="Courier"/>
+              </a:rPr>
+              <a:t> </a:t>
+            </a:r>
+            <a:r>
+              <a:rPr>
+                <a:solidFill>
+                  <a:srgbClr val="AD0000"/>
+                </a:solidFill>
+                <a:latin typeface="Courier"/>
+              </a:rPr>
+              <a:t>0</a:t>
+            </a:r>
+            <a:r>
+              <a:rPr>
+                <a:solidFill>
+                  <a:srgbClr val="003B4F"/>
+                </a:solidFill>
+                <a:latin typeface="Courier"/>
+              </a:rPr>
+              <a:t>,   </a:t>
+            </a:r>
+            <a:r>
+              <a:rPr>
+                <a:solidFill>
+                  <a:srgbClr val="5E5E5E"/>
+                </a:solidFill>
+                <a:latin typeface="Courier"/>
+              </a:rPr>
+              <a:t># Estimate</a:t>
+            </a:r>
+            <a:br/>
+            <a:r>
+              <a:rPr>
+                <a:solidFill>
+                  <a:srgbClr val="003B4F"/>
+                </a:solidFill>
+                <a:latin typeface="Courier"/>
+              </a:rPr>
+              <a:t>                            </a:t>
+            </a:r>
+            <a:r>
+              <a:rPr>
+                <a:solidFill>
+                  <a:srgbClr val="657422"/>
+                </a:solidFill>
+                <a:latin typeface="Courier"/>
+              </a:rPr>
+              <a:t>random_rec =</a:t>
+            </a:r>
+            <a:r>
+              <a:rPr>
+                <a:solidFill>
+                  <a:srgbClr val="003B4F"/>
+                </a:solidFill>
+                <a:latin typeface="Courier"/>
+              </a:rPr>
+              <a:t> </a:t>
+            </a:r>
+            <a:r>
+              <a:rPr>
+                <a:solidFill>
+                  <a:srgbClr val="8F5902"/>
+                </a:solidFill>
+                <a:latin typeface="Courier"/>
+              </a:rPr>
+              <a:t>FALSE</a:t>
+            </a:r>
+            <a:r>
+              <a:rPr>
+                <a:solidFill>
+                  <a:srgbClr val="003B4F"/>
+                </a:solidFill>
+                <a:latin typeface="Courier"/>
+              </a:rPr>
+              <a:t>, </a:t>
+            </a:r>
+            <a:r>
+              <a:rPr>
+                <a:solidFill>
+                  <a:srgbClr val="5E5E5E"/>
+                </a:solidFill>
+                <a:latin typeface="Courier"/>
+              </a:rPr>
+              <a:t># No random recruitment</a:t>
+            </a:r>
+            <a:br/>
+            <a:r>
+              <a:rPr>
+                <a:solidFill>
+                  <a:srgbClr val="003B4F"/>
+                </a:solidFill>
+                <a:latin typeface="Courier"/>
+              </a:rPr>
+              <a:t>                            </a:t>
+            </a:r>
+            <a:r>
+              <a:rPr>
+                <a:solidFill>
+                  <a:srgbClr val="657422"/>
+                </a:solidFill>
+                <a:latin typeface="Courier"/>
+              </a:rPr>
+              <a:t>msmMode =</a:t>
+            </a:r>
+            <a:r>
+              <a:rPr>
+                <a:solidFill>
+                  <a:srgbClr val="003B4F"/>
+                </a:solidFill>
+                <a:latin typeface="Courier"/>
+              </a:rPr>
+              <a:t> </a:t>
+            </a:r>
+            <a:r>
+              <a:rPr>
+                <a:solidFill>
+                  <a:srgbClr val="AD0000"/>
+                </a:solidFill>
+                <a:latin typeface="Courier"/>
+              </a:rPr>
+              <a:t>0</a:t>
+            </a:r>
+            <a:r>
+              <a:rPr>
+                <a:solidFill>
+                  <a:srgbClr val="003B4F"/>
+                </a:solidFill>
+                <a:latin typeface="Courier"/>
+              </a:rPr>
+              <a:t>,        </a:t>
+            </a:r>
+            <a:r>
+              <a:rPr>
+                <a:solidFill>
+                  <a:srgbClr val="5E5E5E"/>
+                </a:solidFill>
+                <a:latin typeface="Courier"/>
+              </a:rPr>
+              <a:t># Single species mode</a:t>
+            </a:r>
+            <a:br/>
+            <a:r>
+              <a:rPr>
+                <a:solidFill>
+                  <a:srgbClr val="003B4F"/>
+                </a:solidFill>
+                <a:latin typeface="Courier"/>
+              </a:rPr>
+              <a:t>                            </a:t>
+            </a:r>
+            <a:r>
+              <a:rPr>
+                <a:solidFill>
+                  <a:srgbClr val="657422"/>
+                </a:solidFill>
+                <a:latin typeface="Courier"/>
+              </a:rPr>
+              <a:t>phase =</a:t>
+            </a:r>
+            <a:r>
+              <a:rPr>
+                <a:solidFill>
+                  <a:srgbClr val="003B4F"/>
+                </a:solidFill>
+                <a:latin typeface="Courier"/>
+              </a:rPr>
+              <a:t> </a:t>
+            </a:r>
+            <a:r>
+              <a:rPr>
+                <a:solidFill>
+                  <a:srgbClr val="8F5902"/>
+                </a:solidFill>
+                <a:latin typeface="Courier"/>
+              </a:rPr>
+              <a:t>TRUE</a:t>
+            </a:r>
+            <a:r>
+              <a:rPr>
+                <a:solidFill>
+                  <a:srgbClr val="003B4F"/>
+                </a:solidFill>
+                <a:latin typeface="Courier"/>
+              </a:rPr>
+              <a:t>,</a:t>
+            </a:r>
+            <a:br/>
+            <a:r>
+              <a:rPr>
+                <a:solidFill>
+                  <a:srgbClr val="003B4F"/>
+                </a:solidFill>
+                <a:latin typeface="Courier"/>
+              </a:rPr>
+              <a:t>                            </a:t>
+            </a:r>
+            <a:r>
+              <a:rPr>
+                <a:solidFill>
+                  <a:srgbClr val="657422"/>
+                </a:solidFill>
+                <a:latin typeface="Courier"/>
+              </a:rPr>
+              <a:t>verbose =</a:t>
+            </a:r>
+            <a:r>
+              <a:rPr>
+                <a:solidFill>
+                  <a:srgbClr val="003B4F"/>
+                </a:solidFill>
+                <a:latin typeface="Courier"/>
+              </a:rPr>
+              <a:t> </a:t>
+            </a:r>
+            <a:r>
+              <a:rPr>
+                <a:solidFill>
+                  <a:srgbClr val="AD0000"/>
+                </a:solidFill>
+                <a:latin typeface="Courier"/>
+              </a:rPr>
+              <a:t>1</a:t>
+            </a:r>
+            <a:r>
+              <a:rPr>
+                <a:solidFill>
+                  <a:srgbClr val="003B4F"/>
+                </a:solidFill>
+                <a:latin typeface="Courier"/>
+              </a:rPr>
+              <a:t>)</a:t>
+            </a:r>
+          </a:p>
+          <a:p>
+            <a:pPr lvl="0" indent="0">
               <a:buNone/>
             </a:pPr>
             <a:r>
               <a:rPr>
-                <a:latin typeface="Courier"/>
-              </a:rPr>
-              <a:t>Time_varying_sel</a:t>
-            </a:r>
-          </a:p>
-          <a:p>
-            <a:pPr lvl="0"/>
-            <a:r>
-              <a:rPr/>
-              <a:t>0: no</a:t>
-            </a:r>
-          </a:p>
-          <a:p>
-            <a:pPr lvl="0"/>
-            <a:r>
-              <a:rPr/>
-              <a:t>1: random deviates</a:t>
-            </a:r>
-          </a:p>
-          <a:p>
-            <a:pPr lvl="0"/>
-            <a:r>
-              <a:rPr/>
-              <a:t>3: time blocks</a:t>
-            </a:r>
-          </a:p>
-          <a:p>
-            <a:pPr lvl="0"/>
-            <a:r>
-              <a:rPr/>
-              <a:t>4: random walk</a:t>
-            </a:r>
-          </a:p>
-          <a:p>
-            <a:pPr lvl="0"/>
-            <a:r>
-              <a:rPr/>
-              <a:t>5: random walk on ascending portion of double logistic only.</a:t>
+                <a:solidFill>
+                  <a:srgbClr val="4758AB"/>
+                </a:solidFill>
+                <a:latin typeface="Courier"/>
+              </a:rPr>
+              <a:t>names</a:t>
+            </a:r>
+            <a:r>
+              <a:rPr>
+                <a:solidFill>
+                  <a:srgbClr val="003B4F"/>
+                </a:solidFill>
+                <a:latin typeface="Courier"/>
+              </a:rPr>
+              <a:t>(mymodel)</a:t>
+            </a:r>
+          </a:p>
+          <a:p>
+            <a:pPr lvl="0" indent="0">
+              <a:buNone/>
+            </a:pPr>
+            <a:r>
+              <a:rPr>
+                <a:latin typeface="Courier"/>
+              </a:rPr>
+              <a:t> [1] "TMBfilename"      "bounds"           "map"              "initial_params"  
+ [5] "phase_params"     "estimated_params" "obj"              "quantities"      
+ [9] "data_list"        "run_time"         "opt"              "sdrep"           </a:t>
             </a:r>
           </a:p>
         </p:txBody>

</xml_diff>